<commit_message>
added call activity variables example
</commit_message>
<xml_diff>
--- a/flowable-demo/src/main/resources/devsupport/Flowable_Demo.pptx
+++ b/flowable-demo/src/main/resources/devsupport/Flowable_Demo.pptx
@@ -5,7 +5,7 @@
     <p:sldMasterId id="2147483648" r:id="rId1"/>
   </p:sldMasterIdLst>
   <p:notesMasterIdLst>
-    <p:notesMasterId r:id="rId20"/>
+    <p:notesMasterId r:id="rId22"/>
   </p:notesMasterIdLst>
   <p:sldIdLst>
     <p:sldId id="256" r:id="rId2"/>
@@ -23,9 +23,11 @@
     <p:sldId id="262" r:id="rId14"/>
     <p:sldId id="274" r:id="rId15"/>
     <p:sldId id="275" r:id="rId16"/>
-    <p:sldId id="279" r:id="rId17"/>
-    <p:sldId id="276" r:id="rId18"/>
-    <p:sldId id="277" r:id="rId19"/>
+    <p:sldId id="281" r:id="rId17"/>
+    <p:sldId id="282" r:id="rId18"/>
+    <p:sldId id="279" r:id="rId19"/>
+    <p:sldId id="276" r:id="rId20"/>
+    <p:sldId id="277" r:id="rId21"/>
   </p:sldIdLst>
   <p:sldSz cx="12192000" cy="6858000"/>
   <p:notesSz cx="6858000" cy="9144000"/>
@@ -214,7 +216,7 @@
           <a:p>
             <a:fld id="{5833448F-D82A-4F91-8165-AEC9D03D7538}" type="datetimeFigureOut">
               <a:rPr lang="en-CH" smtClean="0"/>
-              <a:t>23/04/2022</a:t>
+              <a:t>24/04/2022</a:t>
             </a:fld>
             <a:endParaRPr lang="en-CH"/>
           </a:p>
@@ -566,6 +568,174 @@
 </p:notes>
 </file>
 
+<file path=ppt/notesSlides/notesSlide10.xml><?xml version="1.0" encoding="utf-8"?>
+<p:notes xmlns:a="http://schemas.openxmlformats.org/drawingml/2006/main" xmlns:r="http://schemas.openxmlformats.org/officeDocument/2006/relationships" xmlns:p="http://schemas.openxmlformats.org/presentationml/2006/main">
+  <p:cSld>
+    <p:spTree>
+      <p:nvGrpSpPr>
+        <p:cNvPr id="1" name=""/>
+        <p:cNvGrpSpPr/>
+        <p:nvPr/>
+      </p:nvGrpSpPr>
+      <p:grpSpPr>
+        <a:xfrm>
+          <a:off x="0" y="0"/>
+          <a:ext cx="0" cy="0"/>
+          <a:chOff x="0" y="0"/>
+          <a:chExt cx="0" cy="0"/>
+        </a:xfrm>
+      </p:grpSpPr>
+      <p:sp>
+        <p:nvSpPr>
+          <p:cNvPr id="2" name="Slide Image Placeholder 1"/>
+          <p:cNvSpPr>
+            <a:spLocks noGrp="1" noRot="1" noChangeAspect="1"/>
+          </p:cNvSpPr>
+          <p:nvPr>
+            <p:ph type="sldImg"/>
+          </p:nvPr>
+        </p:nvSpPr>
+        <p:spPr/>
+      </p:sp>
+      <p:sp>
+        <p:nvSpPr>
+          <p:cNvPr id="3" name="Notes Placeholder 2"/>
+          <p:cNvSpPr>
+            <a:spLocks noGrp="1"/>
+          </p:cNvSpPr>
+          <p:nvPr>
+            <p:ph type="body" idx="1"/>
+          </p:nvPr>
+        </p:nvSpPr>
+        <p:spPr/>
+        <p:txBody>
+          <a:bodyPr/>
+          <a:lstStyle/>
+          <a:p>
+            <a:endParaRPr lang="de-CH" dirty="0"/>
+          </a:p>
+        </p:txBody>
+      </p:sp>
+      <p:sp>
+        <p:nvSpPr>
+          <p:cNvPr id="4" name="Slide Number Placeholder 3"/>
+          <p:cNvSpPr>
+            <a:spLocks noGrp="1"/>
+          </p:cNvSpPr>
+          <p:nvPr>
+            <p:ph type="sldNum" sz="quarter" idx="5"/>
+          </p:nvPr>
+        </p:nvSpPr>
+        <p:spPr/>
+        <p:txBody>
+          <a:bodyPr/>
+          <a:lstStyle/>
+          <a:p>
+            <a:fld id="{02945BD4-EE45-4032-9BDF-3B28D9BFA7D5}" type="slidenum">
+              <a:rPr lang="en-CH" smtClean="0"/>
+              <a:t>19</a:t>
+            </a:fld>
+            <a:endParaRPr lang="en-CH"/>
+          </a:p>
+        </p:txBody>
+      </p:sp>
+    </p:spTree>
+    <p:extLst>
+      <p:ext uri="{BB962C8B-B14F-4D97-AF65-F5344CB8AC3E}">
+        <p14:creationId xmlns:p14="http://schemas.microsoft.com/office/powerpoint/2010/main" val="3583361730"/>
+      </p:ext>
+    </p:extLst>
+  </p:cSld>
+  <p:clrMapOvr>
+    <a:masterClrMapping/>
+  </p:clrMapOvr>
+</p:notes>
+</file>
+
+<file path=ppt/notesSlides/notesSlide11.xml><?xml version="1.0" encoding="utf-8"?>
+<p:notes xmlns:a="http://schemas.openxmlformats.org/drawingml/2006/main" xmlns:r="http://schemas.openxmlformats.org/officeDocument/2006/relationships" xmlns:p="http://schemas.openxmlformats.org/presentationml/2006/main">
+  <p:cSld>
+    <p:spTree>
+      <p:nvGrpSpPr>
+        <p:cNvPr id="1" name=""/>
+        <p:cNvGrpSpPr/>
+        <p:nvPr/>
+      </p:nvGrpSpPr>
+      <p:grpSpPr>
+        <a:xfrm>
+          <a:off x="0" y="0"/>
+          <a:ext cx="0" cy="0"/>
+          <a:chOff x="0" y="0"/>
+          <a:chExt cx="0" cy="0"/>
+        </a:xfrm>
+      </p:grpSpPr>
+      <p:sp>
+        <p:nvSpPr>
+          <p:cNvPr id="2" name="Slide Image Placeholder 1"/>
+          <p:cNvSpPr>
+            <a:spLocks noGrp="1" noRot="1" noChangeAspect="1"/>
+          </p:cNvSpPr>
+          <p:nvPr>
+            <p:ph type="sldImg"/>
+          </p:nvPr>
+        </p:nvSpPr>
+        <p:spPr/>
+      </p:sp>
+      <p:sp>
+        <p:nvSpPr>
+          <p:cNvPr id="3" name="Notes Placeholder 2"/>
+          <p:cNvSpPr>
+            <a:spLocks noGrp="1"/>
+          </p:cNvSpPr>
+          <p:nvPr>
+            <p:ph type="body" idx="1"/>
+          </p:nvPr>
+        </p:nvSpPr>
+        <p:spPr/>
+        <p:txBody>
+          <a:bodyPr/>
+          <a:lstStyle/>
+          <a:p>
+            <a:endParaRPr lang="de-CH" dirty="0"/>
+          </a:p>
+        </p:txBody>
+      </p:sp>
+      <p:sp>
+        <p:nvSpPr>
+          <p:cNvPr id="4" name="Slide Number Placeholder 3"/>
+          <p:cNvSpPr>
+            <a:spLocks noGrp="1"/>
+          </p:cNvSpPr>
+          <p:nvPr>
+            <p:ph type="sldNum" sz="quarter" idx="5"/>
+          </p:nvPr>
+        </p:nvSpPr>
+        <p:spPr/>
+        <p:txBody>
+          <a:bodyPr/>
+          <a:lstStyle/>
+          <a:p>
+            <a:fld id="{02945BD4-EE45-4032-9BDF-3B28D9BFA7D5}" type="slidenum">
+              <a:rPr lang="en-CH" smtClean="0"/>
+              <a:t>20</a:t>
+            </a:fld>
+            <a:endParaRPr lang="en-CH"/>
+          </a:p>
+        </p:txBody>
+      </p:sp>
+    </p:spTree>
+    <p:extLst>
+      <p:ext uri="{BB962C8B-B14F-4D97-AF65-F5344CB8AC3E}">
+        <p14:creationId xmlns:p14="http://schemas.microsoft.com/office/powerpoint/2010/main" val="3740068702"/>
+      </p:ext>
+    </p:extLst>
+  </p:cSld>
+  <p:clrMapOvr>
+    <a:masterClrMapping/>
+  </p:clrMapOvr>
+</p:notes>
+</file>
+
 <file path=ppt/notesSlides/notesSlide2.xml><?xml version="1.0" encoding="utf-8"?>
 <p:notes xmlns:a="http://schemas.openxmlformats.org/drawingml/2006/main" xmlns:r="http://schemas.openxmlformats.org/officeDocument/2006/relationships" xmlns:p="http://schemas.openxmlformats.org/presentationml/2006/main">
   <p:cSld>
@@ -1188,7 +1358,7 @@
     </p:spTree>
     <p:extLst>
       <p:ext uri="{BB962C8B-B14F-4D97-AF65-F5344CB8AC3E}">
-        <p14:creationId xmlns:p14="http://schemas.microsoft.com/office/powerpoint/2010/main" val="1217711729"/>
+        <p14:creationId xmlns:p14="http://schemas.microsoft.com/office/powerpoint/2010/main" val="2116276287"/>
       </p:ext>
     </p:extLst>
   </p:cSld>
@@ -1272,7 +1442,7 @@
     </p:spTree>
     <p:extLst>
       <p:ext uri="{BB962C8B-B14F-4D97-AF65-F5344CB8AC3E}">
-        <p14:creationId xmlns:p14="http://schemas.microsoft.com/office/powerpoint/2010/main" val="3583361730"/>
+        <p14:creationId xmlns:p14="http://schemas.microsoft.com/office/powerpoint/2010/main" val="2263799970"/>
       </p:ext>
     </p:extLst>
   </p:cSld>
@@ -1356,7 +1526,7 @@
     </p:spTree>
     <p:extLst>
       <p:ext uri="{BB962C8B-B14F-4D97-AF65-F5344CB8AC3E}">
-        <p14:creationId xmlns:p14="http://schemas.microsoft.com/office/powerpoint/2010/main" val="3740068702"/>
+        <p14:creationId xmlns:p14="http://schemas.microsoft.com/office/powerpoint/2010/main" val="1217711729"/>
       </p:ext>
     </p:extLst>
   </p:cSld>
@@ -1515,7 +1685,7 @@
           <a:p>
             <a:fld id="{1DE9D8DB-7996-4D53-BAF7-A90A1E48913A}" type="datetimeFigureOut">
               <a:rPr lang="en-CH" smtClean="0"/>
-              <a:t>23/04/2022</a:t>
+              <a:t>24/04/2022</a:t>
             </a:fld>
             <a:endParaRPr lang="en-CH"/>
           </a:p>
@@ -1715,7 +1885,7 @@
           <a:p>
             <a:fld id="{1DE9D8DB-7996-4D53-BAF7-A90A1E48913A}" type="datetimeFigureOut">
               <a:rPr lang="en-CH" smtClean="0"/>
-              <a:t>23/04/2022</a:t>
+              <a:t>24/04/2022</a:t>
             </a:fld>
             <a:endParaRPr lang="en-CH"/>
           </a:p>
@@ -1925,7 +2095,7 @@
           <a:p>
             <a:fld id="{1DE9D8DB-7996-4D53-BAF7-A90A1E48913A}" type="datetimeFigureOut">
               <a:rPr lang="en-CH" smtClean="0"/>
-              <a:t>23/04/2022</a:t>
+              <a:t>24/04/2022</a:t>
             </a:fld>
             <a:endParaRPr lang="en-CH"/>
           </a:p>
@@ -2125,7 +2295,7 @@
           <a:p>
             <a:fld id="{1DE9D8DB-7996-4D53-BAF7-A90A1E48913A}" type="datetimeFigureOut">
               <a:rPr lang="en-CH" smtClean="0"/>
-              <a:t>23/04/2022</a:t>
+              <a:t>24/04/2022</a:t>
             </a:fld>
             <a:endParaRPr lang="en-CH"/>
           </a:p>
@@ -2401,7 +2571,7 @@
           <a:p>
             <a:fld id="{1DE9D8DB-7996-4D53-BAF7-A90A1E48913A}" type="datetimeFigureOut">
               <a:rPr lang="en-CH" smtClean="0"/>
-              <a:t>23/04/2022</a:t>
+              <a:t>24/04/2022</a:t>
             </a:fld>
             <a:endParaRPr lang="en-CH"/>
           </a:p>
@@ -2669,7 +2839,7 @@
           <a:p>
             <a:fld id="{1DE9D8DB-7996-4D53-BAF7-A90A1E48913A}" type="datetimeFigureOut">
               <a:rPr lang="en-CH" smtClean="0"/>
-              <a:t>23/04/2022</a:t>
+              <a:t>24/04/2022</a:t>
             </a:fld>
             <a:endParaRPr lang="en-CH"/>
           </a:p>
@@ -3084,7 +3254,7 @@
           <a:p>
             <a:fld id="{1DE9D8DB-7996-4D53-BAF7-A90A1E48913A}" type="datetimeFigureOut">
               <a:rPr lang="en-CH" smtClean="0"/>
-              <a:t>23/04/2022</a:t>
+              <a:t>24/04/2022</a:t>
             </a:fld>
             <a:endParaRPr lang="en-CH"/>
           </a:p>
@@ -3226,7 +3396,7 @@
           <a:p>
             <a:fld id="{1DE9D8DB-7996-4D53-BAF7-A90A1E48913A}" type="datetimeFigureOut">
               <a:rPr lang="en-CH" smtClean="0"/>
-              <a:t>23/04/2022</a:t>
+              <a:t>24/04/2022</a:t>
             </a:fld>
             <a:endParaRPr lang="en-CH"/>
           </a:p>
@@ -3339,7 +3509,7 @@
           <a:p>
             <a:fld id="{1DE9D8DB-7996-4D53-BAF7-A90A1E48913A}" type="datetimeFigureOut">
               <a:rPr lang="en-CH" smtClean="0"/>
-              <a:t>23/04/2022</a:t>
+              <a:t>24/04/2022</a:t>
             </a:fld>
             <a:endParaRPr lang="en-CH"/>
           </a:p>
@@ -3652,7 +3822,7 @@
           <a:p>
             <a:fld id="{1DE9D8DB-7996-4D53-BAF7-A90A1E48913A}" type="datetimeFigureOut">
               <a:rPr lang="en-CH" smtClean="0"/>
-              <a:t>23/04/2022</a:t>
+              <a:t>24/04/2022</a:t>
             </a:fld>
             <a:endParaRPr lang="en-CH"/>
           </a:p>
@@ -3941,7 +4111,7 @@
           <a:p>
             <a:fld id="{1DE9D8DB-7996-4D53-BAF7-A90A1E48913A}" type="datetimeFigureOut">
               <a:rPr lang="en-CH" smtClean="0"/>
-              <a:t>23/04/2022</a:t>
+              <a:t>24/04/2022</a:t>
             </a:fld>
             <a:endParaRPr lang="en-CH"/>
           </a:p>
@@ -4184,7 +4354,7 @@
           <a:p>
             <a:fld id="{1DE9D8DB-7996-4D53-BAF7-A90A1E48913A}" type="datetimeFigureOut">
               <a:rPr lang="en-CH" smtClean="0"/>
-              <a:t>23/04/2022</a:t>
+              <a:t>24/04/2022</a:t>
             </a:fld>
             <a:endParaRPr lang="en-CH"/>
           </a:p>
@@ -5171,7 +5341,7 @@
           <a:p>
             <a:r>
               <a:rPr lang="en-US" dirty="0"/>
-              <a:t>Call Activities / Subprocesses (1/3)</a:t>
+              <a:t>Call Activities / Subprocesses (1/5)</a:t>
             </a:r>
             <a:endParaRPr lang="en-CH" dirty="0"/>
           </a:p>
@@ -5334,7 +5504,7 @@
           <a:p>
             <a:r>
               <a:rPr lang="en-US" dirty="0"/>
-              <a:t>Call Activities / Subprocesses (2/3)</a:t>
+              <a:t>Call Activities / Subprocesses (2/5)</a:t>
             </a:r>
             <a:endParaRPr lang="en-CH" dirty="0"/>
           </a:p>
@@ -5838,7 +6008,7 @@
           <a:p>
             <a:r>
               <a:rPr lang="en-US" dirty="0"/>
-              <a:t>Call Activities / Subprocesses (3/3)</a:t>
+              <a:t>Call Activities / Subprocesses (3/5)</a:t>
             </a:r>
             <a:endParaRPr lang="en-CH" dirty="0"/>
           </a:p>
@@ -5926,6 +6096,1759 @@
           <a:p>
             <a:r>
               <a:rPr lang="en-US" dirty="0"/>
+              <a:t>Call Activities / Subprocesses (4/5)</a:t>
+            </a:r>
+            <a:endParaRPr lang="en-CH" dirty="0"/>
+          </a:p>
+        </p:txBody>
+      </p:sp>
+      <p:sp>
+        <p:nvSpPr>
+          <p:cNvPr id="4" name="Content Placeholder 3">
+            <a:extLst>
+              <a:ext uri="{FF2B5EF4-FFF2-40B4-BE49-F238E27FC236}">
+                <a16:creationId xmlns:a16="http://schemas.microsoft.com/office/drawing/2014/main" id="{41882CF6-E58B-40D4-98AA-EC20E59F25EE}"/>
+              </a:ext>
+            </a:extLst>
+          </p:cNvPr>
+          <p:cNvSpPr>
+            <a:spLocks noGrp="1"/>
+          </p:cNvSpPr>
+          <p:nvPr>
+            <p:ph idx="1"/>
+          </p:nvPr>
+        </p:nvSpPr>
+        <p:spPr>
+          <a:xfrm>
+            <a:off x="838200" y="1825625"/>
+            <a:ext cx="9451554" cy="4351338"/>
+          </a:xfrm>
+        </p:spPr>
+        <p:txBody>
+          <a:bodyPr>
+            <a:normAutofit/>
+          </a:bodyPr>
+          <a:lstStyle/>
+          <a:p>
+            <a:pPr marL="0" indent="0">
+              <a:buNone/>
+            </a:pPr>
+            <a:r>
+              <a:rPr lang="de-CH" sz="1800" dirty="0" err="1"/>
+              <a:t>Starting</a:t>
+            </a:r>
+            <a:r>
+              <a:rPr lang="de-CH" sz="1800" dirty="0"/>
+              <a:t> a </a:t>
+            </a:r>
+            <a:r>
+              <a:rPr lang="de-CH" sz="1800" dirty="0" err="1"/>
+              <a:t>mainProcess</a:t>
+            </a:r>
+            <a:r>
+              <a:rPr lang="de-CH" sz="1800" dirty="0"/>
+              <a:t> </a:t>
+            </a:r>
+            <a:r>
+              <a:rPr lang="de-CH" sz="1800" dirty="0" err="1"/>
+              <a:t>process</a:t>
+            </a:r>
+            <a:endParaRPr lang="de-CH" sz="1800" dirty="0"/>
+          </a:p>
+          <a:p>
+            <a:pPr marL="0" indent="0">
+              <a:buNone/>
+            </a:pPr>
+            <a:r>
+              <a:rPr lang="de-CH" sz="1800" dirty="0" err="1">
+                <a:highlight>
+                  <a:srgbClr val="FFFF00"/>
+                </a:highlight>
+              </a:rPr>
+              <a:t>mainProcess</a:t>
+            </a:r>
+            <a:r>
+              <a:rPr lang="de-CH" sz="1800" dirty="0">
+                <a:highlight>
+                  <a:srgbClr val="FFFF00"/>
+                </a:highlight>
+              </a:rPr>
+              <a:t>: </a:t>
+            </a:r>
+            <a:r>
+              <a:rPr lang="de-CH" sz="1800" dirty="0"/>
+              <a:t>{</a:t>
+            </a:r>
+            <a:r>
+              <a:rPr lang="de-CH" sz="1800" dirty="0" err="1"/>
+              <a:t>mainProcessVariable</a:t>
+            </a:r>
+            <a:r>
+              <a:rPr lang="de-CH" sz="1800" dirty="0"/>
+              <a:t>=Guten Abend}</a:t>
+            </a:r>
+          </a:p>
+          <a:p>
+            <a:pPr marL="0" indent="0">
+              <a:buNone/>
+            </a:pPr>
+            <a:r>
+              <a:rPr lang="de-CH" sz="1800" dirty="0" err="1">
+                <a:highlight>
+                  <a:srgbClr val="00FF00"/>
+                </a:highlight>
+              </a:rPr>
+              <a:t>passedVariablesSubprocess</a:t>
+            </a:r>
+            <a:r>
+              <a:rPr lang="de-CH" sz="1800" dirty="0">
+                <a:highlight>
+                  <a:srgbClr val="00FF00"/>
+                </a:highlight>
+              </a:rPr>
+              <a:t>: </a:t>
+            </a:r>
+            <a:r>
+              <a:rPr lang="de-CH" sz="1800" dirty="0"/>
+              <a:t>{</a:t>
+            </a:r>
+            <a:r>
+              <a:rPr lang="de-CH" sz="1800" dirty="0" err="1"/>
+              <a:t>subprocessVariable</a:t>
+            </a:r>
+            <a:r>
+              <a:rPr lang="de-CH" sz="1800" dirty="0"/>
+              <a:t>=Guten Abend}</a:t>
+            </a:r>
+          </a:p>
+          <a:p>
+            <a:pPr marL="0" indent="0">
+              <a:buNone/>
+            </a:pPr>
+            <a:r>
+              <a:rPr lang="de-CH" sz="1800" dirty="0" err="1">
+                <a:highlight>
+                  <a:srgbClr val="00FF00"/>
+                </a:highlight>
+              </a:rPr>
+              <a:t>passedVariablesSubprocess</a:t>
+            </a:r>
+            <a:r>
+              <a:rPr lang="de-CH" sz="1800" dirty="0">
+                <a:highlight>
+                  <a:srgbClr val="00FF00"/>
+                </a:highlight>
+              </a:rPr>
+              <a:t>: </a:t>
+            </a:r>
+            <a:r>
+              <a:rPr lang="de-CH" sz="1800" dirty="0"/>
+              <a:t>Setting </a:t>
+            </a:r>
+            <a:r>
+              <a:rPr lang="de-CH" sz="1800" dirty="0" err="1"/>
+              <a:t>process</a:t>
+            </a:r>
+            <a:r>
+              <a:rPr lang="de-CH" sz="1800" dirty="0"/>
+              <a:t> variable '</a:t>
+            </a:r>
+            <a:r>
+              <a:rPr lang="de-CH" sz="1800" dirty="0" err="1"/>
+              <a:t>subprocessVariable</a:t>
+            </a:r>
+            <a:r>
+              <a:rPr lang="de-CH" sz="1800" dirty="0"/>
+              <a:t>' to: </a:t>
+            </a:r>
+            <a:r>
+              <a:rPr lang="de-CH" sz="1800" dirty="0" err="1"/>
+              <a:t>Magandang</a:t>
+            </a:r>
+            <a:r>
+              <a:rPr lang="de-CH" sz="1800" dirty="0"/>
+              <a:t> Gabi</a:t>
+            </a:r>
+          </a:p>
+          <a:p>
+            <a:pPr marL="0" indent="0">
+              <a:buNone/>
+            </a:pPr>
+            <a:r>
+              <a:rPr lang="de-CH" sz="1800" dirty="0" err="1">
+                <a:highlight>
+                  <a:srgbClr val="00FF00"/>
+                </a:highlight>
+              </a:rPr>
+              <a:t>passedVariablesSubprocess</a:t>
+            </a:r>
+            <a:r>
+              <a:rPr lang="de-CH" sz="1800" dirty="0">
+                <a:highlight>
+                  <a:srgbClr val="00FF00"/>
+                </a:highlight>
+              </a:rPr>
+              <a:t>: </a:t>
+            </a:r>
+            <a:r>
+              <a:rPr lang="de-CH" sz="1800" dirty="0"/>
+              <a:t>{</a:t>
+            </a:r>
+            <a:r>
+              <a:rPr lang="de-CH" sz="1800" dirty="0" err="1"/>
+              <a:t>subprocessVariable</a:t>
+            </a:r>
+            <a:r>
+              <a:rPr lang="de-CH" sz="1800" dirty="0"/>
+              <a:t>=</a:t>
+            </a:r>
+            <a:r>
+              <a:rPr lang="de-CH" sz="1800" dirty="0" err="1"/>
+              <a:t>Magandang</a:t>
+            </a:r>
+            <a:r>
+              <a:rPr lang="de-CH" sz="1800" dirty="0"/>
+              <a:t> Gabi}</a:t>
+            </a:r>
+          </a:p>
+          <a:p>
+            <a:pPr marL="0" indent="0">
+              <a:buNone/>
+            </a:pPr>
+            <a:r>
+              <a:rPr lang="de-CH" sz="1800" dirty="0" err="1">
+                <a:highlight>
+                  <a:srgbClr val="FFFF00"/>
+                </a:highlight>
+              </a:rPr>
+              <a:t>mainProcess</a:t>
+            </a:r>
+            <a:r>
+              <a:rPr lang="de-CH" sz="1800" dirty="0">
+                <a:highlight>
+                  <a:srgbClr val="FFFF00"/>
+                </a:highlight>
+              </a:rPr>
+              <a:t>: </a:t>
+            </a:r>
+            <a:r>
+              <a:rPr lang="de-CH" sz="1800" dirty="0"/>
+              <a:t>{</a:t>
+            </a:r>
+            <a:r>
+              <a:rPr lang="de-CH" sz="1800" dirty="0" err="1"/>
+              <a:t>mainProcessVariable</a:t>
+            </a:r>
+            <a:r>
+              <a:rPr lang="de-CH" sz="1800" dirty="0"/>
+              <a:t>=</a:t>
+            </a:r>
+            <a:r>
+              <a:rPr lang="de-CH" sz="1800" dirty="0" err="1"/>
+              <a:t>Magandang</a:t>
+            </a:r>
+            <a:r>
+              <a:rPr lang="de-CH" sz="1800" dirty="0"/>
+              <a:t> Gabi}</a:t>
+            </a:r>
+          </a:p>
+          <a:p>
+            <a:pPr marL="0" indent="0">
+              <a:buNone/>
+            </a:pPr>
+            <a:r>
+              <a:rPr lang="de-CH" sz="1800" dirty="0" err="1">
+                <a:highlight>
+                  <a:srgbClr val="00FFFF"/>
+                </a:highlight>
+              </a:rPr>
+              <a:t>inheritedVariablesSubprocess</a:t>
+            </a:r>
+            <a:r>
+              <a:rPr lang="de-CH" sz="1800" dirty="0">
+                <a:highlight>
+                  <a:srgbClr val="00FFFF"/>
+                </a:highlight>
+              </a:rPr>
+              <a:t>: </a:t>
+            </a:r>
+            <a:r>
+              <a:rPr lang="de-CH" sz="1800" dirty="0"/>
+              <a:t>{</a:t>
+            </a:r>
+            <a:r>
+              <a:rPr lang="de-CH" sz="1800" dirty="0" err="1"/>
+              <a:t>mainProcessVariable</a:t>
+            </a:r>
+            <a:r>
+              <a:rPr lang="de-CH" sz="1800" dirty="0"/>
+              <a:t>=</a:t>
+            </a:r>
+            <a:r>
+              <a:rPr lang="de-CH" sz="1800" dirty="0" err="1"/>
+              <a:t>Magandang</a:t>
+            </a:r>
+            <a:r>
+              <a:rPr lang="de-CH" sz="1800" dirty="0"/>
+              <a:t> Gabi}</a:t>
+            </a:r>
+          </a:p>
+          <a:p>
+            <a:pPr marL="0" indent="0">
+              <a:buNone/>
+            </a:pPr>
+            <a:r>
+              <a:rPr lang="de-CH" sz="1800" dirty="0" err="1">
+                <a:highlight>
+                  <a:srgbClr val="00FFFF"/>
+                </a:highlight>
+              </a:rPr>
+              <a:t>inheritedVariablesSubprocess</a:t>
+            </a:r>
+            <a:r>
+              <a:rPr lang="de-CH" sz="1800" dirty="0">
+                <a:highlight>
+                  <a:srgbClr val="00FFFF"/>
+                </a:highlight>
+              </a:rPr>
+              <a:t>: </a:t>
+            </a:r>
+            <a:r>
+              <a:rPr lang="de-CH" sz="1800" dirty="0"/>
+              <a:t>Setting </a:t>
+            </a:r>
+            <a:r>
+              <a:rPr lang="de-CH" sz="1800" dirty="0" err="1"/>
+              <a:t>process</a:t>
+            </a:r>
+            <a:r>
+              <a:rPr lang="de-CH" sz="1800" dirty="0"/>
+              <a:t> variable '</a:t>
+            </a:r>
+            <a:r>
+              <a:rPr lang="de-CH" sz="1800" dirty="0" err="1"/>
+              <a:t>mainProcessVariable</a:t>
+            </a:r>
+            <a:r>
+              <a:rPr lang="de-CH" sz="1800" dirty="0"/>
+              <a:t>' to: </a:t>
+            </a:r>
+            <a:r>
+              <a:rPr lang="de-CH" sz="1800" dirty="0" err="1"/>
+              <a:t>Good</a:t>
+            </a:r>
+            <a:r>
+              <a:rPr lang="de-CH" sz="1800" dirty="0"/>
+              <a:t> </a:t>
+            </a:r>
+            <a:r>
+              <a:rPr lang="de-CH" sz="1800" dirty="0" err="1"/>
+              <a:t>Evening</a:t>
+            </a:r>
+            <a:endParaRPr lang="de-CH" sz="1800" dirty="0"/>
+          </a:p>
+          <a:p>
+            <a:pPr marL="0" indent="0">
+              <a:buNone/>
+            </a:pPr>
+            <a:r>
+              <a:rPr lang="de-CH" sz="1800" dirty="0" err="1">
+                <a:highlight>
+                  <a:srgbClr val="00FFFF"/>
+                </a:highlight>
+              </a:rPr>
+              <a:t>inheritedVariablesSubprocess</a:t>
+            </a:r>
+            <a:r>
+              <a:rPr lang="de-CH" sz="1800" dirty="0">
+                <a:highlight>
+                  <a:srgbClr val="00FFFF"/>
+                </a:highlight>
+              </a:rPr>
+              <a:t>: </a:t>
+            </a:r>
+            <a:r>
+              <a:rPr lang="de-CH" sz="1800" dirty="0"/>
+              <a:t>{</a:t>
+            </a:r>
+            <a:r>
+              <a:rPr lang="de-CH" sz="1800" dirty="0" err="1"/>
+              <a:t>mainProcessVariable</a:t>
+            </a:r>
+            <a:r>
+              <a:rPr lang="de-CH" sz="1800" dirty="0"/>
+              <a:t>=</a:t>
+            </a:r>
+            <a:r>
+              <a:rPr lang="de-CH" sz="1800" dirty="0" err="1"/>
+              <a:t>Good</a:t>
+            </a:r>
+            <a:r>
+              <a:rPr lang="de-CH" sz="1800" dirty="0"/>
+              <a:t> </a:t>
+            </a:r>
+            <a:r>
+              <a:rPr lang="de-CH" sz="1800" dirty="0" err="1"/>
+              <a:t>Evening</a:t>
+            </a:r>
+            <a:r>
+              <a:rPr lang="de-CH" sz="1800" dirty="0"/>
+              <a:t>}</a:t>
+            </a:r>
+          </a:p>
+          <a:p>
+            <a:pPr marL="0" indent="0">
+              <a:buNone/>
+            </a:pPr>
+            <a:r>
+              <a:rPr lang="de-CH" sz="1800" dirty="0" err="1">
+                <a:highlight>
+                  <a:srgbClr val="FFFF00"/>
+                </a:highlight>
+              </a:rPr>
+              <a:t>mainProcess</a:t>
+            </a:r>
+            <a:r>
+              <a:rPr lang="de-CH" sz="1800" dirty="0">
+                <a:highlight>
+                  <a:srgbClr val="FFFF00"/>
+                </a:highlight>
+              </a:rPr>
+              <a:t>: </a:t>
+            </a:r>
+            <a:r>
+              <a:rPr lang="de-CH" sz="1800" dirty="0"/>
+              <a:t>{</a:t>
+            </a:r>
+            <a:r>
+              <a:rPr lang="de-CH" sz="1800" dirty="0" err="1"/>
+              <a:t>mainProcessVariable</a:t>
+            </a:r>
+            <a:r>
+              <a:rPr lang="de-CH" sz="1800" dirty="0"/>
+              <a:t>=</a:t>
+            </a:r>
+            <a:r>
+              <a:rPr lang="de-CH" sz="1800" dirty="0" err="1"/>
+              <a:t>Magandang</a:t>
+            </a:r>
+            <a:r>
+              <a:rPr lang="de-CH" sz="1800" dirty="0"/>
+              <a:t> Gabi}</a:t>
+            </a:r>
+          </a:p>
+          <a:p>
+            <a:endParaRPr lang="en-CH" dirty="0"/>
+          </a:p>
+        </p:txBody>
+      </p:sp>
+    </p:spTree>
+    <p:extLst>
+      <p:ext uri="{BB962C8B-B14F-4D97-AF65-F5344CB8AC3E}">
+        <p14:creationId xmlns:p14="http://schemas.microsoft.com/office/powerpoint/2010/main" val="57727152"/>
+      </p:ext>
+    </p:extLst>
+  </p:cSld>
+  <p:clrMapOvr>
+    <a:masterClrMapping/>
+  </p:clrMapOvr>
+</p:sld>
+</file>
+
+<file path=ppt/slides/slide17.xml><?xml version="1.0" encoding="utf-8"?>
+<p:sld xmlns:a="http://schemas.openxmlformats.org/drawingml/2006/main" xmlns:r="http://schemas.openxmlformats.org/officeDocument/2006/relationships" xmlns:p="http://schemas.openxmlformats.org/presentationml/2006/main">
+  <p:cSld>
+    <p:spTree>
+      <p:nvGrpSpPr>
+        <p:cNvPr id="1" name=""/>
+        <p:cNvGrpSpPr/>
+        <p:nvPr/>
+      </p:nvGrpSpPr>
+      <p:grpSpPr>
+        <a:xfrm>
+          <a:off x="0" y="0"/>
+          <a:ext cx="0" cy="0"/>
+          <a:chOff x="0" y="0"/>
+          <a:chExt cx="0" cy="0"/>
+        </a:xfrm>
+      </p:grpSpPr>
+      <p:sp>
+        <p:nvSpPr>
+          <p:cNvPr id="2" name="Title 1">
+            <a:extLst>
+              <a:ext uri="{FF2B5EF4-FFF2-40B4-BE49-F238E27FC236}">
+                <a16:creationId xmlns:a16="http://schemas.microsoft.com/office/drawing/2014/main" id="{03812D1F-F6DF-42A7-8DA2-1A5A8243FD15}"/>
+              </a:ext>
+            </a:extLst>
+          </p:cNvPr>
+          <p:cNvSpPr>
+            <a:spLocks noGrp="1"/>
+          </p:cNvSpPr>
+          <p:nvPr>
+            <p:ph type="title"/>
+          </p:nvPr>
+        </p:nvSpPr>
+        <p:spPr/>
+        <p:txBody>
+          <a:bodyPr/>
+          <a:lstStyle/>
+          <a:p>
+            <a:r>
+              <a:rPr lang="en-US" dirty="0"/>
+              <a:t>Call Activities / Subprocesses (5/5)</a:t>
+            </a:r>
+            <a:endParaRPr lang="en-CH" dirty="0"/>
+          </a:p>
+        </p:txBody>
+      </p:sp>
+      <p:sp>
+        <p:nvSpPr>
+          <p:cNvPr id="6" name="Rectangle 5">
+            <a:extLst>
+              <a:ext uri="{FF2B5EF4-FFF2-40B4-BE49-F238E27FC236}">
+                <a16:creationId xmlns:a16="http://schemas.microsoft.com/office/drawing/2014/main" id="{7346DAE3-6145-4A43-8290-8049457973E9}"/>
+              </a:ext>
+            </a:extLst>
+          </p:cNvPr>
+          <p:cNvSpPr/>
+          <p:nvPr/>
+        </p:nvSpPr>
+        <p:spPr>
+          <a:xfrm>
+            <a:off x="1123720" y="1784733"/>
+            <a:ext cx="1972020" cy="616944"/>
+          </a:xfrm>
+          <a:prstGeom prst="rect">
+            <a:avLst/>
+          </a:prstGeom>
+          <a:solidFill>
+            <a:srgbClr val="FFFF00"/>
+          </a:solidFill>
+          <a:ln>
+            <a:noFill/>
+          </a:ln>
+        </p:spPr>
+        <p:style>
+          <a:lnRef idx="2">
+            <a:schemeClr val="accent1">
+              <a:shade val="50000"/>
+            </a:schemeClr>
+          </a:lnRef>
+          <a:fillRef idx="1">
+            <a:schemeClr val="accent1"/>
+          </a:fillRef>
+          <a:effectRef idx="0">
+            <a:schemeClr val="accent1"/>
+          </a:effectRef>
+          <a:fontRef idx="minor">
+            <a:schemeClr val="lt1"/>
+          </a:fontRef>
+        </p:style>
+        <p:txBody>
+          <a:bodyPr rtlCol="0" anchor="ctr"/>
+          <a:lstStyle/>
+          <a:p>
+            <a:pPr algn="ctr"/>
+            <a:r>
+              <a:rPr lang="en-US" sz="1600" b="1" dirty="0" err="1">
+                <a:solidFill>
+                  <a:schemeClr val="tx1"/>
+                </a:solidFill>
+              </a:rPr>
+              <a:t>mainProcess</a:t>
+            </a:r>
+            <a:endParaRPr lang="en-CH" sz="1600" b="1" dirty="0">
+              <a:solidFill>
+                <a:schemeClr val="tx1"/>
+              </a:solidFill>
+            </a:endParaRPr>
+          </a:p>
+        </p:txBody>
+      </p:sp>
+      <p:sp>
+        <p:nvSpPr>
+          <p:cNvPr id="7" name="Rectangle 6">
+            <a:extLst>
+              <a:ext uri="{FF2B5EF4-FFF2-40B4-BE49-F238E27FC236}">
+                <a16:creationId xmlns:a16="http://schemas.microsoft.com/office/drawing/2014/main" id="{9E739E3E-DC5F-4C68-933B-BE0C61D4C9C0}"/>
+              </a:ext>
+            </a:extLst>
+          </p:cNvPr>
+          <p:cNvSpPr/>
+          <p:nvPr/>
+        </p:nvSpPr>
+        <p:spPr>
+          <a:xfrm>
+            <a:off x="6905739" y="2401677"/>
+            <a:ext cx="2524700" cy="616944"/>
+          </a:xfrm>
+          <a:prstGeom prst="rect">
+            <a:avLst/>
+          </a:prstGeom>
+          <a:solidFill>
+            <a:srgbClr val="92D050"/>
+          </a:solidFill>
+          <a:ln>
+            <a:noFill/>
+          </a:ln>
+        </p:spPr>
+        <p:style>
+          <a:lnRef idx="2">
+            <a:schemeClr val="accent1">
+              <a:shade val="50000"/>
+            </a:schemeClr>
+          </a:lnRef>
+          <a:fillRef idx="1">
+            <a:schemeClr val="accent1"/>
+          </a:fillRef>
+          <a:effectRef idx="0">
+            <a:schemeClr val="accent1"/>
+          </a:effectRef>
+          <a:fontRef idx="minor">
+            <a:schemeClr val="lt1"/>
+          </a:fontRef>
+        </p:style>
+        <p:txBody>
+          <a:bodyPr rtlCol="0" anchor="ctr"/>
+          <a:lstStyle/>
+          <a:p>
+            <a:pPr algn="ctr"/>
+            <a:r>
+              <a:rPr lang="en-US" sz="1600" b="1" dirty="0" err="1">
+                <a:solidFill>
+                  <a:schemeClr val="tx1"/>
+                </a:solidFill>
+              </a:rPr>
+              <a:t>passedVariablesSubprocess</a:t>
+            </a:r>
+            <a:endParaRPr lang="en-CH" sz="1600" b="1" dirty="0">
+              <a:solidFill>
+                <a:schemeClr val="tx1"/>
+              </a:solidFill>
+            </a:endParaRPr>
+          </a:p>
+        </p:txBody>
+      </p:sp>
+      <p:cxnSp>
+        <p:nvCxnSpPr>
+          <p:cNvPr id="9" name="Straight Arrow Connector 8">
+            <a:extLst>
+              <a:ext uri="{FF2B5EF4-FFF2-40B4-BE49-F238E27FC236}">
+                <a16:creationId xmlns:a16="http://schemas.microsoft.com/office/drawing/2014/main" id="{4E6446CB-B382-4C8F-8977-7871D5184930}"/>
+              </a:ext>
+            </a:extLst>
+          </p:cNvPr>
+          <p:cNvCxnSpPr>
+            <a:cxnSpLocks/>
+            <a:stCxn id="6" idx="3"/>
+            <a:endCxn id="7" idx="0"/>
+          </p:cNvCxnSpPr>
+          <p:nvPr/>
+        </p:nvCxnSpPr>
+        <p:spPr>
+          <a:xfrm>
+            <a:off x="3095740" y="2093205"/>
+            <a:ext cx="5072349" cy="308472"/>
+          </a:xfrm>
+          <a:prstGeom prst="bentConnector2">
+            <a:avLst/>
+          </a:prstGeom>
+          <a:ln>
+            <a:solidFill>
+              <a:schemeClr val="tx1"/>
+            </a:solidFill>
+            <a:tailEnd type="triangle"/>
+          </a:ln>
+        </p:spPr>
+        <p:style>
+          <a:lnRef idx="1">
+            <a:schemeClr val="accent1"/>
+          </a:lnRef>
+          <a:fillRef idx="0">
+            <a:schemeClr val="accent1"/>
+          </a:fillRef>
+          <a:effectRef idx="0">
+            <a:schemeClr val="accent1"/>
+          </a:effectRef>
+          <a:fontRef idx="minor">
+            <a:schemeClr val="tx1"/>
+          </a:fontRef>
+        </p:style>
+      </p:cxnSp>
+      <p:sp>
+        <p:nvSpPr>
+          <p:cNvPr id="12" name="TextBox 11">
+            <a:extLst>
+              <a:ext uri="{FF2B5EF4-FFF2-40B4-BE49-F238E27FC236}">
+                <a16:creationId xmlns:a16="http://schemas.microsoft.com/office/drawing/2014/main" id="{EAE37855-6F3C-4067-B984-CD2492AB359F}"/>
+              </a:ext>
+            </a:extLst>
+          </p:cNvPr>
+          <p:cNvSpPr txBox="1"/>
+          <p:nvPr/>
+        </p:nvSpPr>
+        <p:spPr>
+          <a:xfrm>
+            <a:off x="3272010" y="1784733"/>
+            <a:ext cx="4896079" cy="261610"/>
+          </a:xfrm>
+          <a:prstGeom prst="rect">
+            <a:avLst/>
+          </a:prstGeom>
+          <a:noFill/>
+        </p:spPr>
+        <p:txBody>
+          <a:bodyPr wrap="square" rtlCol="0">
+            <a:spAutoFit/>
+          </a:bodyPr>
+          <a:lstStyle/>
+          <a:p>
+            <a:r>
+              <a:rPr lang="en-US" sz="1100" b="1" dirty="0" err="1"/>
+              <a:t>mainProcessVariable</a:t>
+            </a:r>
+            <a:r>
+              <a:rPr lang="en-US" sz="1100" dirty="0"/>
+              <a:t> (</a:t>
+            </a:r>
+            <a:r>
+              <a:rPr lang="en-US" sz="1100" dirty="0" err="1"/>
+              <a:t>Guten</a:t>
+            </a:r>
+            <a:r>
+              <a:rPr lang="en-US" sz="1100" dirty="0"/>
+              <a:t> Abend) </a:t>
+            </a:r>
+            <a:r>
+              <a:rPr lang="en-US" sz="1100" dirty="0">
+                <a:sym typeface="Wingdings" panose="05000000000000000000" pitchFamily="2" charset="2"/>
+              </a:rPr>
+              <a:t> </a:t>
+            </a:r>
+            <a:r>
+              <a:rPr lang="en-US" sz="1100" b="1" dirty="0" err="1">
+                <a:sym typeface="Wingdings" panose="05000000000000000000" pitchFamily="2" charset="2"/>
+              </a:rPr>
+              <a:t>subprocessVariable</a:t>
+            </a:r>
+            <a:r>
+              <a:rPr lang="en-US" sz="1100" dirty="0">
+                <a:sym typeface="Wingdings" panose="05000000000000000000" pitchFamily="2" charset="2"/>
+              </a:rPr>
+              <a:t> (</a:t>
+            </a:r>
+            <a:r>
+              <a:rPr lang="en-US" sz="1100" dirty="0" err="1">
+                <a:sym typeface="Wingdings" panose="05000000000000000000" pitchFamily="2" charset="2"/>
+              </a:rPr>
+              <a:t>Guten</a:t>
+            </a:r>
+            <a:r>
+              <a:rPr lang="en-US" sz="1100" dirty="0">
+                <a:sym typeface="Wingdings" panose="05000000000000000000" pitchFamily="2" charset="2"/>
+              </a:rPr>
+              <a:t> Abend)</a:t>
+            </a:r>
+            <a:endParaRPr lang="en-CH" sz="1100" dirty="0"/>
+          </a:p>
+        </p:txBody>
+      </p:sp>
+      <p:sp>
+        <p:nvSpPr>
+          <p:cNvPr id="13" name="Rectangle 12">
+            <a:extLst>
+              <a:ext uri="{FF2B5EF4-FFF2-40B4-BE49-F238E27FC236}">
+                <a16:creationId xmlns:a16="http://schemas.microsoft.com/office/drawing/2014/main" id="{23920C12-2F0E-4E6E-B1B6-C1725B65DAE5}"/>
+              </a:ext>
+            </a:extLst>
+          </p:cNvPr>
+          <p:cNvSpPr/>
+          <p:nvPr/>
+        </p:nvSpPr>
+        <p:spPr>
+          <a:xfrm>
+            <a:off x="1123720" y="3018621"/>
+            <a:ext cx="1972020" cy="616944"/>
+          </a:xfrm>
+          <a:prstGeom prst="rect">
+            <a:avLst/>
+          </a:prstGeom>
+          <a:solidFill>
+            <a:srgbClr val="FFFF00"/>
+          </a:solidFill>
+          <a:ln>
+            <a:noFill/>
+          </a:ln>
+        </p:spPr>
+        <p:style>
+          <a:lnRef idx="2">
+            <a:schemeClr val="accent1">
+              <a:shade val="50000"/>
+            </a:schemeClr>
+          </a:lnRef>
+          <a:fillRef idx="1">
+            <a:schemeClr val="accent1"/>
+          </a:fillRef>
+          <a:effectRef idx="0">
+            <a:schemeClr val="accent1"/>
+          </a:effectRef>
+          <a:fontRef idx="minor">
+            <a:schemeClr val="lt1"/>
+          </a:fontRef>
+        </p:style>
+        <p:txBody>
+          <a:bodyPr rtlCol="0" anchor="ctr"/>
+          <a:lstStyle/>
+          <a:p>
+            <a:pPr algn="ctr"/>
+            <a:r>
+              <a:rPr lang="en-US" sz="1600" b="1" dirty="0" err="1">
+                <a:solidFill>
+                  <a:schemeClr val="tx1"/>
+                </a:solidFill>
+              </a:rPr>
+              <a:t>mainProcess</a:t>
+            </a:r>
+            <a:endParaRPr lang="en-CH" sz="1600" b="1" dirty="0">
+              <a:solidFill>
+                <a:schemeClr val="tx1"/>
+              </a:solidFill>
+            </a:endParaRPr>
+          </a:p>
+        </p:txBody>
+      </p:sp>
+      <p:cxnSp>
+        <p:nvCxnSpPr>
+          <p:cNvPr id="14" name="Straight Arrow Connector 8">
+            <a:extLst>
+              <a:ext uri="{FF2B5EF4-FFF2-40B4-BE49-F238E27FC236}">
+                <a16:creationId xmlns:a16="http://schemas.microsoft.com/office/drawing/2014/main" id="{1C6BAE21-619C-4485-928A-0A53268B8049}"/>
+              </a:ext>
+            </a:extLst>
+          </p:cNvPr>
+          <p:cNvCxnSpPr>
+            <a:cxnSpLocks/>
+            <a:stCxn id="7" idx="2"/>
+            <a:endCxn id="13" idx="3"/>
+          </p:cNvCxnSpPr>
+          <p:nvPr/>
+        </p:nvCxnSpPr>
+        <p:spPr>
+          <a:xfrm rot="5400000">
+            <a:off x="5477679" y="636683"/>
+            <a:ext cx="308472" cy="5072349"/>
+          </a:xfrm>
+          <a:prstGeom prst="bentConnector2">
+            <a:avLst/>
+          </a:prstGeom>
+          <a:ln>
+            <a:solidFill>
+              <a:schemeClr val="tx1"/>
+            </a:solidFill>
+            <a:tailEnd type="triangle"/>
+          </a:ln>
+        </p:spPr>
+        <p:style>
+          <a:lnRef idx="1">
+            <a:schemeClr val="accent1"/>
+          </a:lnRef>
+          <a:fillRef idx="0">
+            <a:schemeClr val="accent1"/>
+          </a:fillRef>
+          <a:effectRef idx="0">
+            <a:schemeClr val="accent1"/>
+          </a:effectRef>
+          <a:fontRef idx="minor">
+            <a:schemeClr val="tx1"/>
+          </a:fontRef>
+        </p:style>
+      </p:cxnSp>
+      <p:sp>
+        <p:nvSpPr>
+          <p:cNvPr id="18" name="TextBox 17">
+            <a:extLst>
+              <a:ext uri="{FF2B5EF4-FFF2-40B4-BE49-F238E27FC236}">
+                <a16:creationId xmlns:a16="http://schemas.microsoft.com/office/drawing/2014/main" id="{516E00E7-BED0-4B70-8F5D-8291B12EA517}"/>
+              </a:ext>
+            </a:extLst>
+          </p:cNvPr>
+          <p:cNvSpPr txBox="1"/>
+          <p:nvPr/>
+        </p:nvSpPr>
+        <p:spPr>
+          <a:xfrm>
+            <a:off x="3272010" y="3043448"/>
+            <a:ext cx="4896079" cy="261610"/>
+          </a:xfrm>
+          <a:prstGeom prst="rect">
+            <a:avLst/>
+          </a:prstGeom>
+          <a:noFill/>
+        </p:spPr>
+        <p:txBody>
+          <a:bodyPr wrap="square" rtlCol="0">
+            <a:spAutoFit/>
+          </a:bodyPr>
+          <a:lstStyle/>
+          <a:p>
+            <a:r>
+              <a:rPr lang="en-US" sz="1100" b="1" dirty="0" err="1"/>
+              <a:t>mainProcessVariable</a:t>
+            </a:r>
+            <a:r>
+              <a:rPr lang="en-US" sz="1100" dirty="0"/>
+              <a:t> (Magandang Gabi) </a:t>
+            </a:r>
+            <a:r>
+              <a:rPr lang="en-US" sz="1100" dirty="0">
+                <a:sym typeface="Wingdings" panose="05000000000000000000" pitchFamily="2" charset="2"/>
+              </a:rPr>
+              <a:t> </a:t>
+            </a:r>
+            <a:r>
+              <a:rPr lang="en-US" sz="1100" b="1" dirty="0" err="1">
+                <a:sym typeface="Wingdings" panose="05000000000000000000" pitchFamily="2" charset="2"/>
+              </a:rPr>
+              <a:t>subprocessVariable</a:t>
+            </a:r>
+            <a:r>
+              <a:rPr lang="en-US" sz="1100" dirty="0">
+                <a:sym typeface="Wingdings" panose="05000000000000000000" pitchFamily="2" charset="2"/>
+              </a:rPr>
+              <a:t> (Magandang Gabi)</a:t>
+            </a:r>
+            <a:endParaRPr lang="en-CH" sz="1100" dirty="0"/>
+          </a:p>
+        </p:txBody>
+      </p:sp>
+      <p:sp>
+        <p:nvSpPr>
+          <p:cNvPr id="25" name="Arrow: Curved Left 24">
+            <a:extLst>
+              <a:ext uri="{FF2B5EF4-FFF2-40B4-BE49-F238E27FC236}">
+                <a16:creationId xmlns:a16="http://schemas.microsoft.com/office/drawing/2014/main" id="{AF712F29-63C7-4DEB-8FE5-3488EA185B4F}"/>
+              </a:ext>
+            </a:extLst>
+          </p:cNvPr>
+          <p:cNvSpPr/>
+          <p:nvPr/>
+        </p:nvSpPr>
+        <p:spPr>
+          <a:xfrm>
+            <a:off x="9606709" y="2445744"/>
+            <a:ext cx="605928" cy="528810"/>
+          </a:xfrm>
+          <a:prstGeom prst="curvedLeftArrow">
+            <a:avLst/>
+          </a:prstGeom>
+          <a:noFill/>
+          <a:ln>
+            <a:solidFill>
+              <a:schemeClr val="tx1"/>
+            </a:solidFill>
+          </a:ln>
+        </p:spPr>
+        <p:style>
+          <a:lnRef idx="2">
+            <a:schemeClr val="accent1">
+              <a:shade val="50000"/>
+            </a:schemeClr>
+          </a:lnRef>
+          <a:fillRef idx="1">
+            <a:schemeClr val="accent1"/>
+          </a:fillRef>
+          <a:effectRef idx="0">
+            <a:schemeClr val="accent1"/>
+          </a:effectRef>
+          <a:fontRef idx="minor">
+            <a:schemeClr val="lt1"/>
+          </a:fontRef>
+        </p:style>
+        <p:txBody>
+          <a:bodyPr rtlCol="0" anchor="ctr"/>
+          <a:lstStyle/>
+          <a:p>
+            <a:pPr algn="ctr"/>
+            <a:endParaRPr lang="en-CH">
+              <a:solidFill>
+                <a:schemeClr val="tx1"/>
+              </a:solidFill>
+            </a:endParaRPr>
+          </a:p>
+        </p:txBody>
+      </p:sp>
+      <p:sp>
+        <p:nvSpPr>
+          <p:cNvPr id="26" name="TextBox 25">
+            <a:extLst>
+              <a:ext uri="{FF2B5EF4-FFF2-40B4-BE49-F238E27FC236}">
+                <a16:creationId xmlns:a16="http://schemas.microsoft.com/office/drawing/2014/main" id="{24EF1B53-0A0E-4C27-BB0D-42BA17A19A12}"/>
+              </a:ext>
+            </a:extLst>
+          </p:cNvPr>
+          <p:cNvSpPr txBox="1"/>
+          <p:nvPr/>
+        </p:nvSpPr>
+        <p:spPr>
+          <a:xfrm>
+            <a:off x="9430439" y="2115240"/>
+            <a:ext cx="2809302" cy="261610"/>
+          </a:xfrm>
+          <a:prstGeom prst="rect">
+            <a:avLst/>
+          </a:prstGeom>
+          <a:noFill/>
+        </p:spPr>
+        <p:txBody>
+          <a:bodyPr wrap="square" rtlCol="0">
+            <a:spAutoFit/>
+          </a:bodyPr>
+          <a:lstStyle/>
+          <a:p>
+            <a:r>
+              <a:rPr lang="en-US" sz="1100" dirty="0"/>
+              <a:t>SET</a:t>
+            </a:r>
+            <a:r>
+              <a:rPr lang="en-US" sz="1100" b="1" dirty="0"/>
+              <a:t> </a:t>
+            </a:r>
+            <a:r>
+              <a:rPr lang="en-US" sz="1100" b="1" dirty="0" err="1"/>
+              <a:t>subprocessVariable</a:t>
+            </a:r>
+            <a:r>
+              <a:rPr lang="en-US" sz="1100" b="1" dirty="0"/>
+              <a:t> </a:t>
+            </a:r>
+            <a:r>
+              <a:rPr lang="en-US" sz="1100" dirty="0"/>
+              <a:t>TO</a:t>
+            </a:r>
+            <a:r>
+              <a:rPr lang="en-US" sz="1100" b="1" dirty="0"/>
+              <a:t> </a:t>
+            </a:r>
+            <a:r>
+              <a:rPr lang="en-US" sz="1100" dirty="0"/>
+              <a:t>Magandang Gabi</a:t>
+            </a:r>
+            <a:endParaRPr lang="en-CH" sz="1100" dirty="0"/>
+          </a:p>
+        </p:txBody>
+      </p:sp>
+      <p:sp>
+        <p:nvSpPr>
+          <p:cNvPr id="27" name="Rectangle 26">
+            <a:extLst>
+              <a:ext uri="{FF2B5EF4-FFF2-40B4-BE49-F238E27FC236}">
+                <a16:creationId xmlns:a16="http://schemas.microsoft.com/office/drawing/2014/main" id="{9518CDA2-5CA2-48A3-8568-CF20F1AAF562}"/>
+              </a:ext>
+            </a:extLst>
+          </p:cNvPr>
+          <p:cNvSpPr/>
+          <p:nvPr/>
+        </p:nvSpPr>
+        <p:spPr>
+          <a:xfrm>
+            <a:off x="1123720" y="4120307"/>
+            <a:ext cx="1972020" cy="616944"/>
+          </a:xfrm>
+          <a:prstGeom prst="rect">
+            <a:avLst/>
+          </a:prstGeom>
+          <a:solidFill>
+            <a:srgbClr val="FFFF00"/>
+          </a:solidFill>
+          <a:ln>
+            <a:noFill/>
+          </a:ln>
+        </p:spPr>
+        <p:style>
+          <a:lnRef idx="2">
+            <a:schemeClr val="accent1">
+              <a:shade val="50000"/>
+            </a:schemeClr>
+          </a:lnRef>
+          <a:fillRef idx="1">
+            <a:schemeClr val="accent1"/>
+          </a:fillRef>
+          <a:effectRef idx="0">
+            <a:schemeClr val="accent1"/>
+          </a:effectRef>
+          <a:fontRef idx="minor">
+            <a:schemeClr val="lt1"/>
+          </a:fontRef>
+        </p:style>
+        <p:txBody>
+          <a:bodyPr rtlCol="0" anchor="ctr"/>
+          <a:lstStyle/>
+          <a:p>
+            <a:pPr algn="ctr"/>
+            <a:r>
+              <a:rPr lang="en-US" sz="1600" b="1" dirty="0" err="1">
+                <a:solidFill>
+                  <a:schemeClr val="tx1"/>
+                </a:solidFill>
+              </a:rPr>
+              <a:t>mainProcess</a:t>
+            </a:r>
+            <a:endParaRPr lang="en-CH" sz="1600" b="1" dirty="0">
+              <a:solidFill>
+                <a:schemeClr val="tx1"/>
+              </a:solidFill>
+            </a:endParaRPr>
+          </a:p>
+        </p:txBody>
+      </p:sp>
+      <p:cxnSp>
+        <p:nvCxnSpPr>
+          <p:cNvPr id="30" name="Straight Arrow Connector 8">
+            <a:extLst>
+              <a:ext uri="{FF2B5EF4-FFF2-40B4-BE49-F238E27FC236}">
+                <a16:creationId xmlns:a16="http://schemas.microsoft.com/office/drawing/2014/main" id="{127D38B7-5BD2-4034-83C3-BD1D25A681F2}"/>
+              </a:ext>
+            </a:extLst>
+          </p:cNvPr>
+          <p:cNvCxnSpPr>
+            <a:cxnSpLocks/>
+            <a:stCxn id="13" idx="2"/>
+            <a:endCxn id="27" idx="0"/>
+          </p:cNvCxnSpPr>
+          <p:nvPr/>
+        </p:nvCxnSpPr>
+        <p:spPr>
+          <a:xfrm>
+            <a:off x="2109730" y="3635565"/>
+            <a:ext cx="0" cy="484742"/>
+          </a:xfrm>
+          <a:prstGeom prst="straightConnector1">
+            <a:avLst/>
+          </a:prstGeom>
+          <a:ln>
+            <a:solidFill>
+              <a:schemeClr val="tx1"/>
+            </a:solidFill>
+            <a:tailEnd type="triangle"/>
+          </a:ln>
+        </p:spPr>
+        <p:style>
+          <a:lnRef idx="1">
+            <a:schemeClr val="accent1"/>
+          </a:lnRef>
+          <a:fillRef idx="0">
+            <a:schemeClr val="accent1"/>
+          </a:fillRef>
+          <a:effectRef idx="0">
+            <a:schemeClr val="accent1"/>
+          </a:effectRef>
+          <a:fontRef idx="minor">
+            <a:schemeClr val="tx1"/>
+          </a:fontRef>
+        </p:style>
+      </p:cxnSp>
+      <p:sp>
+        <p:nvSpPr>
+          <p:cNvPr id="35" name="TextBox 34">
+            <a:extLst>
+              <a:ext uri="{FF2B5EF4-FFF2-40B4-BE49-F238E27FC236}">
+                <a16:creationId xmlns:a16="http://schemas.microsoft.com/office/drawing/2014/main" id="{DA197977-3DE8-407B-B444-288F398CFE9E}"/>
+              </a:ext>
+            </a:extLst>
+          </p:cNvPr>
+          <p:cNvSpPr txBox="1"/>
+          <p:nvPr/>
+        </p:nvSpPr>
+        <p:spPr>
+          <a:xfrm>
+            <a:off x="2109730" y="3723698"/>
+            <a:ext cx="2671590" cy="261610"/>
+          </a:xfrm>
+          <a:prstGeom prst="rect">
+            <a:avLst/>
+          </a:prstGeom>
+          <a:noFill/>
+        </p:spPr>
+        <p:txBody>
+          <a:bodyPr wrap="square" rtlCol="0">
+            <a:spAutoFit/>
+          </a:bodyPr>
+          <a:lstStyle/>
+          <a:p>
+            <a:r>
+              <a:rPr lang="en-US" sz="1100" b="1" dirty="0" err="1"/>
+              <a:t>mainProcessVariable</a:t>
+            </a:r>
+            <a:r>
+              <a:rPr lang="en-US" sz="1100" b="1" dirty="0"/>
+              <a:t> = </a:t>
+            </a:r>
+            <a:r>
+              <a:rPr lang="en-US" sz="1100" dirty="0"/>
+              <a:t>Magandang Gabi</a:t>
+            </a:r>
+            <a:endParaRPr lang="en-CH" sz="1100" dirty="0"/>
+          </a:p>
+        </p:txBody>
+      </p:sp>
+      <p:sp>
+        <p:nvSpPr>
+          <p:cNvPr id="36" name="Rectangle 35">
+            <a:extLst>
+              <a:ext uri="{FF2B5EF4-FFF2-40B4-BE49-F238E27FC236}">
+                <a16:creationId xmlns:a16="http://schemas.microsoft.com/office/drawing/2014/main" id="{80B44E9E-F8D9-46B7-9F7F-184FE4FDCF0A}"/>
+              </a:ext>
+            </a:extLst>
+          </p:cNvPr>
+          <p:cNvSpPr/>
+          <p:nvPr/>
+        </p:nvSpPr>
+        <p:spPr>
+          <a:xfrm>
+            <a:off x="6905739" y="4702367"/>
+            <a:ext cx="2700970" cy="616944"/>
+          </a:xfrm>
+          <a:prstGeom prst="rect">
+            <a:avLst/>
+          </a:prstGeom>
+          <a:solidFill>
+            <a:srgbClr val="00B0F0"/>
+          </a:solidFill>
+          <a:ln>
+            <a:noFill/>
+          </a:ln>
+        </p:spPr>
+        <p:style>
+          <a:lnRef idx="2">
+            <a:schemeClr val="accent1">
+              <a:shade val="50000"/>
+            </a:schemeClr>
+          </a:lnRef>
+          <a:fillRef idx="1">
+            <a:schemeClr val="accent1"/>
+          </a:fillRef>
+          <a:effectRef idx="0">
+            <a:schemeClr val="accent1"/>
+          </a:effectRef>
+          <a:fontRef idx="minor">
+            <a:schemeClr val="lt1"/>
+          </a:fontRef>
+        </p:style>
+        <p:txBody>
+          <a:bodyPr rtlCol="0" anchor="ctr"/>
+          <a:lstStyle/>
+          <a:p>
+            <a:pPr algn="ctr"/>
+            <a:r>
+              <a:rPr lang="en-US" sz="1600" b="1" dirty="0" err="1">
+                <a:solidFill>
+                  <a:schemeClr val="tx1"/>
+                </a:solidFill>
+              </a:rPr>
+              <a:t>inheritedVariablesSubprocess</a:t>
+            </a:r>
+            <a:endParaRPr lang="en-CH" sz="1600" b="1" dirty="0">
+              <a:solidFill>
+                <a:schemeClr val="tx1"/>
+              </a:solidFill>
+            </a:endParaRPr>
+          </a:p>
+        </p:txBody>
+      </p:sp>
+      <p:cxnSp>
+        <p:nvCxnSpPr>
+          <p:cNvPr id="37" name="Straight Arrow Connector 8">
+            <a:extLst>
+              <a:ext uri="{FF2B5EF4-FFF2-40B4-BE49-F238E27FC236}">
+                <a16:creationId xmlns:a16="http://schemas.microsoft.com/office/drawing/2014/main" id="{2DB3A601-693C-44D9-BEAB-1E11611A9D76}"/>
+              </a:ext>
+            </a:extLst>
+          </p:cNvPr>
+          <p:cNvCxnSpPr>
+            <a:cxnSpLocks/>
+            <a:stCxn id="27" idx="3"/>
+            <a:endCxn id="36" idx="0"/>
+          </p:cNvCxnSpPr>
+          <p:nvPr/>
+        </p:nvCxnSpPr>
+        <p:spPr>
+          <a:xfrm>
+            <a:off x="3095740" y="4428779"/>
+            <a:ext cx="5160484" cy="273588"/>
+          </a:xfrm>
+          <a:prstGeom prst="bentConnector2">
+            <a:avLst/>
+          </a:prstGeom>
+          <a:ln>
+            <a:solidFill>
+              <a:schemeClr val="tx1"/>
+            </a:solidFill>
+            <a:tailEnd type="triangle"/>
+          </a:ln>
+        </p:spPr>
+        <p:style>
+          <a:lnRef idx="1">
+            <a:schemeClr val="accent1"/>
+          </a:lnRef>
+          <a:fillRef idx="0">
+            <a:schemeClr val="accent1"/>
+          </a:fillRef>
+          <a:effectRef idx="0">
+            <a:schemeClr val="accent1"/>
+          </a:effectRef>
+          <a:fontRef idx="minor">
+            <a:schemeClr val="tx1"/>
+          </a:fontRef>
+        </p:style>
+      </p:cxnSp>
+      <p:sp>
+        <p:nvSpPr>
+          <p:cNvPr id="41" name="TextBox 40">
+            <a:extLst>
+              <a:ext uri="{FF2B5EF4-FFF2-40B4-BE49-F238E27FC236}">
+                <a16:creationId xmlns:a16="http://schemas.microsoft.com/office/drawing/2014/main" id="{B197500E-3AF6-4078-8EB0-A58EF60DBFD3}"/>
+              </a:ext>
+            </a:extLst>
+          </p:cNvPr>
+          <p:cNvSpPr txBox="1"/>
+          <p:nvPr/>
+        </p:nvSpPr>
+        <p:spPr>
+          <a:xfrm>
+            <a:off x="3272009" y="4167169"/>
+            <a:ext cx="4896079" cy="261610"/>
+          </a:xfrm>
+          <a:prstGeom prst="rect">
+            <a:avLst/>
+          </a:prstGeom>
+          <a:noFill/>
+        </p:spPr>
+        <p:txBody>
+          <a:bodyPr wrap="square" rtlCol="0">
+            <a:spAutoFit/>
+          </a:bodyPr>
+          <a:lstStyle/>
+          <a:p>
+            <a:r>
+              <a:rPr lang="en-US" sz="1100" b="1" dirty="0"/>
+              <a:t>inherit </a:t>
+            </a:r>
+            <a:r>
+              <a:rPr lang="en-US" sz="1100" b="1" dirty="0" err="1"/>
+              <a:t>mainProcessVariable</a:t>
+            </a:r>
+            <a:r>
+              <a:rPr lang="en-US" sz="1100" dirty="0"/>
+              <a:t> (Magandang Gabi)</a:t>
+            </a:r>
+            <a:endParaRPr lang="en-CH" sz="1100" dirty="0"/>
+          </a:p>
+        </p:txBody>
+      </p:sp>
+      <p:sp>
+        <p:nvSpPr>
+          <p:cNvPr id="42" name="Arrow: Curved Left 41">
+            <a:extLst>
+              <a:ext uri="{FF2B5EF4-FFF2-40B4-BE49-F238E27FC236}">
+                <a16:creationId xmlns:a16="http://schemas.microsoft.com/office/drawing/2014/main" id="{B37CDD47-203F-4175-AB02-55C0011A19BD}"/>
+              </a:ext>
+            </a:extLst>
+          </p:cNvPr>
+          <p:cNvSpPr/>
+          <p:nvPr/>
+        </p:nvSpPr>
+        <p:spPr>
+          <a:xfrm>
+            <a:off x="9726058" y="4790501"/>
+            <a:ext cx="605928" cy="528810"/>
+          </a:xfrm>
+          <a:prstGeom prst="curvedLeftArrow">
+            <a:avLst/>
+          </a:prstGeom>
+          <a:noFill/>
+          <a:ln>
+            <a:solidFill>
+              <a:schemeClr val="tx1"/>
+            </a:solidFill>
+          </a:ln>
+        </p:spPr>
+        <p:style>
+          <a:lnRef idx="2">
+            <a:schemeClr val="accent1">
+              <a:shade val="50000"/>
+            </a:schemeClr>
+          </a:lnRef>
+          <a:fillRef idx="1">
+            <a:schemeClr val="accent1"/>
+          </a:fillRef>
+          <a:effectRef idx="0">
+            <a:schemeClr val="accent1"/>
+          </a:effectRef>
+          <a:fontRef idx="minor">
+            <a:schemeClr val="lt1"/>
+          </a:fontRef>
+        </p:style>
+        <p:txBody>
+          <a:bodyPr rtlCol="0" anchor="ctr"/>
+          <a:lstStyle/>
+          <a:p>
+            <a:pPr algn="ctr"/>
+            <a:endParaRPr lang="en-CH">
+              <a:solidFill>
+                <a:schemeClr val="tx1"/>
+              </a:solidFill>
+            </a:endParaRPr>
+          </a:p>
+        </p:txBody>
+      </p:sp>
+      <p:sp>
+        <p:nvSpPr>
+          <p:cNvPr id="43" name="TextBox 42">
+            <a:extLst>
+              <a:ext uri="{FF2B5EF4-FFF2-40B4-BE49-F238E27FC236}">
+                <a16:creationId xmlns:a16="http://schemas.microsoft.com/office/drawing/2014/main" id="{9A6BAE37-8678-440B-93F6-22F337318FB9}"/>
+              </a:ext>
+            </a:extLst>
+          </p:cNvPr>
+          <p:cNvSpPr txBox="1"/>
+          <p:nvPr/>
+        </p:nvSpPr>
+        <p:spPr>
+          <a:xfrm>
+            <a:off x="9430439" y="4385751"/>
+            <a:ext cx="2809302" cy="261610"/>
+          </a:xfrm>
+          <a:prstGeom prst="rect">
+            <a:avLst/>
+          </a:prstGeom>
+          <a:noFill/>
+        </p:spPr>
+        <p:txBody>
+          <a:bodyPr wrap="square" rtlCol="0">
+            <a:spAutoFit/>
+          </a:bodyPr>
+          <a:lstStyle/>
+          <a:p>
+            <a:r>
+              <a:rPr lang="en-US" sz="1100" dirty="0"/>
+              <a:t>SET</a:t>
+            </a:r>
+            <a:r>
+              <a:rPr lang="en-US" sz="1100" b="1" dirty="0"/>
+              <a:t> </a:t>
+            </a:r>
+            <a:r>
+              <a:rPr lang="en-US" sz="1100" b="1" dirty="0" err="1"/>
+              <a:t>mainProcessVariable</a:t>
+            </a:r>
+            <a:r>
+              <a:rPr lang="en-US" sz="1100" b="1" dirty="0"/>
+              <a:t> </a:t>
+            </a:r>
+            <a:r>
+              <a:rPr lang="en-US" sz="1100" dirty="0"/>
+              <a:t>TO</a:t>
+            </a:r>
+            <a:r>
+              <a:rPr lang="en-US" sz="1100" b="1" dirty="0"/>
+              <a:t> </a:t>
+            </a:r>
+            <a:r>
+              <a:rPr lang="en-US" sz="1100" dirty="0"/>
+              <a:t>Good Evening</a:t>
+            </a:r>
+            <a:endParaRPr lang="en-CH" sz="1100" dirty="0"/>
+          </a:p>
+        </p:txBody>
+      </p:sp>
+      <p:sp>
+        <p:nvSpPr>
+          <p:cNvPr id="44" name="Rectangle 43">
+            <a:extLst>
+              <a:ext uri="{FF2B5EF4-FFF2-40B4-BE49-F238E27FC236}">
+                <a16:creationId xmlns:a16="http://schemas.microsoft.com/office/drawing/2014/main" id="{961F2CA4-71AB-4D6D-8E50-7E8CAA4E58B7}"/>
+              </a:ext>
+            </a:extLst>
+          </p:cNvPr>
+          <p:cNvSpPr/>
+          <p:nvPr/>
+        </p:nvSpPr>
+        <p:spPr>
+          <a:xfrm>
+            <a:off x="1123720" y="5264225"/>
+            <a:ext cx="1972020" cy="616944"/>
+          </a:xfrm>
+          <a:prstGeom prst="rect">
+            <a:avLst/>
+          </a:prstGeom>
+          <a:solidFill>
+            <a:srgbClr val="FFFF00"/>
+          </a:solidFill>
+          <a:ln>
+            <a:noFill/>
+          </a:ln>
+        </p:spPr>
+        <p:style>
+          <a:lnRef idx="2">
+            <a:schemeClr val="accent1">
+              <a:shade val="50000"/>
+            </a:schemeClr>
+          </a:lnRef>
+          <a:fillRef idx="1">
+            <a:schemeClr val="accent1"/>
+          </a:fillRef>
+          <a:effectRef idx="0">
+            <a:schemeClr val="accent1"/>
+          </a:effectRef>
+          <a:fontRef idx="minor">
+            <a:schemeClr val="lt1"/>
+          </a:fontRef>
+        </p:style>
+        <p:txBody>
+          <a:bodyPr rtlCol="0" anchor="ctr"/>
+          <a:lstStyle/>
+          <a:p>
+            <a:pPr algn="ctr"/>
+            <a:r>
+              <a:rPr lang="en-US" sz="1600" b="1" dirty="0" err="1">
+                <a:solidFill>
+                  <a:schemeClr val="tx1"/>
+                </a:solidFill>
+              </a:rPr>
+              <a:t>mainProcess</a:t>
+            </a:r>
+            <a:endParaRPr lang="en-CH" sz="1600" b="1" dirty="0">
+              <a:solidFill>
+                <a:schemeClr val="tx1"/>
+              </a:solidFill>
+            </a:endParaRPr>
+          </a:p>
+        </p:txBody>
+      </p:sp>
+      <p:cxnSp>
+        <p:nvCxnSpPr>
+          <p:cNvPr id="46" name="Straight Arrow Connector 8">
+            <a:extLst>
+              <a:ext uri="{FF2B5EF4-FFF2-40B4-BE49-F238E27FC236}">
+                <a16:creationId xmlns:a16="http://schemas.microsoft.com/office/drawing/2014/main" id="{FE027F56-EEB9-41E3-B401-48D7CFC71656}"/>
+              </a:ext>
+            </a:extLst>
+          </p:cNvPr>
+          <p:cNvCxnSpPr>
+            <a:cxnSpLocks/>
+            <a:stCxn id="36" idx="2"/>
+            <a:endCxn id="44" idx="3"/>
+          </p:cNvCxnSpPr>
+          <p:nvPr/>
+        </p:nvCxnSpPr>
+        <p:spPr>
+          <a:xfrm rot="5400000">
+            <a:off x="5549289" y="2865762"/>
+            <a:ext cx="253386" cy="5160484"/>
+          </a:xfrm>
+          <a:prstGeom prst="bentConnector2">
+            <a:avLst/>
+          </a:prstGeom>
+          <a:ln>
+            <a:solidFill>
+              <a:schemeClr val="tx1"/>
+            </a:solidFill>
+            <a:tailEnd type="triangle"/>
+          </a:ln>
+        </p:spPr>
+        <p:style>
+          <a:lnRef idx="1">
+            <a:schemeClr val="accent1"/>
+          </a:lnRef>
+          <a:fillRef idx="0">
+            <a:schemeClr val="accent1"/>
+          </a:fillRef>
+          <a:effectRef idx="0">
+            <a:schemeClr val="accent1"/>
+          </a:effectRef>
+          <a:fontRef idx="minor">
+            <a:schemeClr val="tx1"/>
+          </a:fontRef>
+        </p:style>
+      </p:cxnSp>
+      <p:sp>
+        <p:nvSpPr>
+          <p:cNvPr id="50" name="TextBox 49">
+            <a:extLst>
+              <a:ext uri="{FF2B5EF4-FFF2-40B4-BE49-F238E27FC236}">
+                <a16:creationId xmlns:a16="http://schemas.microsoft.com/office/drawing/2014/main" id="{4B31727C-505A-4774-86E3-98786B4100E5}"/>
+              </a:ext>
+            </a:extLst>
+          </p:cNvPr>
+          <p:cNvSpPr txBox="1"/>
+          <p:nvPr/>
+        </p:nvSpPr>
+        <p:spPr>
+          <a:xfrm>
+            <a:off x="3272009" y="5304660"/>
+            <a:ext cx="4896079" cy="261610"/>
+          </a:xfrm>
+          <a:prstGeom prst="rect">
+            <a:avLst/>
+          </a:prstGeom>
+          <a:noFill/>
+        </p:spPr>
+        <p:txBody>
+          <a:bodyPr wrap="square" rtlCol="0">
+            <a:spAutoFit/>
+          </a:bodyPr>
+          <a:lstStyle/>
+          <a:p>
+            <a:r>
+              <a:rPr lang="en-US" sz="1100" b="1" dirty="0"/>
+              <a:t>NOTHING HAPPENS HERE!</a:t>
+            </a:r>
+            <a:endParaRPr lang="en-CH" sz="1100" dirty="0"/>
+          </a:p>
+        </p:txBody>
+      </p:sp>
+      <p:cxnSp>
+        <p:nvCxnSpPr>
+          <p:cNvPr id="53" name="Straight Arrow Connector 8">
+            <a:extLst>
+              <a:ext uri="{FF2B5EF4-FFF2-40B4-BE49-F238E27FC236}">
+                <a16:creationId xmlns:a16="http://schemas.microsoft.com/office/drawing/2014/main" id="{F9E6A421-EC5F-41F7-854F-DE52E78E9337}"/>
+              </a:ext>
+            </a:extLst>
+          </p:cNvPr>
+          <p:cNvCxnSpPr>
+            <a:cxnSpLocks/>
+            <a:stCxn id="44" idx="2"/>
+          </p:cNvCxnSpPr>
+          <p:nvPr/>
+        </p:nvCxnSpPr>
+        <p:spPr>
+          <a:xfrm>
+            <a:off x="2109730" y="5881169"/>
+            <a:ext cx="0" cy="611706"/>
+          </a:xfrm>
+          <a:prstGeom prst="straightConnector1">
+            <a:avLst/>
+          </a:prstGeom>
+          <a:ln>
+            <a:solidFill>
+              <a:schemeClr val="tx1"/>
+            </a:solidFill>
+            <a:tailEnd type="triangle"/>
+          </a:ln>
+        </p:spPr>
+        <p:style>
+          <a:lnRef idx="1">
+            <a:schemeClr val="accent1"/>
+          </a:lnRef>
+          <a:fillRef idx="0">
+            <a:schemeClr val="accent1"/>
+          </a:fillRef>
+          <a:effectRef idx="0">
+            <a:schemeClr val="accent1"/>
+          </a:effectRef>
+          <a:fontRef idx="minor">
+            <a:schemeClr val="tx1"/>
+          </a:fontRef>
+        </p:style>
+      </p:cxnSp>
+      <p:sp>
+        <p:nvSpPr>
+          <p:cNvPr id="56" name="TextBox 55">
+            <a:extLst>
+              <a:ext uri="{FF2B5EF4-FFF2-40B4-BE49-F238E27FC236}">
+                <a16:creationId xmlns:a16="http://schemas.microsoft.com/office/drawing/2014/main" id="{F2076D1E-67C1-4623-B45F-672925F58556}"/>
+              </a:ext>
+            </a:extLst>
+          </p:cNvPr>
+          <p:cNvSpPr txBox="1"/>
+          <p:nvPr/>
+        </p:nvSpPr>
+        <p:spPr>
+          <a:xfrm>
+            <a:off x="2109730" y="5999296"/>
+            <a:ext cx="2671590" cy="261610"/>
+          </a:xfrm>
+          <a:prstGeom prst="rect">
+            <a:avLst/>
+          </a:prstGeom>
+          <a:noFill/>
+        </p:spPr>
+        <p:txBody>
+          <a:bodyPr wrap="square" rtlCol="0">
+            <a:spAutoFit/>
+          </a:bodyPr>
+          <a:lstStyle/>
+          <a:p>
+            <a:r>
+              <a:rPr lang="en-US" sz="1100" b="1" dirty="0" err="1"/>
+              <a:t>mainProcessVariable</a:t>
+            </a:r>
+            <a:r>
+              <a:rPr lang="en-US" sz="1100" b="1" dirty="0"/>
+              <a:t> = </a:t>
+            </a:r>
+            <a:r>
+              <a:rPr lang="en-US" sz="1100" dirty="0"/>
+              <a:t>Magandang Gabi</a:t>
+            </a:r>
+            <a:endParaRPr lang="en-CH" sz="1100" dirty="0"/>
+          </a:p>
+        </p:txBody>
+      </p:sp>
+    </p:spTree>
+    <p:extLst>
+      <p:ext uri="{BB962C8B-B14F-4D97-AF65-F5344CB8AC3E}">
+        <p14:creationId xmlns:p14="http://schemas.microsoft.com/office/powerpoint/2010/main" val="2290336490"/>
+      </p:ext>
+    </p:extLst>
+  </p:cSld>
+  <p:clrMapOvr>
+    <a:masterClrMapping/>
+  </p:clrMapOvr>
+</p:sld>
+</file>
+
+<file path=ppt/slides/slide18.xml><?xml version="1.0" encoding="utf-8"?>
+<p:sld xmlns:a="http://schemas.openxmlformats.org/drawingml/2006/main" xmlns:r="http://schemas.openxmlformats.org/officeDocument/2006/relationships" xmlns:p="http://schemas.openxmlformats.org/presentationml/2006/main">
+  <p:cSld>
+    <p:spTree>
+      <p:nvGrpSpPr>
+        <p:cNvPr id="1" name=""/>
+        <p:cNvGrpSpPr/>
+        <p:nvPr/>
+      </p:nvGrpSpPr>
+      <p:grpSpPr>
+        <a:xfrm>
+          <a:off x="0" y="0"/>
+          <a:ext cx="0" cy="0"/>
+          <a:chOff x="0" y="0"/>
+          <a:chExt cx="0" cy="0"/>
+        </a:xfrm>
+      </p:grpSpPr>
+      <p:sp>
+        <p:nvSpPr>
+          <p:cNvPr id="2" name="Title 1">
+            <a:extLst>
+              <a:ext uri="{FF2B5EF4-FFF2-40B4-BE49-F238E27FC236}">
+                <a16:creationId xmlns:a16="http://schemas.microsoft.com/office/drawing/2014/main" id="{03812D1F-F6DF-42A7-8DA2-1A5A8243FD15}"/>
+              </a:ext>
+            </a:extLst>
+          </p:cNvPr>
+          <p:cNvSpPr>
+            <a:spLocks noGrp="1"/>
+          </p:cNvSpPr>
+          <p:nvPr>
+            <p:ph type="title"/>
+          </p:nvPr>
+        </p:nvSpPr>
+        <p:spPr/>
+        <p:txBody>
+          <a:bodyPr/>
+          <a:lstStyle/>
+          <a:p>
+            <a:r>
+              <a:rPr lang="en-US" dirty="0"/>
               <a:t>Cardinality (1/3)</a:t>
             </a:r>
             <a:endParaRPr lang="en-CH" dirty="0"/>
@@ -6010,7 +7933,7 @@
 </p:sld>
 </file>
 
-<file path=ppt/slides/slide17.xml><?xml version="1.0" encoding="utf-8"?>
+<file path=ppt/slides/slide19.xml><?xml version="1.0" encoding="utf-8"?>
 <p:sld xmlns:a="http://schemas.openxmlformats.org/drawingml/2006/main" xmlns:r="http://schemas.openxmlformats.org/officeDocument/2006/relationships" xmlns:p="http://schemas.openxmlformats.org/presentationml/2006/main">
   <p:cSld>
     <p:spTree>
@@ -6207,677 +8130,6 @@
 </p:sld>
 </file>
 
-<file path=ppt/slides/slide18.xml><?xml version="1.0" encoding="utf-8"?>
-<p:sld xmlns:a="http://schemas.openxmlformats.org/drawingml/2006/main" xmlns:r="http://schemas.openxmlformats.org/officeDocument/2006/relationships" xmlns:p="http://schemas.openxmlformats.org/presentationml/2006/main">
-  <p:cSld>
-    <p:spTree>
-      <p:nvGrpSpPr>
-        <p:cNvPr id="1" name=""/>
-        <p:cNvGrpSpPr/>
-        <p:nvPr/>
-      </p:nvGrpSpPr>
-      <p:grpSpPr>
-        <a:xfrm>
-          <a:off x="0" y="0"/>
-          <a:ext cx="0" cy="0"/>
-          <a:chOff x="0" y="0"/>
-          <a:chExt cx="0" cy="0"/>
-        </a:xfrm>
-      </p:grpSpPr>
-      <p:sp>
-        <p:nvSpPr>
-          <p:cNvPr id="2" name="Title 1">
-            <a:extLst>
-              <a:ext uri="{FF2B5EF4-FFF2-40B4-BE49-F238E27FC236}">
-                <a16:creationId xmlns:a16="http://schemas.microsoft.com/office/drawing/2014/main" id="{03812D1F-F6DF-42A7-8DA2-1A5A8243FD15}"/>
-              </a:ext>
-            </a:extLst>
-          </p:cNvPr>
-          <p:cNvSpPr>
-            <a:spLocks noGrp="1"/>
-          </p:cNvSpPr>
-          <p:nvPr>
-            <p:ph type="title"/>
-          </p:nvPr>
-        </p:nvSpPr>
-        <p:spPr/>
-        <p:txBody>
-          <a:bodyPr/>
-          <a:lstStyle/>
-          <a:p>
-            <a:r>
-              <a:rPr lang="en-US" dirty="0"/>
-              <a:t>Cardinality (3/3)</a:t>
-            </a:r>
-            <a:endParaRPr lang="en-CH" dirty="0"/>
-          </a:p>
-        </p:txBody>
-      </p:sp>
-      <p:sp>
-        <p:nvSpPr>
-          <p:cNvPr id="5" name="Content Placeholder 4">
-            <a:extLst>
-              <a:ext uri="{FF2B5EF4-FFF2-40B4-BE49-F238E27FC236}">
-                <a16:creationId xmlns:a16="http://schemas.microsoft.com/office/drawing/2014/main" id="{3A5FB3D3-4BB6-451A-91DF-53D8A59B2AD4}"/>
-              </a:ext>
-            </a:extLst>
-          </p:cNvPr>
-          <p:cNvSpPr>
-            <a:spLocks noGrp="1"/>
-          </p:cNvSpPr>
-          <p:nvPr>
-            <p:ph idx="1"/>
-          </p:nvPr>
-        </p:nvSpPr>
-        <p:spPr/>
-        <p:txBody>
-          <a:bodyPr>
-            <a:normAutofit/>
-          </a:bodyPr>
-          <a:lstStyle/>
-          <a:p>
-            <a:r>
-              <a:rPr lang="en-US" dirty="0"/>
-              <a:t>Syntax</a:t>
-            </a:r>
-          </a:p>
-          <a:p>
-            <a:pPr lvl="1"/>
-            <a:r>
-              <a:rPr lang="de-CH" b="0" i="0" dirty="0">
-                <a:solidFill>
-                  <a:srgbClr val="444444"/>
-                </a:solidFill>
-                <a:effectLst/>
-                <a:latin typeface="SFMono-Regular"/>
-              </a:rPr>
-              <a:t>&lt;</a:t>
-            </a:r>
-            <a:r>
-              <a:rPr lang="de-CH" b="0" i="0" dirty="0" err="1">
-                <a:solidFill>
-                  <a:srgbClr val="444444"/>
-                </a:solidFill>
-                <a:effectLst/>
-                <a:latin typeface="SFMono-Regular"/>
-              </a:rPr>
-              <a:t>multiInstanceLoopCharacteristics</a:t>
-            </a:r>
-            <a:r>
-              <a:rPr lang="de-CH" b="0" i="0" dirty="0">
-                <a:solidFill>
-                  <a:srgbClr val="444444"/>
-                </a:solidFill>
-                <a:effectLst/>
-                <a:latin typeface="SFMono-Regular"/>
-              </a:rPr>
-              <a:t> </a:t>
-            </a:r>
-            <a:r>
-              <a:rPr lang="de-CH" b="0" i="0" dirty="0" err="1">
-                <a:solidFill>
-                  <a:srgbClr val="444444"/>
-                </a:solidFill>
-                <a:effectLst/>
-                <a:latin typeface="SFMono-Regular"/>
-              </a:rPr>
-              <a:t>isSequential</a:t>
-            </a:r>
-            <a:r>
-              <a:rPr lang="de-CH" b="0" i="0" dirty="0">
-                <a:solidFill>
-                  <a:srgbClr val="444444"/>
-                </a:solidFill>
-                <a:effectLst/>
-                <a:latin typeface="SFMono-Regular"/>
-              </a:rPr>
-              <a:t>="</a:t>
-            </a:r>
-            <a:r>
-              <a:rPr lang="de-CH" b="0" i="0" dirty="0" err="1">
-                <a:solidFill>
-                  <a:srgbClr val="444444"/>
-                </a:solidFill>
-                <a:effectLst/>
-                <a:latin typeface="SFMono-Regular"/>
-              </a:rPr>
-              <a:t>false|true</a:t>
-            </a:r>
-            <a:r>
-              <a:rPr lang="de-CH" b="0" i="0" dirty="0">
-                <a:solidFill>
-                  <a:srgbClr val="444444"/>
-                </a:solidFill>
-                <a:effectLst/>
-                <a:latin typeface="SFMono-Regular"/>
-              </a:rPr>
-              <a:t>"&gt; </a:t>
-            </a:r>
-            <a:r>
-              <a:rPr lang="de-CH" b="0" i="0" dirty="0">
-                <a:solidFill>
-                  <a:srgbClr val="444444"/>
-                </a:solidFill>
-                <a:effectLst/>
-                <a:highlight>
-                  <a:srgbClr val="FFFF00"/>
-                </a:highlight>
-                <a:latin typeface="SFMono-Regular"/>
-              </a:rPr>
-              <a:t>&lt;</a:t>
-            </a:r>
-            <a:r>
-              <a:rPr lang="de-CH" b="0" i="0" dirty="0" err="1">
-                <a:solidFill>
-                  <a:srgbClr val="444444"/>
-                </a:solidFill>
-                <a:effectLst/>
-                <a:highlight>
-                  <a:srgbClr val="FFFF00"/>
-                </a:highlight>
-                <a:latin typeface="SFMono-Regular"/>
-              </a:rPr>
-              <a:t>loopCardinality</a:t>
-            </a:r>
-            <a:r>
-              <a:rPr lang="de-CH" b="0" i="0" dirty="0">
-                <a:solidFill>
-                  <a:srgbClr val="444444"/>
-                </a:solidFill>
-                <a:effectLst/>
-                <a:highlight>
-                  <a:srgbClr val="FFFF00"/>
-                </a:highlight>
-                <a:latin typeface="SFMono-Regular"/>
-              </a:rPr>
-              <a:t>&gt;5&lt;/</a:t>
-            </a:r>
-            <a:r>
-              <a:rPr lang="de-CH" b="0" i="0" dirty="0" err="1">
-                <a:solidFill>
-                  <a:srgbClr val="444444"/>
-                </a:solidFill>
-                <a:effectLst/>
-                <a:highlight>
-                  <a:srgbClr val="FFFF00"/>
-                </a:highlight>
-                <a:latin typeface="SFMono-Regular"/>
-              </a:rPr>
-              <a:t>loopCardinality</a:t>
-            </a:r>
-            <a:r>
-              <a:rPr lang="de-CH" b="0" i="0" dirty="0">
-                <a:solidFill>
-                  <a:srgbClr val="444444"/>
-                </a:solidFill>
-                <a:effectLst/>
-                <a:highlight>
-                  <a:srgbClr val="FFFF00"/>
-                </a:highlight>
-                <a:latin typeface="SFMono-Regular"/>
-              </a:rPr>
-              <a:t>&gt; &lt;/</a:t>
-            </a:r>
-            <a:r>
-              <a:rPr lang="de-CH" b="0" i="0" dirty="0" err="1">
-                <a:solidFill>
-                  <a:srgbClr val="444444"/>
-                </a:solidFill>
-                <a:effectLst/>
-                <a:highlight>
-                  <a:srgbClr val="FFFF00"/>
-                </a:highlight>
-                <a:latin typeface="SFMono-Regular"/>
-              </a:rPr>
-              <a:t>multiInstanceLoopCharacteristics</a:t>
-            </a:r>
-            <a:r>
-              <a:rPr lang="de-CH" b="0" i="0" dirty="0">
-                <a:solidFill>
-                  <a:srgbClr val="444444"/>
-                </a:solidFill>
-                <a:effectLst/>
-                <a:highlight>
-                  <a:srgbClr val="FFFF00"/>
-                </a:highlight>
-                <a:latin typeface="SFMono-Regular"/>
-              </a:rPr>
-              <a:t>&gt;</a:t>
-            </a:r>
-            <a:endParaRPr lang="en-US" b="0" i="0" dirty="0">
-              <a:solidFill>
-                <a:srgbClr val="444444"/>
-              </a:solidFill>
-              <a:effectLst/>
-              <a:highlight>
-                <a:srgbClr val="FFFF00"/>
-              </a:highlight>
-              <a:latin typeface="SFMono-Regular"/>
-            </a:endParaRPr>
-          </a:p>
-          <a:p>
-            <a:pPr lvl="1"/>
-            <a:r>
-              <a:rPr lang="de-CH" b="0" i="0" dirty="0">
-                <a:solidFill>
-                  <a:srgbClr val="444444"/>
-                </a:solidFill>
-                <a:effectLst/>
-                <a:latin typeface="SFMono-Regular"/>
-              </a:rPr>
-              <a:t>&lt;</a:t>
-            </a:r>
-            <a:r>
-              <a:rPr lang="de-CH" b="0" i="0" dirty="0" err="1">
-                <a:solidFill>
-                  <a:srgbClr val="444444"/>
-                </a:solidFill>
-                <a:effectLst/>
-                <a:latin typeface="SFMono-Regular"/>
-              </a:rPr>
-              <a:t>multiInstanceLoopCharacteristics</a:t>
-            </a:r>
-            <a:r>
-              <a:rPr lang="de-CH" b="0" i="0" dirty="0">
-                <a:solidFill>
-                  <a:srgbClr val="444444"/>
-                </a:solidFill>
-                <a:effectLst/>
-                <a:latin typeface="SFMono-Regular"/>
-              </a:rPr>
-              <a:t> </a:t>
-            </a:r>
-            <a:r>
-              <a:rPr lang="de-CH" b="0" i="0" dirty="0" err="1">
-                <a:solidFill>
-                  <a:srgbClr val="444444"/>
-                </a:solidFill>
-                <a:effectLst/>
-                <a:latin typeface="SFMono-Regular"/>
-              </a:rPr>
-              <a:t>isSequential</a:t>
-            </a:r>
-            <a:r>
-              <a:rPr lang="de-CH" b="0" i="0" dirty="0">
-                <a:solidFill>
-                  <a:srgbClr val="444444"/>
-                </a:solidFill>
-                <a:effectLst/>
-                <a:latin typeface="SFMono-Regular"/>
-              </a:rPr>
-              <a:t>="</a:t>
-            </a:r>
-            <a:r>
-              <a:rPr lang="de-CH" b="0" i="0" dirty="0" err="1">
-                <a:solidFill>
-                  <a:srgbClr val="444444"/>
-                </a:solidFill>
-                <a:effectLst/>
-                <a:latin typeface="SFMono-Regular"/>
-              </a:rPr>
-              <a:t>false|true</a:t>
-            </a:r>
-            <a:r>
-              <a:rPr lang="de-CH" b="0" i="0" dirty="0">
-                <a:solidFill>
-                  <a:srgbClr val="444444"/>
-                </a:solidFill>
-                <a:effectLst/>
-                <a:latin typeface="SFMono-Regular"/>
-              </a:rPr>
-              <a:t>"&gt; </a:t>
-            </a:r>
-            <a:r>
-              <a:rPr lang="de-CH" b="0" i="0" dirty="0">
-                <a:solidFill>
-                  <a:srgbClr val="444444"/>
-                </a:solidFill>
-                <a:effectLst/>
-                <a:highlight>
-                  <a:srgbClr val="FFFF00"/>
-                </a:highlight>
-                <a:latin typeface="SFMono-Regular"/>
-              </a:rPr>
-              <a:t>&lt;</a:t>
-            </a:r>
-            <a:r>
-              <a:rPr lang="de-CH" b="0" i="0" dirty="0" err="1">
-                <a:solidFill>
-                  <a:srgbClr val="444444"/>
-                </a:solidFill>
-                <a:effectLst/>
-                <a:highlight>
-                  <a:srgbClr val="FFFF00"/>
-                </a:highlight>
-                <a:latin typeface="SFMono-Regular"/>
-              </a:rPr>
-              <a:t>loopCardinality</a:t>
-            </a:r>
-            <a:r>
-              <a:rPr lang="de-CH" b="0" i="0" dirty="0">
-                <a:solidFill>
-                  <a:srgbClr val="444444"/>
-                </a:solidFill>
-                <a:effectLst/>
-                <a:highlight>
-                  <a:srgbClr val="FFFF00"/>
-                </a:highlight>
-                <a:latin typeface="SFMono-Regular"/>
-              </a:rPr>
-              <a:t>&gt;${</a:t>
-            </a:r>
-            <a:r>
-              <a:rPr lang="de-CH" b="0" i="0" dirty="0" err="1">
-                <a:solidFill>
-                  <a:srgbClr val="444444"/>
-                </a:solidFill>
-                <a:effectLst/>
-                <a:highlight>
-                  <a:srgbClr val="FFFF00"/>
-                </a:highlight>
-                <a:latin typeface="SFMono-Regular"/>
-              </a:rPr>
-              <a:t>nrOfOrders-nrOfCancellations</a:t>
-            </a:r>
-            <a:r>
-              <a:rPr lang="de-CH" b="0" i="0" dirty="0">
-                <a:solidFill>
-                  <a:srgbClr val="444444"/>
-                </a:solidFill>
-                <a:effectLst/>
-                <a:highlight>
-                  <a:srgbClr val="FFFF00"/>
-                </a:highlight>
-                <a:latin typeface="SFMono-Regular"/>
-              </a:rPr>
-              <a:t>}&lt;/</a:t>
-            </a:r>
-            <a:r>
-              <a:rPr lang="de-CH" b="0" i="0" dirty="0" err="1">
-                <a:solidFill>
-                  <a:srgbClr val="444444"/>
-                </a:solidFill>
-                <a:effectLst/>
-                <a:highlight>
-                  <a:srgbClr val="FFFF00"/>
-                </a:highlight>
-                <a:latin typeface="SFMono-Regular"/>
-              </a:rPr>
-              <a:t>loopCardinality</a:t>
-            </a:r>
-            <a:r>
-              <a:rPr lang="de-CH" b="0" i="0" dirty="0">
-                <a:solidFill>
-                  <a:srgbClr val="444444"/>
-                </a:solidFill>
-                <a:effectLst/>
-                <a:highlight>
-                  <a:srgbClr val="FFFF00"/>
-                </a:highlight>
-                <a:latin typeface="SFMono-Regular"/>
-              </a:rPr>
-              <a:t>&gt; </a:t>
-            </a:r>
-            <a:r>
-              <a:rPr lang="de-CH" b="0" i="0" dirty="0">
-                <a:solidFill>
-                  <a:srgbClr val="444444"/>
-                </a:solidFill>
-                <a:effectLst/>
-                <a:latin typeface="SFMono-Regular"/>
-              </a:rPr>
-              <a:t>&lt;/</a:t>
-            </a:r>
-            <a:r>
-              <a:rPr lang="de-CH" b="0" i="0" dirty="0" err="1">
-                <a:solidFill>
-                  <a:srgbClr val="444444"/>
-                </a:solidFill>
-                <a:effectLst/>
-                <a:latin typeface="SFMono-Regular"/>
-              </a:rPr>
-              <a:t>multiInstanceLoopCharacteristics</a:t>
-            </a:r>
-            <a:r>
-              <a:rPr lang="de-CH" b="0" i="0" dirty="0">
-                <a:solidFill>
-                  <a:srgbClr val="444444"/>
-                </a:solidFill>
-                <a:effectLst/>
-                <a:latin typeface="SFMono-Regular"/>
-              </a:rPr>
-              <a:t>&gt;</a:t>
-            </a:r>
-            <a:endParaRPr lang="en-US" dirty="0">
-              <a:solidFill>
-                <a:srgbClr val="444444"/>
-              </a:solidFill>
-              <a:latin typeface="SFMono-Regular"/>
-            </a:endParaRPr>
-          </a:p>
-          <a:p>
-            <a:pPr lvl="1"/>
-            <a:r>
-              <a:rPr lang="de-CH" b="0" i="0" dirty="0">
-                <a:solidFill>
-                  <a:srgbClr val="444444"/>
-                </a:solidFill>
-                <a:effectLst/>
-                <a:latin typeface="SFMono-Regular"/>
-              </a:rPr>
-              <a:t>&lt;</a:t>
-            </a:r>
-            <a:r>
-              <a:rPr lang="de-CH" b="0" i="0" dirty="0" err="1">
-                <a:solidFill>
-                  <a:srgbClr val="444444"/>
-                </a:solidFill>
-                <a:effectLst/>
-                <a:latin typeface="SFMono-Regular"/>
-              </a:rPr>
-              <a:t>multiInstanceLoopCharacteristics</a:t>
-            </a:r>
-            <a:r>
-              <a:rPr lang="de-CH" b="0" i="0" dirty="0">
-                <a:solidFill>
-                  <a:srgbClr val="444444"/>
-                </a:solidFill>
-                <a:effectLst/>
-                <a:latin typeface="SFMono-Regular"/>
-              </a:rPr>
-              <a:t> </a:t>
-            </a:r>
-            <a:r>
-              <a:rPr lang="de-CH" b="0" i="0" dirty="0" err="1">
-                <a:solidFill>
-                  <a:srgbClr val="444444"/>
-                </a:solidFill>
-                <a:effectLst/>
-                <a:latin typeface="SFMono-Regular"/>
-              </a:rPr>
-              <a:t>isSequential</a:t>
-            </a:r>
-            <a:r>
-              <a:rPr lang="de-CH" b="0" i="0" dirty="0">
-                <a:solidFill>
-                  <a:srgbClr val="444444"/>
-                </a:solidFill>
-                <a:effectLst/>
-                <a:latin typeface="SFMono-Regular"/>
-              </a:rPr>
-              <a:t>="</a:t>
-            </a:r>
-            <a:r>
-              <a:rPr lang="de-CH" b="0" i="0" dirty="0" err="1">
-                <a:solidFill>
-                  <a:srgbClr val="444444"/>
-                </a:solidFill>
-                <a:effectLst/>
-                <a:latin typeface="SFMono-Regular"/>
-              </a:rPr>
-              <a:t>false</a:t>
-            </a:r>
-            <a:r>
-              <a:rPr lang="de-CH" b="0" i="0" dirty="0">
-                <a:solidFill>
-                  <a:srgbClr val="444444"/>
-                </a:solidFill>
-                <a:effectLst/>
-                <a:latin typeface="SFMono-Regular"/>
-              </a:rPr>
-              <a:t>" </a:t>
-            </a:r>
-            <a:r>
-              <a:rPr lang="de-CH" b="0" i="0" dirty="0" err="1">
-                <a:solidFill>
-                  <a:srgbClr val="444444"/>
-                </a:solidFill>
-                <a:effectLst/>
-                <a:highlight>
-                  <a:srgbClr val="FFFF00"/>
-                </a:highlight>
-                <a:latin typeface="SFMono-Regular"/>
-              </a:rPr>
-              <a:t>flowable:collection</a:t>
-            </a:r>
-            <a:r>
-              <a:rPr lang="de-CH" b="0" i="0" dirty="0">
-                <a:solidFill>
-                  <a:srgbClr val="444444"/>
-                </a:solidFill>
-                <a:effectLst/>
-                <a:highlight>
-                  <a:srgbClr val="FFFF00"/>
-                </a:highlight>
-                <a:latin typeface="SFMono-Regular"/>
-              </a:rPr>
-              <a:t>=«</a:t>
-            </a:r>
-            <a:r>
-              <a:rPr lang="de-CH" b="1" i="0" dirty="0" err="1">
-                <a:solidFill>
-                  <a:srgbClr val="444444"/>
-                </a:solidFill>
-                <a:effectLst/>
-                <a:highlight>
-                  <a:srgbClr val="FFFF00"/>
-                </a:highlight>
-                <a:latin typeface="SFMono-Regular"/>
-              </a:rPr>
-              <a:t>loopList</a:t>
-            </a:r>
-            <a:r>
-              <a:rPr lang="de-CH" b="0" i="0" dirty="0">
-                <a:solidFill>
-                  <a:srgbClr val="444444"/>
-                </a:solidFill>
-                <a:effectLst/>
-                <a:highlight>
-                  <a:srgbClr val="FFFF00"/>
-                </a:highlight>
-                <a:latin typeface="SFMono-Regular"/>
-              </a:rPr>
-              <a:t>" </a:t>
-            </a:r>
-            <a:r>
-              <a:rPr lang="de-CH" b="0" i="0" dirty="0" err="1">
-                <a:solidFill>
-                  <a:srgbClr val="444444"/>
-                </a:solidFill>
-                <a:effectLst/>
-                <a:highlight>
-                  <a:srgbClr val="FFFF00"/>
-                </a:highlight>
-                <a:latin typeface="SFMono-Regular"/>
-              </a:rPr>
-              <a:t>flowable:elementVariable</a:t>
-            </a:r>
-            <a:r>
-              <a:rPr lang="de-CH" b="0" i="0" dirty="0">
-                <a:solidFill>
-                  <a:srgbClr val="444444"/>
-                </a:solidFill>
-                <a:effectLst/>
-                <a:highlight>
-                  <a:srgbClr val="FFFF00"/>
-                </a:highlight>
-                <a:latin typeface="SFMono-Regular"/>
-              </a:rPr>
-              <a:t>=«</a:t>
-            </a:r>
-            <a:r>
-              <a:rPr lang="de-CH" b="1" i="0" dirty="0" err="1">
-                <a:solidFill>
-                  <a:srgbClr val="444444"/>
-                </a:solidFill>
-                <a:effectLst/>
-                <a:highlight>
-                  <a:srgbClr val="FFFF00"/>
-                </a:highlight>
-                <a:latin typeface="SFMono-Regular"/>
-              </a:rPr>
-              <a:t>listItem</a:t>
-            </a:r>
-            <a:r>
-              <a:rPr lang="de-CH" b="0" i="0" dirty="0">
-                <a:solidFill>
-                  <a:srgbClr val="444444"/>
-                </a:solidFill>
-                <a:effectLst/>
-                <a:highlight>
-                  <a:srgbClr val="FFFF00"/>
-                </a:highlight>
-                <a:latin typeface="SFMono-Regular"/>
-              </a:rPr>
-              <a:t>" &gt; </a:t>
-            </a:r>
-            <a:r>
-              <a:rPr lang="de-CH" b="0" i="0" dirty="0">
-                <a:solidFill>
-                  <a:srgbClr val="444444"/>
-                </a:solidFill>
-                <a:effectLst/>
-                <a:latin typeface="SFMono-Regular"/>
-              </a:rPr>
-              <a:t>&lt;/</a:t>
-            </a:r>
-            <a:r>
-              <a:rPr lang="de-CH" b="0" i="0" dirty="0" err="1">
-                <a:solidFill>
-                  <a:srgbClr val="444444"/>
-                </a:solidFill>
-                <a:effectLst/>
-                <a:latin typeface="SFMono-Regular"/>
-              </a:rPr>
-              <a:t>multiInstanceLoopCharacteristics</a:t>
-            </a:r>
-            <a:r>
-              <a:rPr lang="de-CH" b="0" i="0" dirty="0">
-                <a:solidFill>
-                  <a:srgbClr val="444444"/>
-                </a:solidFill>
-                <a:effectLst/>
-                <a:latin typeface="SFMono-Regular"/>
-              </a:rPr>
-              <a:t>&gt;</a:t>
-            </a:r>
-            <a:endParaRPr lang="en-CH" dirty="0"/>
-          </a:p>
-        </p:txBody>
-      </p:sp>
-    </p:spTree>
-    <p:extLst>
-      <p:ext uri="{BB962C8B-B14F-4D97-AF65-F5344CB8AC3E}">
-        <p14:creationId xmlns:p14="http://schemas.microsoft.com/office/powerpoint/2010/main" val="1634682293"/>
-      </p:ext>
-    </p:extLst>
-  </p:cSld>
-  <p:clrMapOvr>
-    <a:masterClrMapping/>
-  </p:clrMapOvr>
-</p:sld>
-</file>
-
 <file path=ppt/slides/slide2.xml><?xml version="1.0" encoding="utf-8"?>
 <p:sld xmlns:a="http://schemas.openxmlformats.org/drawingml/2006/main" xmlns:r="http://schemas.openxmlformats.org/officeDocument/2006/relationships" xmlns:p="http://schemas.openxmlformats.org/presentationml/2006/main">
   <p:cSld>
@@ -6989,6 +8241,677 @@
     <p:extLst>
       <p:ext uri="{BB962C8B-B14F-4D97-AF65-F5344CB8AC3E}">
         <p14:creationId xmlns:p14="http://schemas.microsoft.com/office/powerpoint/2010/main" val="926033395"/>
+      </p:ext>
+    </p:extLst>
+  </p:cSld>
+  <p:clrMapOvr>
+    <a:masterClrMapping/>
+  </p:clrMapOvr>
+</p:sld>
+</file>
+
+<file path=ppt/slides/slide20.xml><?xml version="1.0" encoding="utf-8"?>
+<p:sld xmlns:a="http://schemas.openxmlformats.org/drawingml/2006/main" xmlns:r="http://schemas.openxmlformats.org/officeDocument/2006/relationships" xmlns:p="http://schemas.openxmlformats.org/presentationml/2006/main">
+  <p:cSld>
+    <p:spTree>
+      <p:nvGrpSpPr>
+        <p:cNvPr id="1" name=""/>
+        <p:cNvGrpSpPr/>
+        <p:nvPr/>
+      </p:nvGrpSpPr>
+      <p:grpSpPr>
+        <a:xfrm>
+          <a:off x="0" y="0"/>
+          <a:ext cx="0" cy="0"/>
+          <a:chOff x="0" y="0"/>
+          <a:chExt cx="0" cy="0"/>
+        </a:xfrm>
+      </p:grpSpPr>
+      <p:sp>
+        <p:nvSpPr>
+          <p:cNvPr id="2" name="Title 1">
+            <a:extLst>
+              <a:ext uri="{FF2B5EF4-FFF2-40B4-BE49-F238E27FC236}">
+                <a16:creationId xmlns:a16="http://schemas.microsoft.com/office/drawing/2014/main" id="{03812D1F-F6DF-42A7-8DA2-1A5A8243FD15}"/>
+              </a:ext>
+            </a:extLst>
+          </p:cNvPr>
+          <p:cNvSpPr>
+            <a:spLocks noGrp="1"/>
+          </p:cNvSpPr>
+          <p:nvPr>
+            <p:ph type="title"/>
+          </p:nvPr>
+        </p:nvSpPr>
+        <p:spPr/>
+        <p:txBody>
+          <a:bodyPr/>
+          <a:lstStyle/>
+          <a:p>
+            <a:r>
+              <a:rPr lang="en-US" dirty="0"/>
+              <a:t>Cardinality (3/3)</a:t>
+            </a:r>
+            <a:endParaRPr lang="en-CH" dirty="0"/>
+          </a:p>
+        </p:txBody>
+      </p:sp>
+      <p:sp>
+        <p:nvSpPr>
+          <p:cNvPr id="5" name="Content Placeholder 4">
+            <a:extLst>
+              <a:ext uri="{FF2B5EF4-FFF2-40B4-BE49-F238E27FC236}">
+                <a16:creationId xmlns:a16="http://schemas.microsoft.com/office/drawing/2014/main" id="{3A5FB3D3-4BB6-451A-91DF-53D8A59B2AD4}"/>
+              </a:ext>
+            </a:extLst>
+          </p:cNvPr>
+          <p:cNvSpPr>
+            <a:spLocks noGrp="1"/>
+          </p:cNvSpPr>
+          <p:nvPr>
+            <p:ph idx="1"/>
+          </p:nvPr>
+        </p:nvSpPr>
+        <p:spPr/>
+        <p:txBody>
+          <a:bodyPr>
+            <a:normAutofit/>
+          </a:bodyPr>
+          <a:lstStyle/>
+          <a:p>
+            <a:r>
+              <a:rPr lang="en-US" dirty="0"/>
+              <a:t>Syntax</a:t>
+            </a:r>
+          </a:p>
+          <a:p>
+            <a:pPr lvl="1"/>
+            <a:r>
+              <a:rPr lang="de-CH" b="0" i="0" dirty="0">
+                <a:solidFill>
+                  <a:srgbClr val="444444"/>
+                </a:solidFill>
+                <a:effectLst/>
+                <a:latin typeface="SFMono-Regular"/>
+              </a:rPr>
+              <a:t>&lt;</a:t>
+            </a:r>
+            <a:r>
+              <a:rPr lang="de-CH" b="0" i="0" dirty="0" err="1">
+                <a:solidFill>
+                  <a:srgbClr val="444444"/>
+                </a:solidFill>
+                <a:effectLst/>
+                <a:latin typeface="SFMono-Regular"/>
+              </a:rPr>
+              <a:t>multiInstanceLoopCharacteristics</a:t>
+            </a:r>
+            <a:r>
+              <a:rPr lang="de-CH" b="0" i="0" dirty="0">
+                <a:solidFill>
+                  <a:srgbClr val="444444"/>
+                </a:solidFill>
+                <a:effectLst/>
+                <a:latin typeface="SFMono-Regular"/>
+              </a:rPr>
+              <a:t> </a:t>
+            </a:r>
+            <a:r>
+              <a:rPr lang="de-CH" b="0" i="0" dirty="0" err="1">
+                <a:solidFill>
+                  <a:srgbClr val="444444"/>
+                </a:solidFill>
+                <a:effectLst/>
+                <a:latin typeface="SFMono-Regular"/>
+              </a:rPr>
+              <a:t>isSequential</a:t>
+            </a:r>
+            <a:r>
+              <a:rPr lang="de-CH" b="0" i="0" dirty="0">
+                <a:solidFill>
+                  <a:srgbClr val="444444"/>
+                </a:solidFill>
+                <a:effectLst/>
+                <a:latin typeface="SFMono-Regular"/>
+              </a:rPr>
+              <a:t>="</a:t>
+            </a:r>
+            <a:r>
+              <a:rPr lang="de-CH" b="0" i="0" dirty="0" err="1">
+                <a:solidFill>
+                  <a:srgbClr val="444444"/>
+                </a:solidFill>
+                <a:effectLst/>
+                <a:latin typeface="SFMono-Regular"/>
+              </a:rPr>
+              <a:t>false|true</a:t>
+            </a:r>
+            <a:r>
+              <a:rPr lang="de-CH" b="0" i="0" dirty="0">
+                <a:solidFill>
+                  <a:srgbClr val="444444"/>
+                </a:solidFill>
+                <a:effectLst/>
+                <a:latin typeface="SFMono-Regular"/>
+              </a:rPr>
+              <a:t>"&gt; </a:t>
+            </a:r>
+            <a:r>
+              <a:rPr lang="de-CH" b="0" i="0" dirty="0">
+                <a:solidFill>
+                  <a:srgbClr val="444444"/>
+                </a:solidFill>
+                <a:effectLst/>
+                <a:highlight>
+                  <a:srgbClr val="FFFF00"/>
+                </a:highlight>
+                <a:latin typeface="SFMono-Regular"/>
+              </a:rPr>
+              <a:t>&lt;</a:t>
+            </a:r>
+            <a:r>
+              <a:rPr lang="de-CH" b="0" i="0" dirty="0" err="1">
+                <a:solidFill>
+                  <a:srgbClr val="444444"/>
+                </a:solidFill>
+                <a:effectLst/>
+                <a:highlight>
+                  <a:srgbClr val="FFFF00"/>
+                </a:highlight>
+                <a:latin typeface="SFMono-Regular"/>
+              </a:rPr>
+              <a:t>loopCardinality</a:t>
+            </a:r>
+            <a:r>
+              <a:rPr lang="de-CH" b="0" i="0" dirty="0">
+                <a:solidFill>
+                  <a:srgbClr val="444444"/>
+                </a:solidFill>
+                <a:effectLst/>
+                <a:highlight>
+                  <a:srgbClr val="FFFF00"/>
+                </a:highlight>
+                <a:latin typeface="SFMono-Regular"/>
+              </a:rPr>
+              <a:t>&gt;5&lt;/</a:t>
+            </a:r>
+            <a:r>
+              <a:rPr lang="de-CH" b="0" i="0" dirty="0" err="1">
+                <a:solidFill>
+                  <a:srgbClr val="444444"/>
+                </a:solidFill>
+                <a:effectLst/>
+                <a:highlight>
+                  <a:srgbClr val="FFFF00"/>
+                </a:highlight>
+                <a:latin typeface="SFMono-Regular"/>
+              </a:rPr>
+              <a:t>loopCardinality</a:t>
+            </a:r>
+            <a:r>
+              <a:rPr lang="de-CH" b="0" i="0" dirty="0">
+                <a:solidFill>
+                  <a:srgbClr val="444444"/>
+                </a:solidFill>
+                <a:effectLst/>
+                <a:highlight>
+                  <a:srgbClr val="FFFF00"/>
+                </a:highlight>
+                <a:latin typeface="SFMono-Regular"/>
+              </a:rPr>
+              <a:t>&gt; &lt;/</a:t>
+            </a:r>
+            <a:r>
+              <a:rPr lang="de-CH" b="0" i="0" dirty="0" err="1">
+                <a:solidFill>
+                  <a:srgbClr val="444444"/>
+                </a:solidFill>
+                <a:effectLst/>
+                <a:highlight>
+                  <a:srgbClr val="FFFF00"/>
+                </a:highlight>
+                <a:latin typeface="SFMono-Regular"/>
+              </a:rPr>
+              <a:t>multiInstanceLoopCharacteristics</a:t>
+            </a:r>
+            <a:r>
+              <a:rPr lang="de-CH" b="0" i="0" dirty="0">
+                <a:solidFill>
+                  <a:srgbClr val="444444"/>
+                </a:solidFill>
+                <a:effectLst/>
+                <a:highlight>
+                  <a:srgbClr val="FFFF00"/>
+                </a:highlight>
+                <a:latin typeface="SFMono-Regular"/>
+              </a:rPr>
+              <a:t>&gt;</a:t>
+            </a:r>
+            <a:endParaRPr lang="en-US" b="0" i="0" dirty="0">
+              <a:solidFill>
+                <a:srgbClr val="444444"/>
+              </a:solidFill>
+              <a:effectLst/>
+              <a:highlight>
+                <a:srgbClr val="FFFF00"/>
+              </a:highlight>
+              <a:latin typeface="SFMono-Regular"/>
+            </a:endParaRPr>
+          </a:p>
+          <a:p>
+            <a:pPr lvl="1"/>
+            <a:r>
+              <a:rPr lang="de-CH" b="0" i="0" dirty="0">
+                <a:solidFill>
+                  <a:srgbClr val="444444"/>
+                </a:solidFill>
+                <a:effectLst/>
+                <a:latin typeface="SFMono-Regular"/>
+              </a:rPr>
+              <a:t>&lt;</a:t>
+            </a:r>
+            <a:r>
+              <a:rPr lang="de-CH" b="0" i="0" dirty="0" err="1">
+                <a:solidFill>
+                  <a:srgbClr val="444444"/>
+                </a:solidFill>
+                <a:effectLst/>
+                <a:latin typeface="SFMono-Regular"/>
+              </a:rPr>
+              <a:t>multiInstanceLoopCharacteristics</a:t>
+            </a:r>
+            <a:r>
+              <a:rPr lang="de-CH" b="0" i="0" dirty="0">
+                <a:solidFill>
+                  <a:srgbClr val="444444"/>
+                </a:solidFill>
+                <a:effectLst/>
+                <a:latin typeface="SFMono-Regular"/>
+              </a:rPr>
+              <a:t> </a:t>
+            </a:r>
+            <a:r>
+              <a:rPr lang="de-CH" b="0" i="0" dirty="0" err="1">
+                <a:solidFill>
+                  <a:srgbClr val="444444"/>
+                </a:solidFill>
+                <a:effectLst/>
+                <a:latin typeface="SFMono-Regular"/>
+              </a:rPr>
+              <a:t>isSequential</a:t>
+            </a:r>
+            <a:r>
+              <a:rPr lang="de-CH" b="0" i="0" dirty="0">
+                <a:solidFill>
+                  <a:srgbClr val="444444"/>
+                </a:solidFill>
+                <a:effectLst/>
+                <a:latin typeface="SFMono-Regular"/>
+              </a:rPr>
+              <a:t>="</a:t>
+            </a:r>
+            <a:r>
+              <a:rPr lang="de-CH" b="0" i="0" dirty="0" err="1">
+                <a:solidFill>
+                  <a:srgbClr val="444444"/>
+                </a:solidFill>
+                <a:effectLst/>
+                <a:latin typeface="SFMono-Regular"/>
+              </a:rPr>
+              <a:t>false|true</a:t>
+            </a:r>
+            <a:r>
+              <a:rPr lang="de-CH" b="0" i="0" dirty="0">
+                <a:solidFill>
+                  <a:srgbClr val="444444"/>
+                </a:solidFill>
+                <a:effectLst/>
+                <a:latin typeface="SFMono-Regular"/>
+              </a:rPr>
+              <a:t>"&gt; </a:t>
+            </a:r>
+            <a:r>
+              <a:rPr lang="de-CH" b="0" i="0" dirty="0">
+                <a:solidFill>
+                  <a:srgbClr val="444444"/>
+                </a:solidFill>
+                <a:effectLst/>
+                <a:highlight>
+                  <a:srgbClr val="FFFF00"/>
+                </a:highlight>
+                <a:latin typeface="SFMono-Regular"/>
+              </a:rPr>
+              <a:t>&lt;</a:t>
+            </a:r>
+            <a:r>
+              <a:rPr lang="de-CH" b="0" i="0" dirty="0" err="1">
+                <a:solidFill>
+                  <a:srgbClr val="444444"/>
+                </a:solidFill>
+                <a:effectLst/>
+                <a:highlight>
+                  <a:srgbClr val="FFFF00"/>
+                </a:highlight>
+                <a:latin typeface="SFMono-Regular"/>
+              </a:rPr>
+              <a:t>loopCardinality</a:t>
+            </a:r>
+            <a:r>
+              <a:rPr lang="de-CH" b="0" i="0" dirty="0">
+                <a:solidFill>
+                  <a:srgbClr val="444444"/>
+                </a:solidFill>
+                <a:effectLst/>
+                <a:highlight>
+                  <a:srgbClr val="FFFF00"/>
+                </a:highlight>
+                <a:latin typeface="SFMono-Regular"/>
+              </a:rPr>
+              <a:t>&gt;${</a:t>
+            </a:r>
+            <a:r>
+              <a:rPr lang="de-CH" b="0" i="0" dirty="0" err="1">
+                <a:solidFill>
+                  <a:srgbClr val="444444"/>
+                </a:solidFill>
+                <a:effectLst/>
+                <a:highlight>
+                  <a:srgbClr val="FFFF00"/>
+                </a:highlight>
+                <a:latin typeface="SFMono-Regular"/>
+              </a:rPr>
+              <a:t>nrOfOrders-nrOfCancellations</a:t>
+            </a:r>
+            <a:r>
+              <a:rPr lang="de-CH" b="0" i="0" dirty="0">
+                <a:solidFill>
+                  <a:srgbClr val="444444"/>
+                </a:solidFill>
+                <a:effectLst/>
+                <a:highlight>
+                  <a:srgbClr val="FFFF00"/>
+                </a:highlight>
+                <a:latin typeface="SFMono-Regular"/>
+              </a:rPr>
+              <a:t>}&lt;/</a:t>
+            </a:r>
+            <a:r>
+              <a:rPr lang="de-CH" b="0" i="0" dirty="0" err="1">
+                <a:solidFill>
+                  <a:srgbClr val="444444"/>
+                </a:solidFill>
+                <a:effectLst/>
+                <a:highlight>
+                  <a:srgbClr val="FFFF00"/>
+                </a:highlight>
+                <a:latin typeface="SFMono-Regular"/>
+              </a:rPr>
+              <a:t>loopCardinality</a:t>
+            </a:r>
+            <a:r>
+              <a:rPr lang="de-CH" b="0" i="0" dirty="0">
+                <a:solidFill>
+                  <a:srgbClr val="444444"/>
+                </a:solidFill>
+                <a:effectLst/>
+                <a:highlight>
+                  <a:srgbClr val="FFFF00"/>
+                </a:highlight>
+                <a:latin typeface="SFMono-Regular"/>
+              </a:rPr>
+              <a:t>&gt; </a:t>
+            </a:r>
+            <a:r>
+              <a:rPr lang="de-CH" b="0" i="0" dirty="0">
+                <a:solidFill>
+                  <a:srgbClr val="444444"/>
+                </a:solidFill>
+                <a:effectLst/>
+                <a:latin typeface="SFMono-Regular"/>
+              </a:rPr>
+              <a:t>&lt;/</a:t>
+            </a:r>
+            <a:r>
+              <a:rPr lang="de-CH" b="0" i="0" dirty="0" err="1">
+                <a:solidFill>
+                  <a:srgbClr val="444444"/>
+                </a:solidFill>
+                <a:effectLst/>
+                <a:latin typeface="SFMono-Regular"/>
+              </a:rPr>
+              <a:t>multiInstanceLoopCharacteristics</a:t>
+            </a:r>
+            <a:r>
+              <a:rPr lang="de-CH" b="0" i="0" dirty="0">
+                <a:solidFill>
+                  <a:srgbClr val="444444"/>
+                </a:solidFill>
+                <a:effectLst/>
+                <a:latin typeface="SFMono-Regular"/>
+              </a:rPr>
+              <a:t>&gt;</a:t>
+            </a:r>
+            <a:endParaRPr lang="en-US" dirty="0">
+              <a:solidFill>
+                <a:srgbClr val="444444"/>
+              </a:solidFill>
+              <a:latin typeface="SFMono-Regular"/>
+            </a:endParaRPr>
+          </a:p>
+          <a:p>
+            <a:pPr lvl="1"/>
+            <a:r>
+              <a:rPr lang="de-CH" b="0" i="0" dirty="0">
+                <a:solidFill>
+                  <a:srgbClr val="444444"/>
+                </a:solidFill>
+                <a:effectLst/>
+                <a:latin typeface="SFMono-Regular"/>
+              </a:rPr>
+              <a:t>&lt;</a:t>
+            </a:r>
+            <a:r>
+              <a:rPr lang="de-CH" b="0" i="0" dirty="0" err="1">
+                <a:solidFill>
+                  <a:srgbClr val="444444"/>
+                </a:solidFill>
+                <a:effectLst/>
+                <a:latin typeface="SFMono-Regular"/>
+              </a:rPr>
+              <a:t>multiInstanceLoopCharacteristics</a:t>
+            </a:r>
+            <a:r>
+              <a:rPr lang="de-CH" b="0" i="0" dirty="0">
+                <a:solidFill>
+                  <a:srgbClr val="444444"/>
+                </a:solidFill>
+                <a:effectLst/>
+                <a:latin typeface="SFMono-Regular"/>
+              </a:rPr>
+              <a:t> </a:t>
+            </a:r>
+            <a:r>
+              <a:rPr lang="de-CH" b="0" i="0" dirty="0" err="1">
+                <a:solidFill>
+                  <a:srgbClr val="444444"/>
+                </a:solidFill>
+                <a:effectLst/>
+                <a:latin typeface="SFMono-Regular"/>
+              </a:rPr>
+              <a:t>isSequential</a:t>
+            </a:r>
+            <a:r>
+              <a:rPr lang="de-CH" b="0" i="0" dirty="0">
+                <a:solidFill>
+                  <a:srgbClr val="444444"/>
+                </a:solidFill>
+                <a:effectLst/>
+                <a:latin typeface="SFMono-Regular"/>
+              </a:rPr>
+              <a:t>="</a:t>
+            </a:r>
+            <a:r>
+              <a:rPr lang="de-CH" b="0" i="0" dirty="0" err="1">
+                <a:solidFill>
+                  <a:srgbClr val="444444"/>
+                </a:solidFill>
+                <a:effectLst/>
+                <a:latin typeface="SFMono-Regular"/>
+              </a:rPr>
+              <a:t>false</a:t>
+            </a:r>
+            <a:r>
+              <a:rPr lang="de-CH" b="0" i="0" dirty="0">
+                <a:solidFill>
+                  <a:srgbClr val="444444"/>
+                </a:solidFill>
+                <a:effectLst/>
+                <a:latin typeface="SFMono-Regular"/>
+              </a:rPr>
+              <a:t>" </a:t>
+            </a:r>
+            <a:r>
+              <a:rPr lang="de-CH" b="0" i="0" dirty="0" err="1">
+                <a:solidFill>
+                  <a:srgbClr val="444444"/>
+                </a:solidFill>
+                <a:effectLst/>
+                <a:highlight>
+                  <a:srgbClr val="FFFF00"/>
+                </a:highlight>
+                <a:latin typeface="SFMono-Regular"/>
+              </a:rPr>
+              <a:t>flowable:collection</a:t>
+            </a:r>
+            <a:r>
+              <a:rPr lang="de-CH" b="0" i="0" dirty="0">
+                <a:solidFill>
+                  <a:srgbClr val="444444"/>
+                </a:solidFill>
+                <a:effectLst/>
+                <a:highlight>
+                  <a:srgbClr val="FFFF00"/>
+                </a:highlight>
+                <a:latin typeface="SFMono-Regular"/>
+              </a:rPr>
+              <a:t>=«</a:t>
+            </a:r>
+            <a:r>
+              <a:rPr lang="de-CH" b="1" i="0" dirty="0" err="1">
+                <a:solidFill>
+                  <a:srgbClr val="444444"/>
+                </a:solidFill>
+                <a:effectLst/>
+                <a:highlight>
+                  <a:srgbClr val="FFFF00"/>
+                </a:highlight>
+                <a:latin typeface="SFMono-Regular"/>
+              </a:rPr>
+              <a:t>loopList</a:t>
+            </a:r>
+            <a:r>
+              <a:rPr lang="de-CH" b="0" i="0" dirty="0">
+                <a:solidFill>
+                  <a:srgbClr val="444444"/>
+                </a:solidFill>
+                <a:effectLst/>
+                <a:highlight>
+                  <a:srgbClr val="FFFF00"/>
+                </a:highlight>
+                <a:latin typeface="SFMono-Regular"/>
+              </a:rPr>
+              <a:t>" </a:t>
+            </a:r>
+            <a:r>
+              <a:rPr lang="de-CH" b="0" i="0" dirty="0" err="1">
+                <a:solidFill>
+                  <a:srgbClr val="444444"/>
+                </a:solidFill>
+                <a:effectLst/>
+                <a:highlight>
+                  <a:srgbClr val="FFFF00"/>
+                </a:highlight>
+                <a:latin typeface="SFMono-Regular"/>
+              </a:rPr>
+              <a:t>flowable:elementVariable</a:t>
+            </a:r>
+            <a:r>
+              <a:rPr lang="de-CH" b="0" i="0" dirty="0">
+                <a:solidFill>
+                  <a:srgbClr val="444444"/>
+                </a:solidFill>
+                <a:effectLst/>
+                <a:highlight>
+                  <a:srgbClr val="FFFF00"/>
+                </a:highlight>
+                <a:latin typeface="SFMono-Regular"/>
+              </a:rPr>
+              <a:t>=«</a:t>
+            </a:r>
+            <a:r>
+              <a:rPr lang="de-CH" b="1" i="0" dirty="0" err="1">
+                <a:solidFill>
+                  <a:srgbClr val="444444"/>
+                </a:solidFill>
+                <a:effectLst/>
+                <a:highlight>
+                  <a:srgbClr val="FFFF00"/>
+                </a:highlight>
+                <a:latin typeface="SFMono-Regular"/>
+              </a:rPr>
+              <a:t>listItem</a:t>
+            </a:r>
+            <a:r>
+              <a:rPr lang="de-CH" b="0" i="0" dirty="0">
+                <a:solidFill>
+                  <a:srgbClr val="444444"/>
+                </a:solidFill>
+                <a:effectLst/>
+                <a:highlight>
+                  <a:srgbClr val="FFFF00"/>
+                </a:highlight>
+                <a:latin typeface="SFMono-Regular"/>
+              </a:rPr>
+              <a:t>" &gt; </a:t>
+            </a:r>
+            <a:r>
+              <a:rPr lang="de-CH" b="0" i="0" dirty="0">
+                <a:solidFill>
+                  <a:srgbClr val="444444"/>
+                </a:solidFill>
+                <a:effectLst/>
+                <a:latin typeface="SFMono-Regular"/>
+              </a:rPr>
+              <a:t>&lt;/</a:t>
+            </a:r>
+            <a:r>
+              <a:rPr lang="de-CH" b="0" i="0" dirty="0" err="1">
+                <a:solidFill>
+                  <a:srgbClr val="444444"/>
+                </a:solidFill>
+                <a:effectLst/>
+                <a:latin typeface="SFMono-Regular"/>
+              </a:rPr>
+              <a:t>multiInstanceLoopCharacteristics</a:t>
+            </a:r>
+            <a:r>
+              <a:rPr lang="de-CH" b="0" i="0" dirty="0">
+                <a:solidFill>
+                  <a:srgbClr val="444444"/>
+                </a:solidFill>
+                <a:effectLst/>
+                <a:latin typeface="SFMono-Regular"/>
+              </a:rPr>
+              <a:t>&gt;</a:t>
+            </a:r>
+            <a:endParaRPr lang="en-CH" dirty="0"/>
+          </a:p>
+        </p:txBody>
+      </p:sp>
+    </p:spTree>
+    <p:extLst>
+      <p:ext uri="{BB962C8B-B14F-4D97-AF65-F5344CB8AC3E}">
+        <p14:creationId xmlns:p14="http://schemas.microsoft.com/office/powerpoint/2010/main" val="1634682293"/>
       </p:ext>
     </p:extLst>
   </p:cSld>

</xml_diff>

<commit_message>
some comments + powerpoint adjustments
</commit_message>
<xml_diff>
--- a/flowable-demo/src/main/resources/devsupport/Flowable_Demo.pptx
+++ b/flowable-demo/src/main/resources/devsupport/Flowable_Demo.pptx
@@ -20,14 +20,14 @@
     <p:sldId id="272" r:id="rId11"/>
     <p:sldId id="264" r:id="rId12"/>
     <p:sldId id="273" r:id="rId13"/>
-    <p:sldId id="262" r:id="rId14"/>
-    <p:sldId id="274" r:id="rId15"/>
-    <p:sldId id="275" r:id="rId16"/>
-    <p:sldId id="281" r:id="rId17"/>
-    <p:sldId id="282" r:id="rId18"/>
-    <p:sldId id="279" r:id="rId19"/>
-    <p:sldId id="276" r:id="rId20"/>
-    <p:sldId id="277" r:id="rId21"/>
+    <p:sldId id="279" r:id="rId14"/>
+    <p:sldId id="276" r:id="rId15"/>
+    <p:sldId id="277" r:id="rId16"/>
+    <p:sldId id="262" r:id="rId17"/>
+    <p:sldId id="274" r:id="rId18"/>
+    <p:sldId id="275" r:id="rId19"/>
+    <p:sldId id="281" r:id="rId20"/>
+    <p:sldId id="282" r:id="rId21"/>
   </p:sldIdLst>
   <p:sldSz cx="12192000" cy="6858000"/>
   <p:notesSz cx="6858000" cy="9144000"/>
@@ -216,7 +216,7 @@
           <a:p>
             <a:fld id="{5833448F-D82A-4F91-8165-AEC9D03D7538}" type="datetimeFigureOut">
               <a:rPr lang="en-CH" smtClean="0"/>
-              <a:t>24/04/2022</a:t>
+              <a:t>04/29/2022</a:t>
             </a:fld>
             <a:endParaRPr lang="en-CH"/>
           </a:p>
@@ -642,7 +642,7 @@
     </p:spTree>
     <p:extLst>
       <p:ext uri="{BB962C8B-B14F-4D97-AF65-F5344CB8AC3E}">
-        <p14:creationId xmlns:p14="http://schemas.microsoft.com/office/powerpoint/2010/main" val="3583361730"/>
+        <p14:creationId xmlns:p14="http://schemas.microsoft.com/office/powerpoint/2010/main" val="2116276287"/>
       </p:ext>
     </p:extLst>
   </p:cSld>
@@ -726,7 +726,7 @@
     </p:spTree>
     <p:extLst>
       <p:ext uri="{BB962C8B-B14F-4D97-AF65-F5344CB8AC3E}">
-        <p14:creationId xmlns:p14="http://schemas.microsoft.com/office/powerpoint/2010/main" val="3740068702"/>
+        <p14:creationId xmlns:p14="http://schemas.microsoft.com/office/powerpoint/2010/main" val="2263799970"/>
       </p:ext>
     </p:extLst>
   </p:cSld>
@@ -1106,7 +1106,7 @@
     </p:spTree>
     <p:extLst>
       <p:ext uri="{BB962C8B-B14F-4D97-AF65-F5344CB8AC3E}">
-        <p14:creationId xmlns:p14="http://schemas.microsoft.com/office/powerpoint/2010/main" val="477367948"/>
+        <p14:creationId xmlns:p14="http://schemas.microsoft.com/office/powerpoint/2010/main" val="1217711729"/>
       </p:ext>
     </p:extLst>
   </p:cSld>
@@ -1190,7 +1190,7 @@
     </p:spTree>
     <p:extLst>
       <p:ext uri="{BB962C8B-B14F-4D97-AF65-F5344CB8AC3E}">
-        <p14:creationId xmlns:p14="http://schemas.microsoft.com/office/powerpoint/2010/main" val="2724288615"/>
+        <p14:creationId xmlns:p14="http://schemas.microsoft.com/office/powerpoint/2010/main" val="3583361730"/>
       </p:ext>
     </p:extLst>
   </p:cSld>
@@ -1274,7 +1274,7 @@
     </p:spTree>
     <p:extLst>
       <p:ext uri="{BB962C8B-B14F-4D97-AF65-F5344CB8AC3E}">
-        <p14:creationId xmlns:p14="http://schemas.microsoft.com/office/powerpoint/2010/main" val="1710238726"/>
+        <p14:creationId xmlns:p14="http://schemas.microsoft.com/office/powerpoint/2010/main" val="3740068702"/>
       </p:ext>
     </p:extLst>
   </p:cSld>
@@ -1358,7 +1358,7 @@
     </p:spTree>
     <p:extLst>
       <p:ext uri="{BB962C8B-B14F-4D97-AF65-F5344CB8AC3E}">
-        <p14:creationId xmlns:p14="http://schemas.microsoft.com/office/powerpoint/2010/main" val="2116276287"/>
+        <p14:creationId xmlns:p14="http://schemas.microsoft.com/office/powerpoint/2010/main" val="477367948"/>
       </p:ext>
     </p:extLst>
   </p:cSld>
@@ -1442,7 +1442,7 @@
     </p:spTree>
     <p:extLst>
       <p:ext uri="{BB962C8B-B14F-4D97-AF65-F5344CB8AC3E}">
-        <p14:creationId xmlns:p14="http://schemas.microsoft.com/office/powerpoint/2010/main" val="2263799970"/>
+        <p14:creationId xmlns:p14="http://schemas.microsoft.com/office/powerpoint/2010/main" val="2724288615"/>
       </p:ext>
     </p:extLst>
   </p:cSld>
@@ -1526,7 +1526,7 @@
     </p:spTree>
     <p:extLst>
       <p:ext uri="{BB962C8B-B14F-4D97-AF65-F5344CB8AC3E}">
-        <p14:creationId xmlns:p14="http://schemas.microsoft.com/office/powerpoint/2010/main" val="1217711729"/>
+        <p14:creationId xmlns:p14="http://schemas.microsoft.com/office/powerpoint/2010/main" val="1710238726"/>
       </p:ext>
     </p:extLst>
   </p:cSld>
@@ -1685,7 +1685,7 @@
           <a:p>
             <a:fld id="{1DE9D8DB-7996-4D53-BAF7-A90A1E48913A}" type="datetimeFigureOut">
               <a:rPr lang="en-CH" smtClean="0"/>
-              <a:t>24/04/2022</a:t>
+              <a:t>04/29/2022</a:t>
             </a:fld>
             <a:endParaRPr lang="en-CH"/>
           </a:p>
@@ -1885,7 +1885,7 @@
           <a:p>
             <a:fld id="{1DE9D8DB-7996-4D53-BAF7-A90A1E48913A}" type="datetimeFigureOut">
               <a:rPr lang="en-CH" smtClean="0"/>
-              <a:t>24/04/2022</a:t>
+              <a:t>04/29/2022</a:t>
             </a:fld>
             <a:endParaRPr lang="en-CH"/>
           </a:p>
@@ -2095,7 +2095,7 @@
           <a:p>
             <a:fld id="{1DE9D8DB-7996-4D53-BAF7-A90A1E48913A}" type="datetimeFigureOut">
               <a:rPr lang="en-CH" smtClean="0"/>
-              <a:t>24/04/2022</a:t>
+              <a:t>04/29/2022</a:t>
             </a:fld>
             <a:endParaRPr lang="en-CH"/>
           </a:p>
@@ -2295,7 +2295,7 @@
           <a:p>
             <a:fld id="{1DE9D8DB-7996-4D53-BAF7-A90A1E48913A}" type="datetimeFigureOut">
               <a:rPr lang="en-CH" smtClean="0"/>
-              <a:t>24/04/2022</a:t>
+              <a:t>04/29/2022</a:t>
             </a:fld>
             <a:endParaRPr lang="en-CH"/>
           </a:p>
@@ -2571,7 +2571,7 @@
           <a:p>
             <a:fld id="{1DE9D8DB-7996-4D53-BAF7-A90A1E48913A}" type="datetimeFigureOut">
               <a:rPr lang="en-CH" smtClean="0"/>
-              <a:t>24/04/2022</a:t>
+              <a:t>04/29/2022</a:t>
             </a:fld>
             <a:endParaRPr lang="en-CH"/>
           </a:p>
@@ -2839,7 +2839,7 @@
           <a:p>
             <a:fld id="{1DE9D8DB-7996-4D53-BAF7-A90A1E48913A}" type="datetimeFigureOut">
               <a:rPr lang="en-CH" smtClean="0"/>
-              <a:t>24/04/2022</a:t>
+              <a:t>04/29/2022</a:t>
             </a:fld>
             <a:endParaRPr lang="en-CH"/>
           </a:p>
@@ -3254,7 +3254,7 @@
           <a:p>
             <a:fld id="{1DE9D8DB-7996-4D53-BAF7-A90A1E48913A}" type="datetimeFigureOut">
               <a:rPr lang="en-CH" smtClean="0"/>
-              <a:t>24/04/2022</a:t>
+              <a:t>04/29/2022</a:t>
             </a:fld>
             <a:endParaRPr lang="en-CH"/>
           </a:p>
@@ -3396,7 +3396,7 @@
           <a:p>
             <a:fld id="{1DE9D8DB-7996-4D53-BAF7-A90A1E48913A}" type="datetimeFigureOut">
               <a:rPr lang="en-CH" smtClean="0"/>
-              <a:t>24/04/2022</a:t>
+              <a:t>04/29/2022</a:t>
             </a:fld>
             <a:endParaRPr lang="en-CH"/>
           </a:p>
@@ -3509,7 +3509,7 @@
           <a:p>
             <a:fld id="{1DE9D8DB-7996-4D53-BAF7-A90A1E48913A}" type="datetimeFigureOut">
               <a:rPr lang="en-CH" smtClean="0"/>
-              <a:t>24/04/2022</a:t>
+              <a:t>04/29/2022</a:t>
             </a:fld>
             <a:endParaRPr lang="en-CH"/>
           </a:p>
@@ -3822,7 +3822,7 @@
           <a:p>
             <a:fld id="{1DE9D8DB-7996-4D53-BAF7-A90A1E48913A}" type="datetimeFigureOut">
               <a:rPr lang="en-CH" smtClean="0"/>
-              <a:t>24/04/2022</a:t>
+              <a:t>04/29/2022</a:t>
             </a:fld>
             <a:endParaRPr lang="en-CH"/>
           </a:p>
@@ -4111,7 +4111,7 @@
           <a:p>
             <a:fld id="{1DE9D8DB-7996-4D53-BAF7-A90A1E48913A}" type="datetimeFigureOut">
               <a:rPr lang="en-CH" smtClean="0"/>
-              <a:t>24/04/2022</a:t>
+              <a:t>04/29/2022</a:t>
             </a:fld>
             <a:endParaRPr lang="en-CH"/>
           </a:p>
@@ -4354,7 +4354,7 @@
           <a:p>
             <a:fld id="{1DE9D8DB-7996-4D53-BAF7-A90A1E48913A}" type="datetimeFigureOut">
               <a:rPr lang="en-CH" smtClean="0"/>
-              <a:t>24/04/2022</a:t>
+              <a:t>04/29/2022</a:t>
             </a:fld>
             <a:endParaRPr lang="en-CH"/>
           </a:p>
@@ -5341,6 +5341,998 @@
           <a:p>
             <a:r>
               <a:rPr lang="en-US" dirty="0"/>
+              <a:t>Cardinality (1/3)</a:t>
+            </a:r>
+            <a:endParaRPr lang="en-CH" dirty="0"/>
+          </a:p>
+        </p:txBody>
+      </p:sp>
+      <p:sp>
+        <p:nvSpPr>
+          <p:cNvPr id="4" name="Content Placeholder 3">
+            <a:extLst>
+              <a:ext uri="{FF2B5EF4-FFF2-40B4-BE49-F238E27FC236}">
+                <a16:creationId xmlns:a16="http://schemas.microsoft.com/office/drawing/2014/main" id="{B1A9B8FC-91B4-4D04-97E4-215B657E8A81}"/>
+              </a:ext>
+            </a:extLst>
+          </p:cNvPr>
+          <p:cNvSpPr>
+            <a:spLocks noGrp="1"/>
+          </p:cNvSpPr>
+          <p:nvPr>
+            <p:ph idx="1"/>
+          </p:nvPr>
+        </p:nvSpPr>
+        <p:spPr/>
+        <p:txBody>
+          <a:bodyPr/>
+          <a:lstStyle/>
+          <a:p>
+            <a:r>
+              <a:rPr lang="en-US" dirty="0"/>
+              <a:t>Executing a specific activity multiple times without complex modelling</a:t>
+            </a:r>
+          </a:p>
+          <a:p>
+            <a:pPr lvl="1"/>
+            <a:r>
+              <a:rPr lang="en-US" dirty="0"/>
+              <a:t>Loop a fixed number of times</a:t>
+            </a:r>
+          </a:p>
+          <a:p>
+            <a:pPr lvl="1"/>
+            <a:r>
+              <a:rPr lang="en-US" dirty="0"/>
+              <a:t>Variable number of times (determined by process variables)</a:t>
+            </a:r>
+          </a:p>
+          <a:p>
+            <a:pPr lvl="1"/>
+            <a:r>
+              <a:rPr lang="en-US" dirty="0"/>
+              <a:t>Loop over a list</a:t>
+            </a:r>
+          </a:p>
+          <a:p>
+            <a:pPr lvl="1"/>
+            <a:r>
+              <a:rPr lang="en-US" dirty="0"/>
+              <a:t>Define a “completion condition”</a:t>
+            </a:r>
+          </a:p>
+          <a:p>
+            <a:r>
+              <a:rPr lang="en-US" dirty="0">
+                <a:hlinkClick r:id="rId3"/>
+              </a:rPr>
+              <a:t>https://www.flowable.com/open-source/docs/bpmn/ch07b-BPMN-Constructs#multi-instance-for-each</a:t>
+            </a:r>
+            <a:endParaRPr lang="en-US" dirty="0"/>
+          </a:p>
+        </p:txBody>
+      </p:sp>
+    </p:spTree>
+    <p:extLst>
+      <p:ext uri="{BB962C8B-B14F-4D97-AF65-F5344CB8AC3E}">
+        <p14:creationId xmlns:p14="http://schemas.microsoft.com/office/powerpoint/2010/main" val="620836971"/>
+      </p:ext>
+    </p:extLst>
+  </p:cSld>
+  <p:clrMapOvr>
+    <a:masterClrMapping/>
+  </p:clrMapOvr>
+</p:sld>
+</file>
+
+<file path=ppt/slides/slide14.xml><?xml version="1.0" encoding="utf-8"?>
+<p:sld xmlns:a="http://schemas.openxmlformats.org/drawingml/2006/main" xmlns:r="http://schemas.openxmlformats.org/officeDocument/2006/relationships" xmlns:p="http://schemas.openxmlformats.org/presentationml/2006/main">
+  <p:cSld>
+    <p:spTree>
+      <p:nvGrpSpPr>
+        <p:cNvPr id="1" name=""/>
+        <p:cNvGrpSpPr/>
+        <p:nvPr/>
+      </p:nvGrpSpPr>
+      <p:grpSpPr>
+        <a:xfrm>
+          <a:off x="0" y="0"/>
+          <a:ext cx="0" cy="0"/>
+          <a:chOff x="0" y="0"/>
+          <a:chExt cx="0" cy="0"/>
+        </a:xfrm>
+      </p:grpSpPr>
+      <p:sp>
+        <p:nvSpPr>
+          <p:cNvPr id="2" name="Title 1">
+            <a:extLst>
+              <a:ext uri="{FF2B5EF4-FFF2-40B4-BE49-F238E27FC236}">
+                <a16:creationId xmlns:a16="http://schemas.microsoft.com/office/drawing/2014/main" id="{03812D1F-F6DF-42A7-8DA2-1A5A8243FD15}"/>
+              </a:ext>
+            </a:extLst>
+          </p:cNvPr>
+          <p:cNvSpPr>
+            <a:spLocks noGrp="1"/>
+          </p:cNvSpPr>
+          <p:nvPr>
+            <p:ph type="title"/>
+          </p:nvPr>
+        </p:nvSpPr>
+        <p:spPr/>
+        <p:txBody>
+          <a:bodyPr/>
+          <a:lstStyle/>
+          <a:p>
+            <a:r>
+              <a:rPr lang="en-US" dirty="0"/>
+              <a:t>Cardinality (2/3)</a:t>
+            </a:r>
+            <a:endParaRPr lang="en-CH" dirty="0"/>
+          </a:p>
+        </p:txBody>
+      </p:sp>
+      <p:pic>
+        <p:nvPicPr>
+          <p:cNvPr id="9" name="Picture 8">
+            <a:extLst>
+              <a:ext uri="{FF2B5EF4-FFF2-40B4-BE49-F238E27FC236}">
+                <a16:creationId xmlns:a16="http://schemas.microsoft.com/office/drawing/2014/main" id="{C4DEC049-5711-464A-B3EB-98AD74A156DD}"/>
+              </a:ext>
+            </a:extLst>
+          </p:cNvPr>
+          <p:cNvPicPr>
+            <a:picLocks noChangeAspect="1"/>
+          </p:cNvPicPr>
+          <p:nvPr/>
+        </p:nvPicPr>
+        <p:blipFill>
+          <a:blip r:embed="rId3"/>
+          <a:stretch>
+            <a:fillRect/>
+          </a:stretch>
+        </p:blipFill>
+        <p:spPr>
+          <a:xfrm>
+            <a:off x="6961556" y="2238831"/>
+            <a:ext cx="3648611" cy="1671810"/>
+          </a:xfrm>
+          <a:prstGeom prst="rect">
+            <a:avLst/>
+          </a:prstGeom>
+        </p:spPr>
+      </p:pic>
+      <p:pic>
+        <p:nvPicPr>
+          <p:cNvPr id="11" name="Picture 10">
+            <a:extLst>
+              <a:ext uri="{FF2B5EF4-FFF2-40B4-BE49-F238E27FC236}">
+                <a16:creationId xmlns:a16="http://schemas.microsoft.com/office/drawing/2014/main" id="{75415781-E513-43B2-8ACB-7A54256AA994}"/>
+              </a:ext>
+            </a:extLst>
+          </p:cNvPr>
+          <p:cNvPicPr>
+            <a:picLocks noChangeAspect="1"/>
+          </p:cNvPicPr>
+          <p:nvPr/>
+        </p:nvPicPr>
+        <p:blipFill>
+          <a:blip r:embed="rId4"/>
+          <a:stretch>
+            <a:fillRect/>
+          </a:stretch>
+        </p:blipFill>
+        <p:spPr>
+          <a:xfrm>
+            <a:off x="838200" y="1884568"/>
+            <a:ext cx="4802436" cy="2380337"/>
+          </a:xfrm>
+          <a:prstGeom prst="rect">
+            <a:avLst/>
+          </a:prstGeom>
+        </p:spPr>
+      </p:pic>
+      <p:pic>
+        <p:nvPicPr>
+          <p:cNvPr id="13" name="Graphic 12" descr="Thumbs Down with solid fill">
+            <a:extLst>
+              <a:ext uri="{FF2B5EF4-FFF2-40B4-BE49-F238E27FC236}">
+                <a16:creationId xmlns:a16="http://schemas.microsoft.com/office/drawing/2014/main" id="{EA734CAC-E648-4DC7-816F-EAC3A2990A95}"/>
+              </a:ext>
+            </a:extLst>
+          </p:cNvPr>
+          <p:cNvPicPr>
+            <a:picLocks noChangeAspect="1"/>
+          </p:cNvPicPr>
+          <p:nvPr/>
+        </p:nvPicPr>
+        <p:blipFill>
+          <a:blip r:embed="rId5">
+            <a:extLst>
+              <a:ext uri="{28A0092B-C50C-407E-A947-70E740481C1C}">
+                <a14:useLocalDpi xmlns:a14="http://schemas.microsoft.com/office/drawing/2010/main" val="0"/>
+              </a:ext>
+              <a:ext uri="{96DAC541-7B7A-43D3-8B79-37D633B846F1}">
+                <asvg:svgBlip xmlns:asvg="http://schemas.microsoft.com/office/drawing/2016/SVG/main" r:embed="rId6"/>
+              </a:ext>
+            </a:extLst>
+          </a:blip>
+          <a:stretch>
+            <a:fillRect/>
+          </a:stretch>
+        </p:blipFill>
+        <p:spPr>
+          <a:xfrm>
+            <a:off x="2650016" y="4521867"/>
+            <a:ext cx="914400" cy="914400"/>
+          </a:xfrm>
+          <a:prstGeom prst="rect">
+            <a:avLst/>
+          </a:prstGeom>
+        </p:spPr>
+      </p:pic>
+      <p:pic>
+        <p:nvPicPr>
+          <p:cNvPr id="15" name="Graphic 14" descr="Thumbs up sign with solid fill">
+            <a:extLst>
+              <a:ext uri="{FF2B5EF4-FFF2-40B4-BE49-F238E27FC236}">
+                <a16:creationId xmlns:a16="http://schemas.microsoft.com/office/drawing/2014/main" id="{3EBA9A71-E888-488E-91DF-079D9542A1AA}"/>
+              </a:ext>
+            </a:extLst>
+          </p:cNvPr>
+          <p:cNvPicPr>
+            <a:picLocks noChangeAspect="1"/>
+          </p:cNvPicPr>
+          <p:nvPr/>
+        </p:nvPicPr>
+        <p:blipFill>
+          <a:blip r:embed="rId7">
+            <a:extLst>
+              <a:ext uri="{28A0092B-C50C-407E-A947-70E740481C1C}">
+                <a14:useLocalDpi xmlns:a14="http://schemas.microsoft.com/office/drawing/2010/main" val="0"/>
+              </a:ext>
+              <a:ext uri="{96DAC541-7B7A-43D3-8B79-37D633B846F1}">
+                <asvg:svgBlip xmlns:asvg="http://schemas.microsoft.com/office/drawing/2016/SVG/main" r:embed="rId8"/>
+              </a:ext>
+            </a:extLst>
+          </a:blip>
+          <a:stretch>
+            <a:fillRect/>
+          </a:stretch>
+        </p:blipFill>
+        <p:spPr>
+          <a:xfrm>
+            <a:off x="8170386" y="4521867"/>
+            <a:ext cx="914400" cy="914400"/>
+          </a:xfrm>
+          <a:prstGeom prst="rect">
+            <a:avLst/>
+          </a:prstGeom>
+        </p:spPr>
+      </p:pic>
+    </p:spTree>
+    <p:extLst>
+      <p:ext uri="{BB962C8B-B14F-4D97-AF65-F5344CB8AC3E}">
+        <p14:creationId xmlns:p14="http://schemas.microsoft.com/office/powerpoint/2010/main" val="3081153295"/>
+      </p:ext>
+    </p:extLst>
+  </p:cSld>
+  <p:clrMapOvr>
+    <a:masterClrMapping/>
+  </p:clrMapOvr>
+</p:sld>
+</file>
+
+<file path=ppt/slides/slide15.xml><?xml version="1.0" encoding="utf-8"?>
+<p:sld xmlns:a="http://schemas.openxmlformats.org/drawingml/2006/main" xmlns:r="http://schemas.openxmlformats.org/officeDocument/2006/relationships" xmlns:p="http://schemas.openxmlformats.org/presentationml/2006/main">
+  <p:cSld>
+    <p:spTree>
+      <p:nvGrpSpPr>
+        <p:cNvPr id="1" name=""/>
+        <p:cNvGrpSpPr/>
+        <p:nvPr/>
+      </p:nvGrpSpPr>
+      <p:grpSpPr>
+        <a:xfrm>
+          <a:off x="0" y="0"/>
+          <a:ext cx="0" cy="0"/>
+          <a:chOff x="0" y="0"/>
+          <a:chExt cx="0" cy="0"/>
+        </a:xfrm>
+      </p:grpSpPr>
+      <p:sp>
+        <p:nvSpPr>
+          <p:cNvPr id="2" name="Title 1">
+            <a:extLst>
+              <a:ext uri="{FF2B5EF4-FFF2-40B4-BE49-F238E27FC236}">
+                <a16:creationId xmlns:a16="http://schemas.microsoft.com/office/drawing/2014/main" id="{03812D1F-F6DF-42A7-8DA2-1A5A8243FD15}"/>
+              </a:ext>
+            </a:extLst>
+          </p:cNvPr>
+          <p:cNvSpPr>
+            <a:spLocks noGrp="1"/>
+          </p:cNvSpPr>
+          <p:nvPr>
+            <p:ph type="title"/>
+          </p:nvPr>
+        </p:nvSpPr>
+        <p:spPr/>
+        <p:txBody>
+          <a:bodyPr/>
+          <a:lstStyle/>
+          <a:p>
+            <a:r>
+              <a:rPr lang="en-US" dirty="0"/>
+              <a:t>Cardinality (3/3)</a:t>
+            </a:r>
+            <a:endParaRPr lang="en-CH" dirty="0"/>
+          </a:p>
+        </p:txBody>
+      </p:sp>
+      <p:sp>
+        <p:nvSpPr>
+          <p:cNvPr id="5" name="Content Placeholder 4">
+            <a:extLst>
+              <a:ext uri="{FF2B5EF4-FFF2-40B4-BE49-F238E27FC236}">
+                <a16:creationId xmlns:a16="http://schemas.microsoft.com/office/drawing/2014/main" id="{3A5FB3D3-4BB6-451A-91DF-53D8A59B2AD4}"/>
+              </a:ext>
+            </a:extLst>
+          </p:cNvPr>
+          <p:cNvSpPr>
+            <a:spLocks noGrp="1"/>
+          </p:cNvSpPr>
+          <p:nvPr>
+            <p:ph idx="1"/>
+          </p:nvPr>
+        </p:nvSpPr>
+        <p:spPr/>
+        <p:txBody>
+          <a:bodyPr>
+            <a:normAutofit/>
+          </a:bodyPr>
+          <a:lstStyle/>
+          <a:p>
+            <a:r>
+              <a:rPr lang="en-US" dirty="0"/>
+              <a:t>Syntax</a:t>
+            </a:r>
+          </a:p>
+          <a:p>
+            <a:pPr lvl="1"/>
+            <a:r>
+              <a:rPr lang="de-CH" b="0" i="0" dirty="0">
+                <a:solidFill>
+                  <a:srgbClr val="444444"/>
+                </a:solidFill>
+                <a:effectLst/>
+                <a:latin typeface="SFMono-Regular"/>
+              </a:rPr>
+              <a:t>&lt;</a:t>
+            </a:r>
+            <a:r>
+              <a:rPr lang="de-CH" b="0" i="0" dirty="0" err="1">
+                <a:solidFill>
+                  <a:srgbClr val="444444"/>
+                </a:solidFill>
+                <a:effectLst/>
+                <a:latin typeface="SFMono-Regular"/>
+              </a:rPr>
+              <a:t>multiInstanceLoopCharacteristics</a:t>
+            </a:r>
+            <a:r>
+              <a:rPr lang="de-CH" b="0" i="0" dirty="0">
+                <a:solidFill>
+                  <a:srgbClr val="444444"/>
+                </a:solidFill>
+                <a:effectLst/>
+                <a:latin typeface="SFMono-Regular"/>
+              </a:rPr>
+              <a:t> </a:t>
+            </a:r>
+            <a:r>
+              <a:rPr lang="de-CH" b="0" i="0" dirty="0" err="1">
+                <a:solidFill>
+                  <a:srgbClr val="444444"/>
+                </a:solidFill>
+                <a:effectLst/>
+                <a:latin typeface="SFMono-Regular"/>
+              </a:rPr>
+              <a:t>isSequential</a:t>
+            </a:r>
+            <a:r>
+              <a:rPr lang="de-CH" b="0" i="0" dirty="0">
+                <a:solidFill>
+                  <a:srgbClr val="444444"/>
+                </a:solidFill>
+                <a:effectLst/>
+                <a:latin typeface="SFMono-Regular"/>
+              </a:rPr>
+              <a:t>="</a:t>
+            </a:r>
+            <a:r>
+              <a:rPr lang="de-CH" b="0" i="0" dirty="0" err="1">
+                <a:solidFill>
+                  <a:srgbClr val="444444"/>
+                </a:solidFill>
+                <a:effectLst/>
+                <a:latin typeface="SFMono-Regular"/>
+              </a:rPr>
+              <a:t>false|true</a:t>
+            </a:r>
+            <a:r>
+              <a:rPr lang="de-CH" b="0" i="0" dirty="0">
+                <a:solidFill>
+                  <a:srgbClr val="444444"/>
+                </a:solidFill>
+                <a:effectLst/>
+                <a:latin typeface="SFMono-Regular"/>
+              </a:rPr>
+              <a:t>"&gt; </a:t>
+            </a:r>
+            <a:r>
+              <a:rPr lang="de-CH" b="0" i="0" dirty="0">
+                <a:solidFill>
+                  <a:srgbClr val="444444"/>
+                </a:solidFill>
+                <a:effectLst/>
+                <a:highlight>
+                  <a:srgbClr val="FFFF00"/>
+                </a:highlight>
+                <a:latin typeface="SFMono-Regular"/>
+              </a:rPr>
+              <a:t>&lt;</a:t>
+            </a:r>
+            <a:r>
+              <a:rPr lang="de-CH" b="0" i="0" dirty="0" err="1">
+                <a:solidFill>
+                  <a:srgbClr val="444444"/>
+                </a:solidFill>
+                <a:effectLst/>
+                <a:highlight>
+                  <a:srgbClr val="FFFF00"/>
+                </a:highlight>
+                <a:latin typeface="SFMono-Regular"/>
+              </a:rPr>
+              <a:t>loopCardinality</a:t>
+            </a:r>
+            <a:r>
+              <a:rPr lang="de-CH" b="0" i="0" dirty="0">
+                <a:solidFill>
+                  <a:srgbClr val="444444"/>
+                </a:solidFill>
+                <a:effectLst/>
+                <a:highlight>
+                  <a:srgbClr val="FFFF00"/>
+                </a:highlight>
+                <a:latin typeface="SFMono-Regular"/>
+              </a:rPr>
+              <a:t>&gt;5&lt;/</a:t>
+            </a:r>
+            <a:r>
+              <a:rPr lang="de-CH" b="0" i="0" dirty="0" err="1">
+                <a:solidFill>
+                  <a:srgbClr val="444444"/>
+                </a:solidFill>
+                <a:effectLst/>
+                <a:highlight>
+                  <a:srgbClr val="FFFF00"/>
+                </a:highlight>
+                <a:latin typeface="SFMono-Regular"/>
+              </a:rPr>
+              <a:t>loopCardinality</a:t>
+            </a:r>
+            <a:r>
+              <a:rPr lang="de-CH" b="0" i="0" dirty="0">
+                <a:solidFill>
+                  <a:srgbClr val="444444"/>
+                </a:solidFill>
+                <a:effectLst/>
+                <a:highlight>
+                  <a:srgbClr val="FFFF00"/>
+                </a:highlight>
+                <a:latin typeface="SFMono-Regular"/>
+              </a:rPr>
+              <a:t>&gt; &lt;/</a:t>
+            </a:r>
+            <a:r>
+              <a:rPr lang="de-CH" b="0" i="0" dirty="0" err="1">
+                <a:solidFill>
+                  <a:srgbClr val="444444"/>
+                </a:solidFill>
+                <a:effectLst/>
+                <a:highlight>
+                  <a:srgbClr val="FFFF00"/>
+                </a:highlight>
+                <a:latin typeface="SFMono-Regular"/>
+              </a:rPr>
+              <a:t>multiInstanceLoopCharacteristics</a:t>
+            </a:r>
+            <a:r>
+              <a:rPr lang="de-CH" b="0" i="0" dirty="0">
+                <a:solidFill>
+                  <a:srgbClr val="444444"/>
+                </a:solidFill>
+                <a:effectLst/>
+                <a:highlight>
+                  <a:srgbClr val="FFFF00"/>
+                </a:highlight>
+                <a:latin typeface="SFMono-Regular"/>
+              </a:rPr>
+              <a:t>&gt;</a:t>
+            </a:r>
+            <a:endParaRPr lang="en-US" b="0" i="0" dirty="0">
+              <a:solidFill>
+                <a:srgbClr val="444444"/>
+              </a:solidFill>
+              <a:effectLst/>
+              <a:highlight>
+                <a:srgbClr val="FFFF00"/>
+              </a:highlight>
+              <a:latin typeface="SFMono-Regular"/>
+            </a:endParaRPr>
+          </a:p>
+          <a:p>
+            <a:pPr lvl="1"/>
+            <a:r>
+              <a:rPr lang="de-CH" b="0" i="0" dirty="0">
+                <a:solidFill>
+                  <a:srgbClr val="444444"/>
+                </a:solidFill>
+                <a:effectLst/>
+                <a:latin typeface="SFMono-Regular"/>
+              </a:rPr>
+              <a:t>&lt;</a:t>
+            </a:r>
+            <a:r>
+              <a:rPr lang="de-CH" b="0" i="0" dirty="0" err="1">
+                <a:solidFill>
+                  <a:srgbClr val="444444"/>
+                </a:solidFill>
+                <a:effectLst/>
+                <a:latin typeface="SFMono-Regular"/>
+              </a:rPr>
+              <a:t>multiInstanceLoopCharacteristics</a:t>
+            </a:r>
+            <a:r>
+              <a:rPr lang="de-CH" b="0" i="0" dirty="0">
+                <a:solidFill>
+                  <a:srgbClr val="444444"/>
+                </a:solidFill>
+                <a:effectLst/>
+                <a:latin typeface="SFMono-Regular"/>
+              </a:rPr>
+              <a:t> </a:t>
+            </a:r>
+            <a:r>
+              <a:rPr lang="de-CH" b="0" i="0" dirty="0" err="1">
+                <a:solidFill>
+                  <a:srgbClr val="444444"/>
+                </a:solidFill>
+                <a:effectLst/>
+                <a:latin typeface="SFMono-Regular"/>
+              </a:rPr>
+              <a:t>isSequential</a:t>
+            </a:r>
+            <a:r>
+              <a:rPr lang="de-CH" b="0" i="0" dirty="0">
+                <a:solidFill>
+                  <a:srgbClr val="444444"/>
+                </a:solidFill>
+                <a:effectLst/>
+                <a:latin typeface="SFMono-Regular"/>
+              </a:rPr>
+              <a:t>="</a:t>
+            </a:r>
+            <a:r>
+              <a:rPr lang="de-CH" b="0" i="0" dirty="0" err="1">
+                <a:solidFill>
+                  <a:srgbClr val="444444"/>
+                </a:solidFill>
+                <a:effectLst/>
+                <a:latin typeface="SFMono-Regular"/>
+              </a:rPr>
+              <a:t>false|true</a:t>
+            </a:r>
+            <a:r>
+              <a:rPr lang="de-CH" b="0" i="0" dirty="0">
+                <a:solidFill>
+                  <a:srgbClr val="444444"/>
+                </a:solidFill>
+                <a:effectLst/>
+                <a:latin typeface="SFMono-Regular"/>
+              </a:rPr>
+              <a:t>"&gt; </a:t>
+            </a:r>
+            <a:r>
+              <a:rPr lang="de-CH" b="0" i="0" dirty="0">
+                <a:solidFill>
+                  <a:srgbClr val="444444"/>
+                </a:solidFill>
+                <a:effectLst/>
+                <a:highlight>
+                  <a:srgbClr val="FFFF00"/>
+                </a:highlight>
+                <a:latin typeface="SFMono-Regular"/>
+              </a:rPr>
+              <a:t>&lt;</a:t>
+            </a:r>
+            <a:r>
+              <a:rPr lang="de-CH" b="0" i="0" dirty="0" err="1">
+                <a:solidFill>
+                  <a:srgbClr val="444444"/>
+                </a:solidFill>
+                <a:effectLst/>
+                <a:highlight>
+                  <a:srgbClr val="FFFF00"/>
+                </a:highlight>
+                <a:latin typeface="SFMono-Regular"/>
+              </a:rPr>
+              <a:t>loopCardinality</a:t>
+            </a:r>
+            <a:r>
+              <a:rPr lang="de-CH" b="0" i="0" dirty="0">
+                <a:solidFill>
+                  <a:srgbClr val="444444"/>
+                </a:solidFill>
+                <a:effectLst/>
+                <a:highlight>
+                  <a:srgbClr val="FFFF00"/>
+                </a:highlight>
+                <a:latin typeface="SFMono-Regular"/>
+              </a:rPr>
+              <a:t>&gt;${</a:t>
+            </a:r>
+            <a:r>
+              <a:rPr lang="de-CH" b="0" i="0" dirty="0" err="1">
+                <a:solidFill>
+                  <a:srgbClr val="444444"/>
+                </a:solidFill>
+                <a:effectLst/>
+                <a:highlight>
+                  <a:srgbClr val="FFFF00"/>
+                </a:highlight>
+                <a:latin typeface="SFMono-Regular"/>
+              </a:rPr>
+              <a:t>nrOfOrders-nrOfCancellations</a:t>
+            </a:r>
+            <a:r>
+              <a:rPr lang="de-CH" b="0" i="0" dirty="0">
+                <a:solidFill>
+                  <a:srgbClr val="444444"/>
+                </a:solidFill>
+                <a:effectLst/>
+                <a:highlight>
+                  <a:srgbClr val="FFFF00"/>
+                </a:highlight>
+                <a:latin typeface="SFMono-Regular"/>
+              </a:rPr>
+              <a:t>}&lt;/</a:t>
+            </a:r>
+            <a:r>
+              <a:rPr lang="de-CH" b="0" i="0" dirty="0" err="1">
+                <a:solidFill>
+                  <a:srgbClr val="444444"/>
+                </a:solidFill>
+                <a:effectLst/>
+                <a:highlight>
+                  <a:srgbClr val="FFFF00"/>
+                </a:highlight>
+                <a:latin typeface="SFMono-Regular"/>
+              </a:rPr>
+              <a:t>loopCardinality</a:t>
+            </a:r>
+            <a:r>
+              <a:rPr lang="de-CH" b="0" i="0" dirty="0">
+                <a:solidFill>
+                  <a:srgbClr val="444444"/>
+                </a:solidFill>
+                <a:effectLst/>
+                <a:highlight>
+                  <a:srgbClr val="FFFF00"/>
+                </a:highlight>
+                <a:latin typeface="SFMono-Regular"/>
+              </a:rPr>
+              <a:t>&gt; </a:t>
+            </a:r>
+            <a:r>
+              <a:rPr lang="de-CH" b="0" i="0" dirty="0">
+                <a:solidFill>
+                  <a:srgbClr val="444444"/>
+                </a:solidFill>
+                <a:effectLst/>
+                <a:latin typeface="SFMono-Regular"/>
+              </a:rPr>
+              <a:t>&lt;/</a:t>
+            </a:r>
+            <a:r>
+              <a:rPr lang="de-CH" b="0" i="0" dirty="0" err="1">
+                <a:solidFill>
+                  <a:srgbClr val="444444"/>
+                </a:solidFill>
+                <a:effectLst/>
+                <a:latin typeface="SFMono-Regular"/>
+              </a:rPr>
+              <a:t>multiInstanceLoopCharacteristics</a:t>
+            </a:r>
+            <a:r>
+              <a:rPr lang="de-CH" b="0" i="0" dirty="0">
+                <a:solidFill>
+                  <a:srgbClr val="444444"/>
+                </a:solidFill>
+                <a:effectLst/>
+                <a:latin typeface="SFMono-Regular"/>
+              </a:rPr>
+              <a:t>&gt;</a:t>
+            </a:r>
+            <a:endParaRPr lang="en-US" dirty="0">
+              <a:solidFill>
+                <a:srgbClr val="444444"/>
+              </a:solidFill>
+              <a:latin typeface="SFMono-Regular"/>
+            </a:endParaRPr>
+          </a:p>
+          <a:p>
+            <a:pPr lvl="1"/>
+            <a:r>
+              <a:rPr lang="de-CH" b="0" i="0" dirty="0">
+                <a:solidFill>
+                  <a:srgbClr val="444444"/>
+                </a:solidFill>
+                <a:effectLst/>
+                <a:latin typeface="SFMono-Regular"/>
+              </a:rPr>
+              <a:t>&lt;</a:t>
+            </a:r>
+            <a:r>
+              <a:rPr lang="de-CH" b="0" i="0" dirty="0" err="1">
+                <a:solidFill>
+                  <a:srgbClr val="444444"/>
+                </a:solidFill>
+                <a:effectLst/>
+                <a:latin typeface="SFMono-Regular"/>
+              </a:rPr>
+              <a:t>multiInstanceLoopCharacteristics</a:t>
+            </a:r>
+            <a:r>
+              <a:rPr lang="de-CH" b="0" i="0" dirty="0">
+                <a:solidFill>
+                  <a:srgbClr val="444444"/>
+                </a:solidFill>
+                <a:effectLst/>
+                <a:latin typeface="SFMono-Regular"/>
+              </a:rPr>
+              <a:t> </a:t>
+            </a:r>
+            <a:r>
+              <a:rPr lang="de-CH" b="0" i="0" dirty="0" err="1">
+                <a:solidFill>
+                  <a:srgbClr val="444444"/>
+                </a:solidFill>
+                <a:effectLst/>
+                <a:latin typeface="SFMono-Regular"/>
+              </a:rPr>
+              <a:t>isSequential</a:t>
+            </a:r>
+            <a:r>
+              <a:rPr lang="de-CH" b="0" i="0" dirty="0">
+                <a:solidFill>
+                  <a:srgbClr val="444444"/>
+                </a:solidFill>
+                <a:effectLst/>
+                <a:latin typeface="SFMono-Regular"/>
+              </a:rPr>
+              <a:t>="</a:t>
+            </a:r>
+            <a:r>
+              <a:rPr lang="de-CH" b="0" i="0" dirty="0" err="1">
+                <a:solidFill>
+                  <a:srgbClr val="444444"/>
+                </a:solidFill>
+                <a:effectLst/>
+                <a:latin typeface="SFMono-Regular"/>
+              </a:rPr>
+              <a:t>false</a:t>
+            </a:r>
+            <a:r>
+              <a:rPr lang="de-CH" b="0" i="0" dirty="0">
+                <a:solidFill>
+                  <a:srgbClr val="444444"/>
+                </a:solidFill>
+                <a:effectLst/>
+                <a:latin typeface="SFMono-Regular"/>
+              </a:rPr>
+              <a:t>" </a:t>
+            </a:r>
+            <a:r>
+              <a:rPr lang="de-CH" b="0" i="0" dirty="0" err="1">
+                <a:solidFill>
+                  <a:srgbClr val="444444"/>
+                </a:solidFill>
+                <a:effectLst/>
+                <a:highlight>
+                  <a:srgbClr val="FFFF00"/>
+                </a:highlight>
+                <a:latin typeface="SFMono-Regular"/>
+              </a:rPr>
+              <a:t>flowable:collection</a:t>
+            </a:r>
+            <a:r>
+              <a:rPr lang="de-CH" b="0" i="0" dirty="0">
+                <a:solidFill>
+                  <a:srgbClr val="444444"/>
+                </a:solidFill>
+                <a:effectLst/>
+                <a:highlight>
+                  <a:srgbClr val="FFFF00"/>
+                </a:highlight>
+                <a:latin typeface="SFMono-Regular"/>
+              </a:rPr>
+              <a:t>=«</a:t>
+            </a:r>
+            <a:r>
+              <a:rPr lang="de-CH" b="1" i="0" dirty="0" err="1">
+                <a:solidFill>
+                  <a:srgbClr val="444444"/>
+                </a:solidFill>
+                <a:effectLst/>
+                <a:highlight>
+                  <a:srgbClr val="FFFF00"/>
+                </a:highlight>
+                <a:latin typeface="SFMono-Regular"/>
+              </a:rPr>
+              <a:t>loopList</a:t>
+            </a:r>
+            <a:r>
+              <a:rPr lang="de-CH" b="0" i="0" dirty="0">
+                <a:solidFill>
+                  <a:srgbClr val="444444"/>
+                </a:solidFill>
+                <a:effectLst/>
+                <a:highlight>
+                  <a:srgbClr val="FFFF00"/>
+                </a:highlight>
+                <a:latin typeface="SFMono-Regular"/>
+              </a:rPr>
+              <a:t>" </a:t>
+            </a:r>
+            <a:r>
+              <a:rPr lang="de-CH" b="0" i="0" dirty="0" err="1">
+                <a:solidFill>
+                  <a:srgbClr val="444444"/>
+                </a:solidFill>
+                <a:effectLst/>
+                <a:highlight>
+                  <a:srgbClr val="FFFF00"/>
+                </a:highlight>
+                <a:latin typeface="SFMono-Regular"/>
+              </a:rPr>
+              <a:t>flowable:elementVariable</a:t>
+            </a:r>
+            <a:r>
+              <a:rPr lang="de-CH" b="0" i="0" dirty="0">
+                <a:solidFill>
+                  <a:srgbClr val="444444"/>
+                </a:solidFill>
+                <a:effectLst/>
+                <a:highlight>
+                  <a:srgbClr val="FFFF00"/>
+                </a:highlight>
+                <a:latin typeface="SFMono-Regular"/>
+              </a:rPr>
+              <a:t>=«</a:t>
+            </a:r>
+            <a:r>
+              <a:rPr lang="de-CH" b="1" i="0" dirty="0" err="1">
+                <a:solidFill>
+                  <a:srgbClr val="444444"/>
+                </a:solidFill>
+                <a:effectLst/>
+                <a:highlight>
+                  <a:srgbClr val="FFFF00"/>
+                </a:highlight>
+                <a:latin typeface="SFMono-Regular"/>
+              </a:rPr>
+              <a:t>listItem</a:t>
+            </a:r>
+            <a:r>
+              <a:rPr lang="de-CH" b="0" i="0" dirty="0">
+                <a:solidFill>
+                  <a:srgbClr val="444444"/>
+                </a:solidFill>
+                <a:effectLst/>
+                <a:highlight>
+                  <a:srgbClr val="FFFF00"/>
+                </a:highlight>
+                <a:latin typeface="SFMono-Regular"/>
+              </a:rPr>
+              <a:t>" &gt; </a:t>
+            </a:r>
+            <a:r>
+              <a:rPr lang="de-CH" b="0" i="0" dirty="0">
+                <a:solidFill>
+                  <a:srgbClr val="444444"/>
+                </a:solidFill>
+                <a:effectLst/>
+                <a:latin typeface="SFMono-Regular"/>
+              </a:rPr>
+              <a:t>&lt;/</a:t>
+            </a:r>
+            <a:r>
+              <a:rPr lang="de-CH" b="0" i="0" dirty="0" err="1">
+                <a:solidFill>
+                  <a:srgbClr val="444444"/>
+                </a:solidFill>
+                <a:effectLst/>
+                <a:latin typeface="SFMono-Regular"/>
+              </a:rPr>
+              <a:t>multiInstanceLoopCharacteristics</a:t>
+            </a:r>
+            <a:r>
+              <a:rPr lang="de-CH" b="0" i="0" dirty="0">
+                <a:solidFill>
+                  <a:srgbClr val="444444"/>
+                </a:solidFill>
+                <a:effectLst/>
+                <a:latin typeface="SFMono-Regular"/>
+              </a:rPr>
+              <a:t>&gt;</a:t>
+            </a:r>
+            <a:endParaRPr lang="en-CH" dirty="0"/>
+          </a:p>
+        </p:txBody>
+      </p:sp>
+    </p:spTree>
+    <p:extLst>
+      <p:ext uri="{BB962C8B-B14F-4D97-AF65-F5344CB8AC3E}">
+        <p14:creationId xmlns:p14="http://schemas.microsoft.com/office/powerpoint/2010/main" val="1634682293"/>
+      </p:ext>
+    </p:extLst>
+  </p:cSld>
+  <p:clrMapOvr>
+    <a:masterClrMapping/>
+  </p:clrMapOvr>
+</p:sld>
+</file>
+
+<file path=ppt/slides/slide16.xml><?xml version="1.0" encoding="utf-8"?>
+<p:sld xmlns:a="http://schemas.openxmlformats.org/drawingml/2006/main" xmlns:r="http://schemas.openxmlformats.org/officeDocument/2006/relationships" xmlns:p="http://schemas.openxmlformats.org/presentationml/2006/main">
+  <p:cSld>
+    <p:spTree>
+      <p:nvGrpSpPr>
+        <p:cNvPr id="1" name=""/>
+        <p:cNvGrpSpPr/>
+        <p:nvPr/>
+      </p:nvGrpSpPr>
+      <p:grpSpPr>
+        <a:xfrm>
+          <a:off x="0" y="0"/>
+          <a:ext cx="0" cy="0"/>
+          <a:chOff x="0" y="0"/>
+          <a:chExt cx="0" cy="0"/>
+        </a:xfrm>
+      </p:grpSpPr>
+      <p:sp>
+        <p:nvSpPr>
+          <p:cNvPr id="2" name="Title 1">
+            <a:extLst>
+              <a:ext uri="{FF2B5EF4-FFF2-40B4-BE49-F238E27FC236}">
+                <a16:creationId xmlns:a16="http://schemas.microsoft.com/office/drawing/2014/main" id="{03812D1F-F6DF-42A7-8DA2-1A5A8243FD15}"/>
+              </a:ext>
+            </a:extLst>
+          </p:cNvPr>
+          <p:cNvSpPr>
+            <a:spLocks noGrp="1"/>
+          </p:cNvSpPr>
+          <p:nvPr>
+            <p:ph type="title"/>
+          </p:nvPr>
+        </p:nvSpPr>
+        <p:spPr/>
+        <p:txBody>
+          <a:bodyPr/>
+          <a:lstStyle/>
+          <a:p>
+            <a:r>
+              <a:rPr lang="en-US" dirty="0"/>
               <a:t>Call Activities / Subprocesses (1/5)</a:t>
             </a:r>
             <a:endParaRPr lang="en-CH" dirty="0"/>
@@ -5451,6 +6443,45 @@
           </a:fontRef>
         </p:style>
       </p:cxnSp>
+      <p:sp>
+        <p:nvSpPr>
+          <p:cNvPr id="3" name="TextBox 2">
+            <a:extLst>
+              <a:ext uri="{FF2B5EF4-FFF2-40B4-BE49-F238E27FC236}">
+                <a16:creationId xmlns:a16="http://schemas.microsoft.com/office/drawing/2014/main" id="{E3B2CD88-1BB4-4845-84AE-4FF512A161F8}"/>
+              </a:ext>
+            </a:extLst>
+          </p:cNvPr>
+          <p:cNvSpPr txBox="1"/>
+          <p:nvPr/>
+        </p:nvSpPr>
+        <p:spPr>
+          <a:xfrm>
+            <a:off x="8090085" y="4414835"/>
+            <a:ext cx="2999678" cy="369332"/>
+          </a:xfrm>
+          <a:prstGeom prst="rect">
+            <a:avLst/>
+          </a:prstGeom>
+          <a:noFill/>
+        </p:spPr>
+        <p:txBody>
+          <a:bodyPr wrap="square" rtlCol="0">
+            <a:spAutoFit/>
+          </a:bodyPr>
+          <a:lstStyle/>
+          <a:p>
+            <a:r>
+              <a:rPr lang="de-CH" b="1" dirty="0">
+                <a:solidFill>
+                  <a:srgbClr val="FF0000"/>
+                </a:solidFill>
+              </a:rPr>
+              <a:t>Reference to external process</a:t>
+            </a:r>
+          </a:p>
+        </p:txBody>
+      </p:sp>
     </p:spTree>
     <p:extLst>
       <p:ext uri="{BB962C8B-B14F-4D97-AF65-F5344CB8AC3E}">
@@ -5464,7 +6495,7 @@
 </p:sld>
 </file>
 
-<file path=ppt/slides/slide14.xml><?xml version="1.0" encoding="utf-8"?>
+<file path=ppt/slides/slide17.xml><?xml version="1.0" encoding="utf-8"?>
 <p:sld xmlns:a="http://schemas.openxmlformats.org/drawingml/2006/main" xmlns:r="http://schemas.openxmlformats.org/officeDocument/2006/relationships" xmlns:p="http://schemas.openxmlformats.org/presentationml/2006/main">
   <p:cSld>
     <p:spTree>
@@ -5914,9 +6945,51 @@
                   <a:srgbClr val="444444"/>
                 </a:solidFill>
                 <a:effectLst/>
+                <a:highlight>
+                  <a:srgbClr val="FFFF00"/>
+                </a:highlight>
                 <a:latin typeface="SFMono-Regular"/>
               </a:rPr>
               <a:t>calledElement</a:t>
+            </a:r>
+            <a:r>
+              <a:rPr lang="en-US" i="0" dirty="0">
+                <a:solidFill>
+                  <a:srgbClr val="444444"/>
+                </a:solidFill>
+                <a:effectLst/>
+                <a:highlight>
+                  <a:srgbClr val="FFFF00"/>
+                </a:highlight>
+                <a:latin typeface="SFMono-Regular"/>
+              </a:rPr>
+              <a:t>="</a:t>
+            </a:r>
+            <a:r>
+              <a:rPr lang="en-US" i="0" dirty="0" err="1">
+                <a:solidFill>
+                  <a:srgbClr val="444444"/>
+                </a:solidFill>
+                <a:effectLst/>
+                <a:highlight>
+                  <a:srgbClr val="FFFF00"/>
+                </a:highlight>
+                <a:latin typeface="SFMono-Regular"/>
+              </a:rPr>
+              <a:t>checkCreditProcess</a:t>
+            </a:r>
+            <a:r>
+              <a:rPr lang="en-US" i="0" dirty="0">
+                <a:solidFill>
+                  <a:srgbClr val="444444"/>
+                </a:solidFill>
+                <a:effectLst/>
+                <a:highlight>
+                  <a:srgbClr val="FFFF00"/>
+                </a:highlight>
+                <a:latin typeface="SFMono-Regular"/>
+              </a:rPr>
+              <a:t>" </a:t>
             </a:r>
             <a:r>
               <a:rPr lang="en-US" i="0" dirty="0">
@@ -5926,27 +6999,7 @@
                 <a:effectLst/>
                 <a:latin typeface="SFMono-Regular"/>
               </a:rPr>
-              <a:t>="</a:t>
-            </a:r>
-            <a:r>
-              <a:rPr lang="en-US" i="0" dirty="0" err="1">
-                <a:solidFill>
-                  <a:srgbClr val="444444"/>
-                </a:solidFill>
-                <a:effectLst/>
-                <a:latin typeface="SFMono-Regular"/>
-              </a:rPr>
-              <a:t>checkCreditProcess</a:t>
-            </a:r>
-            <a:r>
-              <a:rPr lang="en-US" i="0" dirty="0">
-                <a:solidFill>
-                  <a:srgbClr val="444444"/>
-                </a:solidFill>
-                <a:effectLst/>
-                <a:latin typeface="SFMono-Regular"/>
-              </a:rPr>
-              <a:t>" /&gt;</a:t>
+              <a:t>/&gt;</a:t>
             </a:r>
             <a:endParaRPr lang="en-CH" dirty="0"/>
           </a:p>
@@ -5968,7 +7021,7 @@
 </p:sld>
 </file>
 
-<file path=ppt/slides/slide15.xml><?xml version="1.0" encoding="utf-8"?>
+<file path=ppt/slides/slide18.xml><?xml version="1.0" encoding="utf-8"?>
 <p:sld xmlns:a="http://schemas.openxmlformats.org/drawingml/2006/main" xmlns:r="http://schemas.openxmlformats.org/officeDocument/2006/relationships" xmlns:p="http://schemas.openxmlformats.org/presentationml/2006/main">
   <p:cSld>
     <p:spTree>
@@ -6056,7 +7109,7 @@
 </p:sld>
 </file>
 
-<file path=ppt/slides/slide16.xml><?xml version="1.0" encoding="utf-8"?>
+<file path=ppt/slides/slide19.xml><?xml version="1.0" encoding="utf-8"?>
 <p:sld xmlns:a="http://schemas.openxmlformats.org/drawingml/2006/main" xmlns:r="http://schemas.openxmlformats.org/officeDocument/2006/relationships" xmlns:p="http://schemas.openxmlformats.org/presentationml/2006/main">
   <p:cSld>
     <p:spTree>
@@ -6555,7 +7608,127 @@
 </p:sld>
 </file>
 
-<file path=ppt/slides/slide17.xml><?xml version="1.0" encoding="utf-8"?>
+<file path=ppt/slides/slide2.xml><?xml version="1.0" encoding="utf-8"?>
+<p:sld xmlns:a="http://schemas.openxmlformats.org/drawingml/2006/main" xmlns:r="http://schemas.openxmlformats.org/officeDocument/2006/relationships" xmlns:p="http://schemas.openxmlformats.org/presentationml/2006/main">
+  <p:cSld>
+    <p:spTree>
+      <p:nvGrpSpPr>
+        <p:cNvPr id="1" name=""/>
+        <p:cNvGrpSpPr/>
+        <p:nvPr/>
+      </p:nvGrpSpPr>
+      <p:grpSpPr>
+        <a:xfrm>
+          <a:off x="0" y="0"/>
+          <a:ext cx="0" cy="0"/>
+          <a:chOff x="0" y="0"/>
+          <a:chExt cx="0" cy="0"/>
+        </a:xfrm>
+      </p:grpSpPr>
+      <p:sp>
+        <p:nvSpPr>
+          <p:cNvPr id="2" name="Title 1">
+            <a:extLst>
+              <a:ext uri="{FF2B5EF4-FFF2-40B4-BE49-F238E27FC236}">
+                <a16:creationId xmlns:a16="http://schemas.microsoft.com/office/drawing/2014/main" id="{03812D1F-F6DF-42A7-8DA2-1A5A8243FD15}"/>
+              </a:ext>
+            </a:extLst>
+          </p:cNvPr>
+          <p:cNvSpPr>
+            <a:spLocks noGrp="1"/>
+          </p:cNvSpPr>
+          <p:nvPr>
+            <p:ph type="title"/>
+          </p:nvPr>
+        </p:nvSpPr>
+        <p:spPr/>
+        <p:txBody>
+          <a:bodyPr/>
+          <a:lstStyle/>
+          <a:p>
+            <a:r>
+              <a:rPr lang="en-US" dirty="0"/>
+              <a:t>Flowable</a:t>
+            </a:r>
+            <a:endParaRPr lang="en-CH" dirty="0"/>
+          </a:p>
+        </p:txBody>
+      </p:sp>
+      <p:sp>
+        <p:nvSpPr>
+          <p:cNvPr id="4" name="Content Placeholder 2">
+            <a:extLst>
+              <a:ext uri="{FF2B5EF4-FFF2-40B4-BE49-F238E27FC236}">
+                <a16:creationId xmlns:a16="http://schemas.microsoft.com/office/drawing/2014/main" id="{8036383B-55A6-4A81-A07F-FF3C1BA6A11F}"/>
+              </a:ext>
+            </a:extLst>
+          </p:cNvPr>
+          <p:cNvSpPr>
+            <a:spLocks noGrp="1"/>
+          </p:cNvSpPr>
+          <p:nvPr>
+            <p:ph idx="1"/>
+          </p:nvPr>
+        </p:nvSpPr>
+        <p:spPr>
+          <a:xfrm>
+            <a:off x="838200" y="1825625"/>
+            <a:ext cx="10515600" cy="4351338"/>
+          </a:xfrm>
+        </p:spPr>
+        <p:txBody>
+          <a:bodyPr/>
+          <a:lstStyle/>
+          <a:p>
+            <a:r>
+              <a:rPr lang="en-US" dirty="0"/>
+              <a:t>Flowable = Process Engine capable of handling business processes notated in BPMN 2.0 (</a:t>
+            </a:r>
+            <a:r>
+              <a:rPr lang="en-US" dirty="0">
+                <a:hlinkClick r:id="rId2"/>
+              </a:rPr>
+              <a:t>https://www.omg.org/</a:t>
+            </a:r>
+            <a:r>
+              <a:rPr lang="en-US" dirty="0"/>
+              <a:t>)</a:t>
+            </a:r>
+          </a:p>
+          <a:p>
+            <a:r>
+              <a:rPr lang="en-US" dirty="0"/>
+              <a:t>Forked from Activiti</a:t>
+            </a:r>
+          </a:p>
+          <a:p>
+            <a:r>
+              <a:rPr lang="en-US" dirty="0"/>
+              <a:t>Open Source</a:t>
+            </a:r>
+          </a:p>
+          <a:p>
+            <a:r>
+              <a:rPr lang="en-US" dirty="0"/>
+              <a:t>Alternatives: Camunda, Activiti and several others</a:t>
+            </a:r>
+          </a:p>
+        </p:txBody>
+      </p:sp>
+    </p:spTree>
+    <p:extLst>
+      <p:ext uri="{BB962C8B-B14F-4D97-AF65-F5344CB8AC3E}">
+        <p14:creationId xmlns:p14="http://schemas.microsoft.com/office/powerpoint/2010/main" val="926033395"/>
+      </p:ext>
+    </p:extLst>
+  </p:cSld>
+  <p:clrMapOvr>
+    <a:masterClrMapping/>
+  </p:clrMapOvr>
+</p:sld>
+</file>
+
+<file path=ppt/slides/slide20.xml><?xml version="1.0" encoding="utf-8"?>
 <p:sld xmlns:a="http://schemas.openxmlformats.org/drawingml/2006/main" xmlns:r="http://schemas.openxmlformats.org/officeDocument/2006/relationships" xmlns:p="http://schemas.openxmlformats.org/presentationml/2006/main">
   <p:cSld>
     <p:spTree>
@@ -7800,1118 +8973,6 @@
     <p:extLst>
       <p:ext uri="{BB962C8B-B14F-4D97-AF65-F5344CB8AC3E}">
         <p14:creationId xmlns:p14="http://schemas.microsoft.com/office/powerpoint/2010/main" val="2290336490"/>
-      </p:ext>
-    </p:extLst>
-  </p:cSld>
-  <p:clrMapOvr>
-    <a:masterClrMapping/>
-  </p:clrMapOvr>
-</p:sld>
-</file>
-
-<file path=ppt/slides/slide18.xml><?xml version="1.0" encoding="utf-8"?>
-<p:sld xmlns:a="http://schemas.openxmlformats.org/drawingml/2006/main" xmlns:r="http://schemas.openxmlformats.org/officeDocument/2006/relationships" xmlns:p="http://schemas.openxmlformats.org/presentationml/2006/main">
-  <p:cSld>
-    <p:spTree>
-      <p:nvGrpSpPr>
-        <p:cNvPr id="1" name=""/>
-        <p:cNvGrpSpPr/>
-        <p:nvPr/>
-      </p:nvGrpSpPr>
-      <p:grpSpPr>
-        <a:xfrm>
-          <a:off x="0" y="0"/>
-          <a:ext cx="0" cy="0"/>
-          <a:chOff x="0" y="0"/>
-          <a:chExt cx="0" cy="0"/>
-        </a:xfrm>
-      </p:grpSpPr>
-      <p:sp>
-        <p:nvSpPr>
-          <p:cNvPr id="2" name="Title 1">
-            <a:extLst>
-              <a:ext uri="{FF2B5EF4-FFF2-40B4-BE49-F238E27FC236}">
-                <a16:creationId xmlns:a16="http://schemas.microsoft.com/office/drawing/2014/main" id="{03812D1F-F6DF-42A7-8DA2-1A5A8243FD15}"/>
-              </a:ext>
-            </a:extLst>
-          </p:cNvPr>
-          <p:cNvSpPr>
-            <a:spLocks noGrp="1"/>
-          </p:cNvSpPr>
-          <p:nvPr>
-            <p:ph type="title"/>
-          </p:nvPr>
-        </p:nvSpPr>
-        <p:spPr/>
-        <p:txBody>
-          <a:bodyPr/>
-          <a:lstStyle/>
-          <a:p>
-            <a:r>
-              <a:rPr lang="en-US" dirty="0"/>
-              <a:t>Cardinality (1/3)</a:t>
-            </a:r>
-            <a:endParaRPr lang="en-CH" dirty="0"/>
-          </a:p>
-        </p:txBody>
-      </p:sp>
-      <p:sp>
-        <p:nvSpPr>
-          <p:cNvPr id="4" name="Content Placeholder 3">
-            <a:extLst>
-              <a:ext uri="{FF2B5EF4-FFF2-40B4-BE49-F238E27FC236}">
-                <a16:creationId xmlns:a16="http://schemas.microsoft.com/office/drawing/2014/main" id="{B1A9B8FC-91B4-4D04-97E4-215B657E8A81}"/>
-              </a:ext>
-            </a:extLst>
-          </p:cNvPr>
-          <p:cNvSpPr>
-            <a:spLocks noGrp="1"/>
-          </p:cNvSpPr>
-          <p:nvPr>
-            <p:ph idx="1"/>
-          </p:nvPr>
-        </p:nvSpPr>
-        <p:spPr/>
-        <p:txBody>
-          <a:bodyPr/>
-          <a:lstStyle/>
-          <a:p>
-            <a:r>
-              <a:rPr lang="en-US" dirty="0"/>
-              <a:t>Executing a specific activity multiple times without complex modelling</a:t>
-            </a:r>
-          </a:p>
-          <a:p>
-            <a:pPr lvl="1"/>
-            <a:r>
-              <a:rPr lang="en-US" dirty="0"/>
-              <a:t>Loop a fixed number of times</a:t>
-            </a:r>
-          </a:p>
-          <a:p>
-            <a:pPr lvl="1"/>
-            <a:r>
-              <a:rPr lang="en-US" dirty="0"/>
-              <a:t>Variable number of times (determined by process variables)</a:t>
-            </a:r>
-          </a:p>
-          <a:p>
-            <a:pPr lvl="1"/>
-            <a:r>
-              <a:rPr lang="en-US" dirty="0"/>
-              <a:t>Loop over a list</a:t>
-            </a:r>
-          </a:p>
-          <a:p>
-            <a:pPr lvl="1"/>
-            <a:r>
-              <a:rPr lang="en-US" dirty="0"/>
-              <a:t>Define a “completion condition”</a:t>
-            </a:r>
-          </a:p>
-          <a:p>
-            <a:r>
-              <a:rPr lang="en-US" dirty="0">
-                <a:hlinkClick r:id="rId3"/>
-              </a:rPr>
-              <a:t>https://www.flowable.com/open-source/docs/bpmn/ch07b-BPMN-Constructs#multi-instance-for-each</a:t>
-            </a:r>
-            <a:endParaRPr lang="en-US" dirty="0"/>
-          </a:p>
-        </p:txBody>
-      </p:sp>
-    </p:spTree>
-    <p:extLst>
-      <p:ext uri="{BB962C8B-B14F-4D97-AF65-F5344CB8AC3E}">
-        <p14:creationId xmlns:p14="http://schemas.microsoft.com/office/powerpoint/2010/main" val="620836971"/>
-      </p:ext>
-    </p:extLst>
-  </p:cSld>
-  <p:clrMapOvr>
-    <a:masterClrMapping/>
-  </p:clrMapOvr>
-</p:sld>
-</file>
-
-<file path=ppt/slides/slide19.xml><?xml version="1.0" encoding="utf-8"?>
-<p:sld xmlns:a="http://schemas.openxmlformats.org/drawingml/2006/main" xmlns:r="http://schemas.openxmlformats.org/officeDocument/2006/relationships" xmlns:p="http://schemas.openxmlformats.org/presentationml/2006/main">
-  <p:cSld>
-    <p:spTree>
-      <p:nvGrpSpPr>
-        <p:cNvPr id="1" name=""/>
-        <p:cNvGrpSpPr/>
-        <p:nvPr/>
-      </p:nvGrpSpPr>
-      <p:grpSpPr>
-        <a:xfrm>
-          <a:off x="0" y="0"/>
-          <a:ext cx="0" cy="0"/>
-          <a:chOff x="0" y="0"/>
-          <a:chExt cx="0" cy="0"/>
-        </a:xfrm>
-      </p:grpSpPr>
-      <p:sp>
-        <p:nvSpPr>
-          <p:cNvPr id="2" name="Title 1">
-            <a:extLst>
-              <a:ext uri="{FF2B5EF4-FFF2-40B4-BE49-F238E27FC236}">
-                <a16:creationId xmlns:a16="http://schemas.microsoft.com/office/drawing/2014/main" id="{03812D1F-F6DF-42A7-8DA2-1A5A8243FD15}"/>
-              </a:ext>
-            </a:extLst>
-          </p:cNvPr>
-          <p:cNvSpPr>
-            <a:spLocks noGrp="1"/>
-          </p:cNvSpPr>
-          <p:nvPr>
-            <p:ph type="title"/>
-          </p:nvPr>
-        </p:nvSpPr>
-        <p:spPr/>
-        <p:txBody>
-          <a:bodyPr/>
-          <a:lstStyle/>
-          <a:p>
-            <a:r>
-              <a:rPr lang="en-US" dirty="0"/>
-              <a:t>Cardinality (2/3)</a:t>
-            </a:r>
-            <a:endParaRPr lang="en-CH" dirty="0"/>
-          </a:p>
-        </p:txBody>
-      </p:sp>
-      <p:pic>
-        <p:nvPicPr>
-          <p:cNvPr id="9" name="Picture 8">
-            <a:extLst>
-              <a:ext uri="{FF2B5EF4-FFF2-40B4-BE49-F238E27FC236}">
-                <a16:creationId xmlns:a16="http://schemas.microsoft.com/office/drawing/2014/main" id="{C4DEC049-5711-464A-B3EB-98AD74A156DD}"/>
-              </a:ext>
-            </a:extLst>
-          </p:cNvPr>
-          <p:cNvPicPr>
-            <a:picLocks noChangeAspect="1"/>
-          </p:cNvPicPr>
-          <p:nvPr/>
-        </p:nvPicPr>
-        <p:blipFill>
-          <a:blip r:embed="rId3"/>
-          <a:stretch>
-            <a:fillRect/>
-          </a:stretch>
-        </p:blipFill>
-        <p:spPr>
-          <a:xfrm>
-            <a:off x="6961556" y="2238831"/>
-            <a:ext cx="3648611" cy="1671810"/>
-          </a:xfrm>
-          <a:prstGeom prst="rect">
-            <a:avLst/>
-          </a:prstGeom>
-        </p:spPr>
-      </p:pic>
-      <p:pic>
-        <p:nvPicPr>
-          <p:cNvPr id="11" name="Picture 10">
-            <a:extLst>
-              <a:ext uri="{FF2B5EF4-FFF2-40B4-BE49-F238E27FC236}">
-                <a16:creationId xmlns:a16="http://schemas.microsoft.com/office/drawing/2014/main" id="{75415781-E513-43B2-8ACB-7A54256AA994}"/>
-              </a:ext>
-            </a:extLst>
-          </p:cNvPr>
-          <p:cNvPicPr>
-            <a:picLocks noChangeAspect="1"/>
-          </p:cNvPicPr>
-          <p:nvPr/>
-        </p:nvPicPr>
-        <p:blipFill>
-          <a:blip r:embed="rId4"/>
-          <a:stretch>
-            <a:fillRect/>
-          </a:stretch>
-        </p:blipFill>
-        <p:spPr>
-          <a:xfrm>
-            <a:off x="838200" y="1884568"/>
-            <a:ext cx="4802436" cy="2380337"/>
-          </a:xfrm>
-          <a:prstGeom prst="rect">
-            <a:avLst/>
-          </a:prstGeom>
-        </p:spPr>
-      </p:pic>
-      <p:pic>
-        <p:nvPicPr>
-          <p:cNvPr id="13" name="Graphic 12" descr="Thumbs Down with solid fill">
-            <a:extLst>
-              <a:ext uri="{FF2B5EF4-FFF2-40B4-BE49-F238E27FC236}">
-                <a16:creationId xmlns:a16="http://schemas.microsoft.com/office/drawing/2014/main" id="{EA734CAC-E648-4DC7-816F-EAC3A2990A95}"/>
-              </a:ext>
-            </a:extLst>
-          </p:cNvPr>
-          <p:cNvPicPr>
-            <a:picLocks noChangeAspect="1"/>
-          </p:cNvPicPr>
-          <p:nvPr/>
-        </p:nvPicPr>
-        <p:blipFill>
-          <a:blip r:embed="rId5">
-            <a:extLst>
-              <a:ext uri="{28A0092B-C50C-407E-A947-70E740481C1C}">
-                <a14:useLocalDpi xmlns:a14="http://schemas.microsoft.com/office/drawing/2010/main" val="0"/>
-              </a:ext>
-              <a:ext uri="{96DAC541-7B7A-43D3-8B79-37D633B846F1}">
-                <asvg:svgBlip xmlns:asvg="http://schemas.microsoft.com/office/drawing/2016/SVG/main" r:embed="rId6"/>
-              </a:ext>
-            </a:extLst>
-          </a:blip>
-          <a:stretch>
-            <a:fillRect/>
-          </a:stretch>
-        </p:blipFill>
-        <p:spPr>
-          <a:xfrm>
-            <a:off x="2650016" y="4521867"/>
-            <a:ext cx="914400" cy="914400"/>
-          </a:xfrm>
-          <a:prstGeom prst="rect">
-            <a:avLst/>
-          </a:prstGeom>
-        </p:spPr>
-      </p:pic>
-      <p:pic>
-        <p:nvPicPr>
-          <p:cNvPr id="15" name="Graphic 14" descr="Thumbs up sign with solid fill">
-            <a:extLst>
-              <a:ext uri="{FF2B5EF4-FFF2-40B4-BE49-F238E27FC236}">
-                <a16:creationId xmlns:a16="http://schemas.microsoft.com/office/drawing/2014/main" id="{3EBA9A71-E888-488E-91DF-079D9542A1AA}"/>
-              </a:ext>
-            </a:extLst>
-          </p:cNvPr>
-          <p:cNvPicPr>
-            <a:picLocks noChangeAspect="1"/>
-          </p:cNvPicPr>
-          <p:nvPr/>
-        </p:nvPicPr>
-        <p:blipFill>
-          <a:blip r:embed="rId7">
-            <a:extLst>
-              <a:ext uri="{28A0092B-C50C-407E-A947-70E740481C1C}">
-                <a14:useLocalDpi xmlns:a14="http://schemas.microsoft.com/office/drawing/2010/main" val="0"/>
-              </a:ext>
-              <a:ext uri="{96DAC541-7B7A-43D3-8B79-37D633B846F1}">
-                <asvg:svgBlip xmlns:asvg="http://schemas.microsoft.com/office/drawing/2016/SVG/main" r:embed="rId8"/>
-              </a:ext>
-            </a:extLst>
-          </a:blip>
-          <a:stretch>
-            <a:fillRect/>
-          </a:stretch>
-        </p:blipFill>
-        <p:spPr>
-          <a:xfrm>
-            <a:off x="8170386" y="4521867"/>
-            <a:ext cx="914400" cy="914400"/>
-          </a:xfrm>
-          <a:prstGeom prst="rect">
-            <a:avLst/>
-          </a:prstGeom>
-        </p:spPr>
-      </p:pic>
-    </p:spTree>
-    <p:extLst>
-      <p:ext uri="{BB962C8B-B14F-4D97-AF65-F5344CB8AC3E}">
-        <p14:creationId xmlns:p14="http://schemas.microsoft.com/office/powerpoint/2010/main" val="3081153295"/>
-      </p:ext>
-    </p:extLst>
-  </p:cSld>
-  <p:clrMapOvr>
-    <a:masterClrMapping/>
-  </p:clrMapOvr>
-</p:sld>
-</file>
-
-<file path=ppt/slides/slide2.xml><?xml version="1.0" encoding="utf-8"?>
-<p:sld xmlns:a="http://schemas.openxmlformats.org/drawingml/2006/main" xmlns:r="http://schemas.openxmlformats.org/officeDocument/2006/relationships" xmlns:p="http://schemas.openxmlformats.org/presentationml/2006/main">
-  <p:cSld>
-    <p:spTree>
-      <p:nvGrpSpPr>
-        <p:cNvPr id="1" name=""/>
-        <p:cNvGrpSpPr/>
-        <p:nvPr/>
-      </p:nvGrpSpPr>
-      <p:grpSpPr>
-        <a:xfrm>
-          <a:off x="0" y="0"/>
-          <a:ext cx="0" cy="0"/>
-          <a:chOff x="0" y="0"/>
-          <a:chExt cx="0" cy="0"/>
-        </a:xfrm>
-      </p:grpSpPr>
-      <p:sp>
-        <p:nvSpPr>
-          <p:cNvPr id="2" name="Title 1">
-            <a:extLst>
-              <a:ext uri="{FF2B5EF4-FFF2-40B4-BE49-F238E27FC236}">
-                <a16:creationId xmlns:a16="http://schemas.microsoft.com/office/drawing/2014/main" id="{03812D1F-F6DF-42A7-8DA2-1A5A8243FD15}"/>
-              </a:ext>
-            </a:extLst>
-          </p:cNvPr>
-          <p:cNvSpPr>
-            <a:spLocks noGrp="1"/>
-          </p:cNvSpPr>
-          <p:nvPr>
-            <p:ph type="title"/>
-          </p:nvPr>
-        </p:nvSpPr>
-        <p:spPr/>
-        <p:txBody>
-          <a:bodyPr/>
-          <a:lstStyle/>
-          <a:p>
-            <a:r>
-              <a:rPr lang="en-US" dirty="0"/>
-              <a:t>Flowable</a:t>
-            </a:r>
-            <a:endParaRPr lang="en-CH" dirty="0"/>
-          </a:p>
-        </p:txBody>
-      </p:sp>
-      <p:sp>
-        <p:nvSpPr>
-          <p:cNvPr id="4" name="Content Placeholder 2">
-            <a:extLst>
-              <a:ext uri="{FF2B5EF4-FFF2-40B4-BE49-F238E27FC236}">
-                <a16:creationId xmlns:a16="http://schemas.microsoft.com/office/drawing/2014/main" id="{8036383B-55A6-4A81-A07F-FF3C1BA6A11F}"/>
-              </a:ext>
-            </a:extLst>
-          </p:cNvPr>
-          <p:cNvSpPr>
-            <a:spLocks noGrp="1"/>
-          </p:cNvSpPr>
-          <p:nvPr>
-            <p:ph idx="1"/>
-          </p:nvPr>
-        </p:nvSpPr>
-        <p:spPr>
-          <a:xfrm>
-            <a:off x="838200" y="1825625"/>
-            <a:ext cx="10515600" cy="4351338"/>
-          </a:xfrm>
-        </p:spPr>
-        <p:txBody>
-          <a:bodyPr/>
-          <a:lstStyle/>
-          <a:p>
-            <a:r>
-              <a:rPr lang="en-US" dirty="0"/>
-              <a:t>Flowable = Process Engine capable of handling business processes notated in BPMN 2.0 (</a:t>
-            </a:r>
-            <a:r>
-              <a:rPr lang="en-US" dirty="0">
-                <a:hlinkClick r:id="rId2"/>
-              </a:rPr>
-              <a:t>https://www.omg.org/</a:t>
-            </a:r>
-            <a:r>
-              <a:rPr lang="en-US" dirty="0"/>
-              <a:t>)</a:t>
-            </a:r>
-          </a:p>
-          <a:p>
-            <a:r>
-              <a:rPr lang="en-US" dirty="0"/>
-              <a:t>Forked from Activiti</a:t>
-            </a:r>
-          </a:p>
-          <a:p>
-            <a:r>
-              <a:rPr lang="en-US" dirty="0"/>
-              <a:t>Open Source</a:t>
-            </a:r>
-          </a:p>
-          <a:p>
-            <a:r>
-              <a:rPr lang="en-US" dirty="0"/>
-              <a:t>Alternatives: Camunda, Activiti and several others</a:t>
-            </a:r>
-          </a:p>
-        </p:txBody>
-      </p:sp>
-    </p:spTree>
-    <p:extLst>
-      <p:ext uri="{BB962C8B-B14F-4D97-AF65-F5344CB8AC3E}">
-        <p14:creationId xmlns:p14="http://schemas.microsoft.com/office/powerpoint/2010/main" val="926033395"/>
-      </p:ext>
-    </p:extLst>
-  </p:cSld>
-  <p:clrMapOvr>
-    <a:masterClrMapping/>
-  </p:clrMapOvr>
-</p:sld>
-</file>
-
-<file path=ppt/slides/slide20.xml><?xml version="1.0" encoding="utf-8"?>
-<p:sld xmlns:a="http://schemas.openxmlformats.org/drawingml/2006/main" xmlns:r="http://schemas.openxmlformats.org/officeDocument/2006/relationships" xmlns:p="http://schemas.openxmlformats.org/presentationml/2006/main">
-  <p:cSld>
-    <p:spTree>
-      <p:nvGrpSpPr>
-        <p:cNvPr id="1" name=""/>
-        <p:cNvGrpSpPr/>
-        <p:nvPr/>
-      </p:nvGrpSpPr>
-      <p:grpSpPr>
-        <a:xfrm>
-          <a:off x="0" y="0"/>
-          <a:ext cx="0" cy="0"/>
-          <a:chOff x="0" y="0"/>
-          <a:chExt cx="0" cy="0"/>
-        </a:xfrm>
-      </p:grpSpPr>
-      <p:sp>
-        <p:nvSpPr>
-          <p:cNvPr id="2" name="Title 1">
-            <a:extLst>
-              <a:ext uri="{FF2B5EF4-FFF2-40B4-BE49-F238E27FC236}">
-                <a16:creationId xmlns:a16="http://schemas.microsoft.com/office/drawing/2014/main" id="{03812D1F-F6DF-42A7-8DA2-1A5A8243FD15}"/>
-              </a:ext>
-            </a:extLst>
-          </p:cNvPr>
-          <p:cNvSpPr>
-            <a:spLocks noGrp="1"/>
-          </p:cNvSpPr>
-          <p:nvPr>
-            <p:ph type="title"/>
-          </p:nvPr>
-        </p:nvSpPr>
-        <p:spPr/>
-        <p:txBody>
-          <a:bodyPr/>
-          <a:lstStyle/>
-          <a:p>
-            <a:r>
-              <a:rPr lang="en-US" dirty="0"/>
-              <a:t>Cardinality (3/3)</a:t>
-            </a:r>
-            <a:endParaRPr lang="en-CH" dirty="0"/>
-          </a:p>
-        </p:txBody>
-      </p:sp>
-      <p:sp>
-        <p:nvSpPr>
-          <p:cNvPr id="5" name="Content Placeholder 4">
-            <a:extLst>
-              <a:ext uri="{FF2B5EF4-FFF2-40B4-BE49-F238E27FC236}">
-                <a16:creationId xmlns:a16="http://schemas.microsoft.com/office/drawing/2014/main" id="{3A5FB3D3-4BB6-451A-91DF-53D8A59B2AD4}"/>
-              </a:ext>
-            </a:extLst>
-          </p:cNvPr>
-          <p:cNvSpPr>
-            <a:spLocks noGrp="1"/>
-          </p:cNvSpPr>
-          <p:nvPr>
-            <p:ph idx="1"/>
-          </p:nvPr>
-        </p:nvSpPr>
-        <p:spPr/>
-        <p:txBody>
-          <a:bodyPr>
-            <a:normAutofit/>
-          </a:bodyPr>
-          <a:lstStyle/>
-          <a:p>
-            <a:r>
-              <a:rPr lang="en-US" dirty="0"/>
-              <a:t>Syntax</a:t>
-            </a:r>
-          </a:p>
-          <a:p>
-            <a:pPr lvl="1"/>
-            <a:r>
-              <a:rPr lang="de-CH" b="0" i="0" dirty="0">
-                <a:solidFill>
-                  <a:srgbClr val="444444"/>
-                </a:solidFill>
-                <a:effectLst/>
-                <a:latin typeface="SFMono-Regular"/>
-              </a:rPr>
-              <a:t>&lt;</a:t>
-            </a:r>
-            <a:r>
-              <a:rPr lang="de-CH" b="0" i="0" dirty="0" err="1">
-                <a:solidFill>
-                  <a:srgbClr val="444444"/>
-                </a:solidFill>
-                <a:effectLst/>
-                <a:latin typeface="SFMono-Regular"/>
-              </a:rPr>
-              <a:t>multiInstanceLoopCharacteristics</a:t>
-            </a:r>
-            <a:r>
-              <a:rPr lang="de-CH" b="0" i="0" dirty="0">
-                <a:solidFill>
-                  <a:srgbClr val="444444"/>
-                </a:solidFill>
-                <a:effectLst/>
-                <a:latin typeface="SFMono-Regular"/>
-              </a:rPr>
-              <a:t> </a:t>
-            </a:r>
-            <a:r>
-              <a:rPr lang="de-CH" b="0" i="0" dirty="0" err="1">
-                <a:solidFill>
-                  <a:srgbClr val="444444"/>
-                </a:solidFill>
-                <a:effectLst/>
-                <a:latin typeface="SFMono-Regular"/>
-              </a:rPr>
-              <a:t>isSequential</a:t>
-            </a:r>
-            <a:r>
-              <a:rPr lang="de-CH" b="0" i="0" dirty="0">
-                <a:solidFill>
-                  <a:srgbClr val="444444"/>
-                </a:solidFill>
-                <a:effectLst/>
-                <a:latin typeface="SFMono-Regular"/>
-              </a:rPr>
-              <a:t>="</a:t>
-            </a:r>
-            <a:r>
-              <a:rPr lang="de-CH" b="0" i="0" dirty="0" err="1">
-                <a:solidFill>
-                  <a:srgbClr val="444444"/>
-                </a:solidFill>
-                <a:effectLst/>
-                <a:latin typeface="SFMono-Regular"/>
-              </a:rPr>
-              <a:t>false|true</a:t>
-            </a:r>
-            <a:r>
-              <a:rPr lang="de-CH" b="0" i="0" dirty="0">
-                <a:solidFill>
-                  <a:srgbClr val="444444"/>
-                </a:solidFill>
-                <a:effectLst/>
-                <a:latin typeface="SFMono-Regular"/>
-              </a:rPr>
-              <a:t>"&gt; </a:t>
-            </a:r>
-            <a:r>
-              <a:rPr lang="de-CH" b="0" i="0" dirty="0">
-                <a:solidFill>
-                  <a:srgbClr val="444444"/>
-                </a:solidFill>
-                <a:effectLst/>
-                <a:highlight>
-                  <a:srgbClr val="FFFF00"/>
-                </a:highlight>
-                <a:latin typeface="SFMono-Regular"/>
-              </a:rPr>
-              <a:t>&lt;</a:t>
-            </a:r>
-            <a:r>
-              <a:rPr lang="de-CH" b="0" i="0" dirty="0" err="1">
-                <a:solidFill>
-                  <a:srgbClr val="444444"/>
-                </a:solidFill>
-                <a:effectLst/>
-                <a:highlight>
-                  <a:srgbClr val="FFFF00"/>
-                </a:highlight>
-                <a:latin typeface="SFMono-Regular"/>
-              </a:rPr>
-              <a:t>loopCardinality</a:t>
-            </a:r>
-            <a:r>
-              <a:rPr lang="de-CH" b="0" i="0" dirty="0">
-                <a:solidFill>
-                  <a:srgbClr val="444444"/>
-                </a:solidFill>
-                <a:effectLst/>
-                <a:highlight>
-                  <a:srgbClr val="FFFF00"/>
-                </a:highlight>
-                <a:latin typeface="SFMono-Regular"/>
-              </a:rPr>
-              <a:t>&gt;5&lt;/</a:t>
-            </a:r>
-            <a:r>
-              <a:rPr lang="de-CH" b="0" i="0" dirty="0" err="1">
-                <a:solidFill>
-                  <a:srgbClr val="444444"/>
-                </a:solidFill>
-                <a:effectLst/>
-                <a:highlight>
-                  <a:srgbClr val="FFFF00"/>
-                </a:highlight>
-                <a:latin typeface="SFMono-Regular"/>
-              </a:rPr>
-              <a:t>loopCardinality</a:t>
-            </a:r>
-            <a:r>
-              <a:rPr lang="de-CH" b="0" i="0" dirty="0">
-                <a:solidFill>
-                  <a:srgbClr val="444444"/>
-                </a:solidFill>
-                <a:effectLst/>
-                <a:highlight>
-                  <a:srgbClr val="FFFF00"/>
-                </a:highlight>
-                <a:latin typeface="SFMono-Regular"/>
-              </a:rPr>
-              <a:t>&gt; &lt;/</a:t>
-            </a:r>
-            <a:r>
-              <a:rPr lang="de-CH" b="0" i="0" dirty="0" err="1">
-                <a:solidFill>
-                  <a:srgbClr val="444444"/>
-                </a:solidFill>
-                <a:effectLst/>
-                <a:highlight>
-                  <a:srgbClr val="FFFF00"/>
-                </a:highlight>
-                <a:latin typeface="SFMono-Regular"/>
-              </a:rPr>
-              <a:t>multiInstanceLoopCharacteristics</a:t>
-            </a:r>
-            <a:r>
-              <a:rPr lang="de-CH" b="0" i="0" dirty="0">
-                <a:solidFill>
-                  <a:srgbClr val="444444"/>
-                </a:solidFill>
-                <a:effectLst/>
-                <a:highlight>
-                  <a:srgbClr val="FFFF00"/>
-                </a:highlight>
-                <a:latin typeface="SFMono-Regular"/>
-              </a:rPr>
-              <a:t>&gt;</a:t>
-            </a:r>
-            <a:endParaRPr lang="en-US" b="0" i="0" dirty="0">
-              <a:solidFill>
-                <a:srgbClr val="444444"/>
-              </a:solidFill>
-              <a:effectLst/>
-              <a:highlight>
-                <a:srgbClr val="FFFF00"/>
-              </a:highlight>
-              <a:latin typeface="SFMono-Regular"/>
-            </a:endParaRPr>
-          </a:p>
-          <a:p>
-            <a:pPr lvl="1"/>
-            <a:r>
-              <a:rPr lang="de-CH" b="0" i="0" dirty="0">
-                <a:solidFill>
-                  <a:srgbClr val="444444"/>
-                </a:solidFill>
-                <a:effectLst/>
-                <a:latin typeface="SFMono-Regular"/>
-              </a:rPr>
-              <a:t>&lt;</a:t>
-            </a:r>
-            <a:r>
-              <a:rPr lang="de-CH" b="0" i="0" dirty="0" err="1">
-                <a:solidFill>
-                  <a:srgbClr val="444444"/>
-                </a:solidFill>
-                <a:effectLst/>
-                <a:latin typeface="SFMono-Regular"/>
-              </a:rPr>
-              <a:t>multiInstanceLoopCharacteristics</a:t>
-            </a:r>
-            <a:r>
-              <a:rPr lang="de-CH" b="0" i="0" dirty="0">
-                <a:solidFill>
-                  <a:srgbClr val="444444"/>
-                </a:solidFill>
-                <a:effectLst/>
-                <a:latin typeface="SFMono-Regular"/>
-              </a:rPr>
-              <a:t> </a:t>
-            </a:r>
-            <a:r>
-              <a:rPr lang="de-CH" b="0" i="0" dirty="0" err="1">
-                <a:solidFill>
-                  <a:srgbClr val="444444"/>
-                </a:solidFill>
-                <a:effectLst/>
-                <a:latin typeface="SFMono-Regular"/>
-              </a:rPr>
-              <a:t>isSequential</a:t>
-            </a:r>
-            <a:r>
-              <a:rPr lang="de-CH" b="0" i="0" dirty="0">
-                <a:solidFill>
-                  <a:srgbClr val="444444"/>
-                </a:solidFill>
-                <a:effectLst/>
-                <a:latin typeface="SFMono-Regular"/>
-              </a:rPr>
-              <a:t>="</a:t>
-            </a:r>
-            <a:r>
-              <a:rPr lang="de-CH" b="0" i="0" dirty="0" err="1">
-                <a:solidFill>
-                  <a:srgbClr val="444444"/>
-                </a:solidFill>
-                <a:effectLst/>
-                <a:latin typeface="SFMono-Regular"/>
-              </a:rPr>
-              <a:t>false|true</a:t>
-            </a:r>
-            <a:r>
-              <a:rPr lang="de-CH" b="0" i="0" dirty="0">
-                <a:solidFill>
-                  <a:srgbClr val="444444"/>
-                </a:solidFill>
-                <a:effectLst/>
-                <a:latin typeface="SFMono-Regular"/>
-              </a:rPr>
-              <a:t>"&gt; </a:t>
-            </a:r>
-            <a:r>
-              <a:rPr lang="de-CH" b="0" i="0" dirty="0">
-                <a:solidFill>
-                  <a:srgbClr val="444444"/>
-                </a:solidFill>
-                <a:effectLst/>
-                <a:highlight>
-                  <a:srgbClr val="FFFF00"/>
-                </a:highlight>
-                <a:latin typeface="SFMono-Regular"/>
-              </a:rPr>
-              <a:t>&lt;</a:t>
-            </a:r>
-            <a:r>
-              <a:rPr lang="de-CH" b="0" i="0" dirty="0" err="1">
-                <a:solidFill>
-                  <a:srgbClr val="444444"/>
-                </a:solidFill>
-                <a:effectLst/>
-                <a:highlight>
-                  <a:srgbClr val="FFFF00"/>
-                </a:highlight>
-                <a:latin typeface="SFMono-Regular"/>
-              </a:rPr>
-              <a:t>loopCardinality</a:t>
-            </a:r>
-            <a:r>
-              <a:rPr lang="de-CH" b="0" i="0" dirty="0">
-                <a:solidFill>
-                  <a:srgbClr val="444444"/>
-                </a:solidFill>
-                <a:effectLst/>
-                <a:highlight>
-                  <a:srgbClr val="FFFF00"/>
-                </a:highlight>
-                <a:latin typeface="SFMono-Regular"/>
-              </a:rPr>
-              <a:t>&gt;${</a:t>
-            </a:r>
-            <a:r>
-              <a:rPr lang="de-CH" b="0" i="0" dirty="0" err="1">
-                <a:solidFill>
-                  <a:srgbClr val="444444"/>
-                </a:solidFill>
-                <a:effectLst/>
-                <a:highlight>
-                  <a:srgbClr val="FFFF00"/>
-                </a:highlight>
-                <a:latin typeface="SFMono-Regular"/>
-              </a:rPr>
-              <a:t>nrOfOrders-nrOfCancellations</a:t>
-            </a:r>
-            <a:r>
-              <a:rPr lang="de-CH" b="0" i="0" dirty="0">
-                <a:solidFill>
-                  <a:srgbClr val="444444"/>
-                </a:solidFill>
-                <a:effectLst/>
-                <a:highlight>
-                  <a:srgbClr val="FFFF00"/>
-                </a:highlight>
-                <a:latin typeface="SFMono-Regular"/>
-              </a:rPr>
-              <a:t>}&lt;/</a:t>
-            </a:r>
-            <a:r>
-              <a:rPr lang="de-CH" b="0" i="0" dirty="0" err="1">
-                <a:solidFill>
-                  <a:srgbClr val="444444"/>
-                </a:solidFill>
-                <a:effectLst/>
-                <a:highlight>
-                  <a:srgbClr val="FFFF00"/>
-                </a:highlight>
-                <a:latin typeface="SFMono-Regular"/>
-              </a:rPr>
-              <a:t>loopCardinality</a:t>
-            </a:r>
-            <a:r>
-              <a:rPr lang="de-CH" b="0" i="0" dirty="0">
-                <a:solidFill>
-                  <a:srgbClr val="444444"/>
-                </a:solidFill>
-                <a:effectLst/>
-                <a:highlight>
-                  <a:srgbClr val="FFFF00"/>
-                </a:highlight>
-                <a:latin typeface="SFMono-Regular"/>
-              </a:rPr>
-              <a:t>&gt; </a:t>
-            </a:r>
-            <a:r>
-              <a:rPr lang="de-CH" b="0" i="0" dirty="0">
-                <a:solidFill>
-                  <a:srgbClr val="444444"/>
-                </a:solidFill>
-                <a:effectLst/>
-                <a:latin typeface="SFMono-Regular"/>
-              </a:rPr>
-              <a:t>&lt;/</a:t>
-            </a:r>
-            <a:r>
-              <a:rPr lang="de-CH" b="0" i="0" dirty="0" err="1">
-                <a:solidFill>
-                  <a:srgbClr val="444444"/>
-                </a:solidFill>
-                <a:effectLst/>
-                <a:latin typeface="SFMono-Regular"/>
-              </a:rPr>
-              <a:t>multiInstanceLoopCharacteristics</a:t>
-            </a:r>
-            <a:r>
-              <a:rPr lang="de-CH" b="0" i="0" dirty="0">
-                <a:solidFill>
-                  <a:srgbClr val="444444"/>
-                </a:solidFill>
-                <a:effectLst/>
-                <a:latin typeface="SFMono-Regular"/>
-              </a:rPr>
-              <a:t>&gt;</a:t>
-            </a:r>
-            <a:endParaRPr lang="en-US" dirty="0">
-              <a:solidFill>
-                <a:srgbClr val="444444"/>
-              </a:solidFill>
-              <a:latin typeface="SFMono-Regular"/>
-            </a:endParaRPr>
-          </a:p>
-          <a:p>
-            <a:pPr lvl="1"/>
-            <a:r>
-              <a:rPr lang="de-CH" b="0" i="0" dirty="0">
-                <a:solidFill>
-                  <a:srgbClr val="444444"/>
-                </a:solidFill>
-                <a:effectLst/>
-                <a:latin typeface="SFMono-Regular"/>
-              </a:rPr>
-              <a:t>&lt;</a:t>
-            </a:r>
-            <a:r>
-              <a:rPr lang="de-CH" b="0" i="0" dirty="0" err="1">
-                <a:solidFill>
-                  <a:srgbClr val="444444"/>
-                </a:solidFill>
-                <a:effectLst/>
-                <a:latin typeface="SFMono-Regular"/>
-              </a:rPr>
-              <a:t>multiInstanceLoopCharacteristics</a:t>
-            </a:r>
-            <a:r>
-              <a:rPr lang="de-CH" b="0" i="0" dirty="0">
-                <a:solidFill>
-                  <a:srgbClr val="444444"/>
-                </a:solidFill>
-                <a:effectLst/>
-                <a:latin typeface="SFMono-Regular"/>
-              </a:rPr>
-              <a:t> </a:t>
-            </a:r>
-            <a:r>
-              <a:rPr lang="de-CH" b="0" i="0" dirty="0" err="1">
-                <a:solidFill>
-                  <a:srgbClr val="444444"/>
-                </a:solidFill>
-                <a:effectLst/>
-                <a:latin typeface="SFMono-Regular"/>
-              </a:rPr>
-              <a:t>isSequential</a:t>
-            </a:r>
-            <a:r>
-              <a:rPr lang="de-CH" b="0" i="0" dirty="0">
-                <a:solidFill>
-                  <a:srgbClr val="444444"/>
-                </a:solidFill>
-                <a:effectLst/>
-                <a:latin typeface="SFMono-Regular"/>
-              </a:rPr>
-              <a:t>="</a:t>
-            </a:r>
-            <a:r>
-              <a:rPr lang="de-CH" b="0" i="0" dirty="0" err="1">
-                <a:solidFill>
-                  <a:srgbClr val="444444"/>
-                </a:solidFill>
-                <a:effectLst/>
-                <a:latin typeface="SFMono-Regular"/>
-              </a:rPr>
-              <a:t>false</a:t>
-            </a:r>
-            <a:r>
-              <a:rPr lang="de-CH" b="0" i="0" dirty="0">
-                <a:solidFill>
-                  <a:srgbClr val="444444"/>
-                </a:solidFill>
-                <a:effectLst/>
-                <a:latin typeface="SFMono-Regular"/>
-              </a:rPr>
-              <a:t>" </a:t>
-            </a:r>
-            <a:r>
-              <a:rPr lang="de-CH" b="0" i="0" dirty="0" err="1">
-                <a:solidFill>
-                  <a:srgbClr val="444444"/>
-                </a:solidFill>
-                <a:effectLst/>
-                <a:highlight>
-                  <a:srgbClr val="FFFF00"/>
-                </a:highlight>
-                <a:latin typeface="SFMono-Regular"/>
-              </a:rPr>
-              <a:t>flowable:collection</a:t>
-            </a:r>
-            <a:r>
-              <a:rPr lang="de-CH" b="0" i="0" dirty="0">
-                <a:solidFill>
-                  <a:srgbClr val="444444"/>
-                </a:solidFill>
-                <a:effectLst/>
-                <a:highlight>
-                  <a:srgbClr val="FFFF00"/>
-                </a:highlight>
-                <a:latin typeface="SFMono-Regular"/>
-              </a:rPr>
-              <a:t>=«</a:t>
-            </a:r>
-            <a:r>
-              <a:rPr lang="de-CH" b="1" i="0" dirty="0" err="1">
-                <a:solidFill>
-                  <a:srgbClr val="444444"/>
-                </a:solidFill>
-                <a:effectLst/>
-                <a:highlight>
-                  <a:srgbClr val="FFFF00"/>
-                </a:highlight>
-                <a:latin typeface="SFMono-Regular"/>
-              </a:rPr>
-              <a:t>loopList</a:t>
-            </a:r>
-            <a:r>
-              <a:rPr lang="de-CH" b="0" i="0" dirty="0">
-                <a:solidFill>
-                  <a:srgbClr val="444444"/>
-                </a:solidFill>
-                <a:effectLst/>
-                <a:highlight>
-                  <a:srgbClr val="FFFF00"/>
-                </a:highlight>
-                <a:latin typeface="SFMono-Regular"/>
-              </a:rPr>
-              <a:t>" </a:t>
-            </a:r>
-            <a:r>
-              <a:rPr lang="de-CH" b="0" i="0" dirty="0" err="1">
-                <a:solidFill>
-                  <a:srgbClr val="444444"/>
-                </a:solidFill>
-                <a:effectLst/>
-                <a:highlight>
-                  <a:srgbClr val="FFFF00"/>
-                </a:highlight>
-                <a:latin typeface="SFMono-Regular"/>
-              </a:rPr>
-              <a:t>flowable:elementVariable</a:t>
-            </a:r>
-            <a:r>
-              <a:rPr lang="de-CH" b="0" i="0" dirty="0">
-                <a:solidFill>
-                  <a:srgbClr val="444444"/>
-                </a:solidFill>
-                <a:effectLst/>
-                <a:highlight>
-                  <a:srgbClr val="FFFF00"/>
-                </a:highlight>
-                <a:latin typeface="SFMono-Regular"/>
-              </a:rPr>
-              <a:t>=«</a:t>
-            </a:r>
-            <a:r>
-              <a:rPr lang="de-CH" b="1" i="0" dirty="0" err="1">
-                <a:solidFill>
-                  <a:srgbClr val="444444"/>
-                </a:solidFill>
-                <a:effectLst/>
-                <a:highlight>
-                  <a:srgbClr val="FFFF00"/>
-                </a:highlight>
-                <a:latin typeface="SFMono-Regular"/>
-              </a:rPr>
-              <a:t>listItem</a:t>
-            </a:r>
-            <a:r>
-              <a:rPr lang="de-CH" b="0" i="0" dirty="0">
-                <a:solidFill>
-                  <a:srgbClr val="444444"/>
-                </a:solidFill>
-                <a:effectLst/>
-                <a:highlight>
-                  <a:srgbClr val="FFFF00"/>
-                </a:highlight>
-                <a:latin typeface="SFMono-Regular"/>
-              </a:rPr>
-              <a:t>" &gt; </a:t>
-            </a:r>
-            <a:r>
-              <a:rPr lang="de-CH" b="0" i="0" dirty="0">
-                <a:solidFill>
-                  <a:srgbClr val="444444"/>
-                </a:solidFill>
-                <a:effectLst/>
-                <a:latin typeface="SFMono-Regular"/>
-              </a:rPr>
-              <a:t>&lt;/</a:t>
-            </a:r>
-            <a:r>
-              <a:rPr lang="de-CH" b="0" i="0" dirty="0" err="1">
-                <a:solidFill>
-                  <a:srgbClr val="444444"/>
-                </a:solidFill>
-                <a:effectLst/>
-                <a:latin typeface="SFMono-Regular"/>
-              </a:rPr>
-              <a:t>multiInstanceLoopCharacteristics</a:t>
-            </a:r>
-            <a:r>
-              <a:rPr lang="de-CH" b="0" i="0" dirty="0">
-                <a:solidFill>
-                  <a:srgbClr val="444444"/>
-                </a:solidFill>
-                <a:effectLst/>
-                <a:latin typeface="SFMono-Regular"/>
-              </a:rPr>
-              <a:t>&gt;</a:t>
-            </a:r>
-            <a:endParaRPr lang="en-CH" dirty="0"/>
-          </a:p>
-        </p:txBody>
-      </p:sp>
-    </p:spTree>
-    <p:extLst>
-      <p:ext uri="{BB962C8B-B14F-4D97-AF65-F5344CB8AC3E}">
-        <p14:creationId xmlns:p14="http://schemas.microsoft.com/office/powerpoint/2010/main" val="1634682293"/>
       </p:ext>
     </p:extLst>
   </p:cSld>

</xml_diff>